<commit_message>
update slides for the group project
</commit_message>
<xml_diff>
--- a/Kexin_Ricky_Dawei_John/Accelerating Trasformers via Multi-tiered Memory.pptx
+++ b/Kexin_Ricky_Dawei_John/Accelerating Trasformers via Multi-tiered Memory.pptx
@@ -27,14 +27,21 @@
     <p:sldId id="291" r:id="rId20"/>
     <p:sldId id="269" r:id="rId21"/>
     <p:sldId id="268" r:id="rId22"/>
-    <p:sldId id="284" r:id="rId23"/>
-    <p:sldId id="276" r:id="rId24"/>
-    <p:sldId id="280" r:id="rId25"/>
+    <p:sldId id="318" r:id="rId23"/>
+    <p:sldId id="314" r:id="rId24"/>
+    <p:sldId id="316" r:id="rId25"/>
+    <p:sldId id="317" r:id="rId26"/>
+    <p:sldId id="284" r:id="rId27"/>
+    <p:sldId id="276" r:id="rId28"/>
+    <p:sldId id="310" r:id="rId29"/>
+    <p:sldId id="315" r:id="rId30"/>
+    <p:sldId id="312" r:id="rId31"/>
+    <p:sldId id="280" r:id="rId32"/>
   </p:sldIdLst>
   <p:sldSz cx="9144000" cy="5143500" type="screen16x9"/>
   <p:notesSz cx="5143500" cy="9144000"/>
   <p:custDataLst>
-    <p:tags r:id="rId29"/>
+    <p:tags r:id="rId36"/>
   </p:custDataLst>
   <p:defaultTextStyle>
     <a:lvl1pPr marL="0" algn="l" defTabSz="914400" rtl="0" eaLnBrk="1" latinLnBrk="0" hangingPunct="1">
@@ -4713,83 +4720,13 @@
           <a:p>
             <a:r>
               <a:rPr lang="en-US" altLang="zh-CN" dirty="0"/>
-              <a:t>Our</a:t>
+              <a:t>Finally,</a:t>
             </a:r>
             <a:r>
               <a:rPr lang="zh-CN" altLang="en-US" dirty="0"/>
               <a:t> </a:t>
             </a:r>
             <a:r>
-              <a:rPr lang="en-US" altLang="zh-CN" dirty="0"/>
-              <a:t>preliminary</a:t>
-            </a:r>
-            <a:r>
-              <a:rPr lang="zh-CN" altLang="en-US" dirty="0"/>
-              <a:t> </a:t>
-            </a:r>
-            <a:r>
-              <a:rPr lang="en-US" altLang="zh-CN" dirty="0"/>
-              <a:t>experiment</a:t>
-            </a:r>
-            <a:r>
-              <a:rPr lang="zh-CN" altLang="en-US" dirty="0"/>
-              <a:t> </a:t>
-            </a:r>
-            <a:r>
-              <a:rPr lang="en-US" altLang="zh-CN" dirty="0"/>
-              <a:t>shows</a:t>
-            </a:r>
-            <a:r>
-              <a:rPr lang="zh-CN" altLang="en-US" dirty="0"/>
-              <a:t> </a:t>
-            </a:r>
-            <a:r>
-              <a:rPr lang="en-US" altLang="zh-CN" dirty="0"/>
-              <a:t>that:</a:t>
-            </a:r>
-            <a:endParaRPr lang="en-US" altLang="zh-CN" dirty="0"/>
-          </a:p>
-          <a:p>
-            <a:endParaRPr lang="en-US" altLang="zh-CN" sz="1200" dirty="0">
-              <a:latin typeface="Times New Roman" panose="02020603050405020304" pitchFamily="18" charset="0"/>
-              <a:cs typeface="Times New Roman" panose="02020603050405020304" pitchFamily="18" charset="0"/>
-            </a:endParaRPr>
-          </a:p>
-          <a:p>
-            <a:r>
-              <a:rPr lang="en-US" altLang="zh-CN" sz="1200" dirty="0">
-                <a:latin typeface="Times New Roman" panose="02020603050405020304" pitchFamily="18" charset="0"/>
-                <a:cs typeface="Times New Roman" panose="02020603050405020304" pitchFamily="18" charset="0"/>
-              </a:rPr>
-              <a:t>Leveraging stored KV cache for reuse yields</a:t>
-            </a:r>
-            <a:r>
-              <a:rPr lang="zh-CN" altLang="en-US" sz="1200" dirty="0">
-                <a:latin typeface="Times New Roman" panose="02020603050405020304" pitchFamily="18" charset="0"/>
-                <a:cs typeface="Times New Roman" panose="02020603050405020304" pitchFamily="18" charset="0"/>
-              </a:rPr>
-              <a:t> </a:t>
-            </a:r>
-            <a:r>
-              <a:rPr lang="en-US" altLang="zh-CN" sz="1200" dirty="0">
-                <a:latin typeface="Times New Roman" panose="02020603050405020304" pitchFamily="18" charset="0"/>
-                <a:cs typeface="Times New Roman" panose="02020603050405020304" pitchFamily="18" charset="0"/>
-              </a:rPr>
-              <a:t>considerable improvements over re-computation.</a:t>
-            </a:r>
-            <a:endParaRPr lang="en-US" altLang="zh-CN" sz="1200" dirty="0">
-              <a:latin typeface="Times New Roman" panose="02020603050405020304" pitchFamily="18" charset="0"/>
-              <a:cs typeface="Times New Roman" panose="02020603050405020304" pitchFamily="18" charset="0"/>
-            </a:endParaRPr>
-          </a:p>
-          <a:p>
-            <a:endParaRPr lang="en-US" altLang="zh-CN" sz="1200" dirty="0">
-              <a:latin typeface="Times New Roman" panose="02020603050405020304" pitchFamily="18" charset="0"/>
-              <a:cs typeface="Times New Roman" panose="02020603050405020304" pitchFamily="18" charset="0"/>
-            </a:endParaRPr>
-          </a:p>
-          <a:p>
-            <a:r>
               <a:rPr lang="en-US" altLang="zh-CN" b="0" i="0" dirty="0">
                 <a:solidFill>
                   <a:srgbClr val="060607"/>
@@ -4797,17 +4734,17 @@
                 <a:effectLst/>
                 <a:latin typeface="-apple-system"/>
               </a:rPr>
-              <a:t>we find that the </a:t>
-            </a:r>
-            <a:r>
-              <a:rPr lang="en-US" altLang="zh-CN" b="1" i="0" dirty="0">
+              <a:t>we</a:t>
+            </a:r>
+            <a:r>
+              <a:rPr lang="zh-CN" altLang="en-US" b="0" i="0" dirty="0">
                 <a:solidFill>
                   <a:srgbClr val="060607"/>
                 </a:solidFill>
                 <a:effectLst/>
                 <a:latin typeface="-apple-system"/>
               </a:rPr>
-              <a:t>KV cache reuse has the potential to reduce Time to First Token (TTFT) by 30% in scenarios with long context</a:t>
+              <a:t> </a:t>
             </a:r>
             <a:r>
               <a:rPr lang="en-US" altLang="zh-CN" b="0" i="0" dirty="0">
@@ -4817,72 +4754,195 @@
                 <a:effectLst/>
                 <a:latin typeface="-apple-system"/>
               </a:rPr>
-              <a:t>. </a:t>
-            </a:r>
-            <a:endParaRPr lang="en-US" altLang="zh-CN" sz="1200" b="0" i="0" dirty="0">
+              <a:t>use several well-established techniques to handle</a:t>
+            </a:r>
+            <a:r>
+              <a:rPr lang="zh-CN" altLang="en-US" b="0" i="0" dirty="0">
+                <a:solidFill>
+                  <a:srgbClr val="060607"/>
+                </a:solidFill>
+                <a:effectLst/>
+                <a:latin typeface="-apple-system"/>
+              </a:rPr>
+              <a:t> </a:t>
+            </a:r>
+            <a:r>
+              <a:rPr lang="en-US" altLang="zh-CN" b="0" i="0" dirty="0">
+                <a:solidFill>
+                  <a:srgbClr val="060607"/>
+                </a:solidFill>
+                <a:effectLst/>
+                <a:latin typeface="-apple-system"/>
+              </a:rPr>
+              <a:t>the</a:t>
+            </a:r>
+            <a:r>
+              <a:rPr lang="zh-CN" altLang="en-US" b="0" i="0" dirty="0">
+                <a:solidFill>
+                  <a:srgbClr val="060607"/>
+                </a:solidFill>
+                <a:effectLst/>
+                <a:latin typeface="-apple-system"/>
+              </a:rPr>
+              <a:t> </a:t>
+            </a:r>
+            <a:r>
+              <a:rPr lang="en-US" altLang="zh-CN" b="0" i="0" dirty="0">
+                <a:solidFill>
+                  <a:srgbClr val="060607"/>
+                </a:solidFill>
+                <a:effectLst/>
+                <a:latin typeface="-apple-system"/>
+              </a:rPr>
+              <a:t>data</a:t>
+            </a:r>
+            <a:r>
+              <a:rPr lang="zh-CN" altLang="en-US" b="0" i="0" dirty="0">
+                <a:solidFill>
+                  <a:srgbClr val="060607"/>
+                </a:solidFill>
+                <a:effectLst/>
+                <a:latin typeface="-apple-system"/>
+              </a:rPr>
+              <a:t> </a:t>
+            </a:r>
+            <a:r>
+              <a:rPr lang="en-US" altLang="zh-CN" b="0" i="0" dirty="0">
+                <a:solidFill>
+                  <a:srgbClr val="060607"/>
+                </a:solidFill>
+                <a:effectLst/>
+                <a:latin typeface="-apple-system"/>
+              </a:rPr>
+              <a:t>transmission</a:t>
+            </a:r>
+            <a:r>
+              <a:rPr lang="zh-CN" altLang="en-US" b="0" i="0" dirty="0">
+                <a:solidFill>
+                  <a:srgbClr val="060607"/>
+                </a:solidFill>
+                <a:effectLst/>
+                <a:latin typeface="-apple-system"/>
+              </a:rPr>
+              <a:t> </a:t>
+            </a:r>
+            <a:r>
+              <a:rPr lang="en-US" altLang="zh-CN" b="0" i="0" dirty="0">
+                <a:solidFill>
+                  <a:srgbClr val="060607"/>
+                </a:solidFill>
+                <a:effectLst/>
+                <a:latin typeface="-apple-system"/>
+              </a:rPr>
+              <a:t>between</a:t>
+            </a:r>
+            <a:r>
+              <a:rPr lang="zh-CN" altLang="en-US" b="0" i="0" dirty="0">
+                <a:solidFill>
+                  <a:srgbClr val="060607"/>
+                </a:solidFill>
+                <a:effectLst/>
+                <a:latin typeface="-apple-system"/>
+              </a:rPr>
+              <a:t> </a:t>
+            </a:r>
+            <a:r>
+              <a:rPr lang="en-US" altLang="zh-CN" b="0" i="0" dirty="0">
+                <a:solidFill>
+                  <a:srgbClr val="060607"/>
+                </a:solidFill>
+                <a:effectLst/>
+                <a:latin typeface="-apple-system"/>
+              </a:rPr>
+              <a:t>GPU</a:t>
+            </a:r>
+            <a:r>
+              <a:rPr lang="zh-CN" altLang="en-US" b="0" i="0" dirty="0">
+                <a:solidFill>
+                  <a:srgbClr val="060607"/>
+                </a:solidFill>
+                <a:effectLst/>
+                <a:latin typeface="-apple-system"/>
+              </a:rPr>
+              <a:t> </a:t>
+            </a:r>
+            <a:r>
+              <a:rPr lang="en-US" altLang="zh-CN" b="0" i="0" dirty="0">
+                <a:solidFill>
+                  <a:srgbClr val="060607"/>
+                </a:solidFill>
+                <a:effectLst/>
+                <a:latin typeface="-apple-system"/>
+              </a:rPr>
+              <a:t>and</a:t>
+            </a:r>
+            <a:r>
+              <a:rPr lang="zh-CN" altLang="en-US" b="0" i="0" dirty="0">
+                <a:solidFill>
+                  <a:srgbClr val="060607"/>
+                </a:solidFill>
+                <a:effectLst/>
+                <a:latin typeface="-apple-system"/>
+              </a:rPr>
+              <a:t> </a:t>
+            </a:r>
+            <a:r>
+              <a:rPr lang="en-US" altLang="zh-CN" b="0" i="0" dirty="0">
+                <a:solidFill>
+                  <a:srgbClr val="060607"/>
+                </a:solidFill>
+                <a:effectLst/>
+                <a:latin typeface="-apple-system"/>
+              </a:rPr>
+              <a:t>external</a:t>
+            </a:r>
+            <a:r>
+              <a:rPr lang="zh-CN" altLang="en-US" b="0" i="0" dirty="0">
+                <a:solidFill>
+                  <a:srgbClr val="060607"/>
+                </a:solidFill>
+                <a:effectLst/>
+                <a:latin typeface="-apple-system"/>
+              </a:rPr>
+              <a:t> </a:t>
+            </a:r>
+            <a:r>
+              <a:rPr lang="en-US" altLang="zh-CN" b="0" i="0" dirty="0">
+                <a:solidFill>
+                  <a:srgbClr val="060607"/>
+                </a:solidFill>
+                <a:effectLst/>
+                <a:latin typeface="-apple-system"/>
+              </a:rPr>
+              <a:t>memory.</a:t>
+            </a:r>
+            <a:endParaRPr lang="en-US" altLang="zh-CN" b="0" i="0" dirty="0">
               <a:solidFill>
                 <a:srgbClr val="060607"/>
               </a:solidFill>
               <a:effectLst/>
-              <a:latin typeface="Times New Roman" panose="02020603050405020304" pitchFamily="18" charset="0"/>
-              <a:cs typeface="Times New Roman" panose="02020603050405020304" pitchFamily="18" charset="0"/>
+              <a:latin typeface="-apple-system"/>
             </a:endParaRPr>
           </a:p>
           <a:p>
-            <a:endParaRPr lang="en-US" altLang="zh-CN" sz="1200" b="0" i="0" dirty="0">
-              <a:solidFill>
-                <a:srgbClr val="060607"/>
-              </a:solidFill>
-              <a:effectLst/>
-              <a:latin typeface="Times New Roman" panose="02020603050405020304" pitchFamily="18" charset="0"/>
-              <a:cs typeface="Times New Roman" panose="02020603050405020304" pitchFamily="18" charset="0"/>
-            </a:endParaRPr>
-          </a:p>
-          <a:p>
-            <a:r>
-              <a:rPr lang="en-US" altLang="zh-CN" b="0" i="0" dirty="0">
-                <a:solidFill>
-                  <a:srgbClr val="060607"/>
-                </a:solidFill>
-                <a:effectLst/>
-                <a:latin typeface="-apple-system"/>
-              </a:rPr>
-              <a:t>Furthermore, when we look at the performance of our system with the OPT-13B model, the benefits become even more pronounced. </a:t>
-            </a:r>
-            <a:r>
-              <a:rPr lang="en-US" altLang="zh-CN" b="0" i="0">
-                <a:solidFill>
-                  <a:srgbClr val="060607"/>
-                </a:solidFill>
-                <a:effectLst/>
-                <a:latin typeface="-apple-system"/>
-              </a:rPr>
-              <a:t>Here, the reduction in TTFT </a:t>
-            </a:r>
-            <a:r>
-              <a:rPr lang="en-US" altLang="zh-CN" b="1" i="0">
-                <a:solidFill>
-                  <a:srgbClr val="060607"/>
-                </a:solidFill>
-                <a:effectLst/>
-                <a:latin typeface="-apple-system"/>
-              </a:rPr>
-              <a:t>exceeds 60%</a:t>
-            </a:r>
-            <a:r>
-              <a:rPr lang="en-US" altLang="zh-CN" b="0" i="0">
-                <a:solidFill>
-                  <a:srgbClr val="060607"/>
-                </a:solidFill>
-                <a:effectLst/>
-                <a:latin typeface="-apple-system"/>
-              </a:rPr>
-              <a:t>. </a:t>
-            </a:r>
-            <a:endParaRPr lang="en-US" altLang="zh-CN" sz="1200" dirty="0">
-              <a:latin typeface="Times New Roman" panose="02020603050405020304" pitchFamily="18" charset="0"/>
-              <a:cs typeface="Times New Roman" panose="02020603050405020304" pitchFamily="18" charset="0"/>
-            </a:endParaRPr>
+            <a:endParaRPr lang="en-US" dirty="0"/>
+          </a:p>
+          <a:p>
+            <a:r>
+              <a:rPr lang="en-US" dirty="0"/>
+              <a:t>Firstly, we've adopted a layer-based pipeline data loading method. Recognizing that LLM computation occurs layer by layer, this approach allows us to load data in a pipelined fashion. It ensures that while one layer is being processed, the subsequent layer's data is being preloaded. This overlap of data loading and computation significantly reduces idle times and enhances the throughput of our system.</a:t>
+            </a:r>
+            <a:endParaRPr lang="en-US" dirty="0"/>
+          </a:p>
+          <a:p>
+            <a:endParaRPr lang="en-US" dirty="0"/>
+          </a:p>
+          <a:p>
+            <a:r>
+              <a:rPr lang="en-US" dirty="0"/>
+              <a:t>Secondly, we use asynchronous data offloading. This technique is crucial in managing memory usage efficiently. By setting thresholds that trigger offloading when memory utilization approaches capacity, we prevent GPU out-of-memory errors from impacting the inference process. The offloading operation is performed asynchronously, ensuring that it does not disrupt the critical path of our computations.</a:t>
+            </a:r>
+            <a:endParaRPr lang="en-US" dirty="0"/>
           </a:p>
         </p:txBody>
       </p:sp>
@@ -4917,6 +4977,1684 @@
 </file>
 
 <file path=ppt/notesSlides/notesSlide22.xml><?xml version="1.0" encoding="utf-8"?>
+<p:notes xmlns:a="http://schemas.openxmlformats.org/drawingml/2006/main" xmlns:r="http://schemas.openxmlformats.org/officeDocument/2006/relationships" xmlns:p="http://schemas.openxmlformats.org/presentationml/2006/main">
+  <p:cSld>
+    <p:spTree>
+      <p:nvGrpSpPr>
+        <p:cNvPr id="1" name=""/>
+        <p:cNvGrpSpPr/>
+        <p:nvPr/>
+      </p:nvGrpSpPr>
+      <p:grpSpPr>
+        <a:xfrm>
+          <a:off x="0" y="0"/>
+          <a:ext cx="0" cy="0"/>
+          <a:chOff x="0" y="0"/>
+          <a:chExt cx="0" cy="0"/>
+        </a:xfrm>
+      </p:grpSpPr>
+      <p:sp>
+        <p:nvSpPr>
+          <p:cNvPr id="2" name="Slide Image Placeholder 1"/>
+          <p:cNvSpPr>
+            <a:spLocks noGrp="1" noRot="1" noChangeAspect="1"/>
+          </p:cNvSpPr>
+          <p:nvPr>
+            <p:ph type="sldImg"/>
+          </p:nvPr>
+        </p:nvSpPr>
+        <p:spPr/>
+      </p:sp>
+      <p:sp>
+        <p:nvSpPr>
+          <p:cNvPr id="3" name="Notes Placeholder 2"/>
+          <p:cNvSpPr>
+            <a:spLocks noGrp="1"/>
+          </p:cNvSpPr>
+          <p:nvPr>
+            <p:ph type="body" idx="1"/>
+          </p:nvPr>
+        </p:nvSpPr>
+        <p:spPr/>
+        <p:txBody>
+          <a:bodyPr/>
+          <a:lstStyle/>
+          <a:p>
+            <a:r>
+              <a:rPr lang="en-US" altLang="zh-CN" dirty="0"/>
+              <a:t>Finally,</a:t>
+            </a:r>
+            <a:r>
+              <a:rPr lang="zh-CN" altLang="en-US" dirty="0"/>
+              <a:t> </a:t>
+            </a:r>
+            <a:r>
+              <a:rPr lang="en-US" altLang="zh-CN" b="0" i="0" dirty="0">
+                <a:solidFill>
+                  <a:srgbClr val="060607"/>
+                </a:solidFill>
+                <a:effectLst/>
+                <a:latin typeface="-apple-system"/>
+              </a:rPr>
+              <a:t>we</a:t>
+            </a:r>
+            <a:r>
+              <a:rPr lang="zh-CN" altLang="en-US" b="0" i="0" dirty="0">
+                <a:solidFill>
+                  <a:srgbClr val="060607"/>
+                </a:solidFill>
+                <a:effectLst/>
+                <a:latin typeface="-apple-system"/>
+              </a:rPr>
+              <a:t> </a:t>
+            </a:r>
+            <a:r>
+              <a:rPr lang="en-US" altLang="zh-CN" b="0" i="0" dirty="0">
+                <a:solidFill>
+                  <a:srgbClr val="060607"/>
+                </a:solidFill>
+                <a:effectLst/>
+                <a:latin typeface="-apple-system"/>
+              </a:rPr>
+              <a:t>use several well-established techniques to handle</a:t>
+            </a:r>
+            <a:r>
+              <a:rPr lang="zh-CN" altLang="en-US" b="0" i="0" dirty="0">
+                <a:solidFill>
+                  <a:srgbClr val="060607"/>
+                </a:solidFill>
+                <a:effectLst/>
+                <a:latin typeface="-apple-system"/>
+              </a:rPr>
+              <a:t> </a:t>
+            </a:r>
+            <a:r>
+              <a:rPr lang="en-US" altLang="zh-CN" b="0" i="0" dirty="0">
+                <a:solidFill>
+                  <a:srgbClr val="060607"/>
+                </a:solidFill>
+                <a:effectLst/>
+                <a:latin typeface="-apple-system"/>
+              </a:rPr>
+              <a:t>the</a:t>
+            </a:r>
+            <a:r>
+              <a:rPr lang="zh-CN" altLang="en-US" b="0" i="0" dirty="0">
+                <a:solidFill>
+                  <a:srgbClr val="060607"/>
+                </a:solidFill>
+                <a:effectLst/>
+                <a:latin typeface="-apple-system"/>
+              </a:rPr>
+              <a:t> </a:t>
+            </a:r>
+            <a:r>
+              <a:rPr lang="en-US" altLang="zh-CN" b="0" i="0" dirty="0">
+                <a:solidFill>
+                  <a:srgbClr val="060607"/>
+                </a:solidFill>
+                <a:effectLst/>
+                <a:latin typeface="-apple-system"/>
+              </a:rPr>
+              <a:t>data</a:t>
+            </a:r>
+            <a:r>
+              <a:rPr lang="zh-CN" altLang="en-US" b="0" i="0" dirty="0">
+                <a:solidFill>
+                  <a:srgbClr val="060607"/>
+                </a:solidFill>
+                <a:effectLst/>
+                <a:latin typeface="-apple-system"/>
+              </a:rPr>
+              <a:t> </a:t>
+            </a:r>
+            <a:r>
+              <a:rPr lang="en-US" altLang="zh-CN" b="0" i="0" dirty="0">
+                <a:solidFill>
+                  <a:srgbClr val="060607"/>
+                </a:solidFill>
+                <a:effectLst/>
+                <a:latin typeface="-apple-system"/>
+              </a:rPr>
+              <a:t>transmission</a:t>
+            </a:r>
+            <a:r>
+              <a:rPr lang="zh-CN" altLang="en-US" b="0" i="0" dirty="0">
+                <a:solidFill>
+                  <a:srgbClr val="060607"/>
+                </a:solidFill>
+                <a:effectLst/>
+                <a:latin typeface="-apple-system"/>
+              </a:rPr>
+              <a:t> </a:t>
+            </a:r>
+            <a:r>
+              <a:rPr lang="en-US" altLang="zh-CN" b="0" i="0" dirty="0">
+                <a:solidFill>
+                  <a:srgbClr val="060607"/>
+                </a:solidFill>
+                <a:effectLst/>
+                <a:latin typeface="-apple-system"/>
+              </a:rPr>
+              <a:t>between</a:t>
+            </a:r>
+            <a:r>
+              <a:rPr lang="zh-CN" altLang="en-US" b="0" i="0" dirty="0">
+                <a:solidFill>
+                  <a:srgbClr val="060607"/>
+                </a:solidFill>
+                <a:effectLst/>
+                <a:latin typeface="-apple-system"/>
+              </a:rPr>
+              <a:t> </a:t>
+            </a:r>
+            <a:r>
+              <a:rPr lang="en-US" altLang="zh-CN" b="0" i="0" dirty="0">
+                <a:solidFill>
+                  <a:srgbClr val="060607"/>
+                </a:solidFill>
+                <a:effectLst/>
+                <a:latin typeface="-apple-system"/>
+              </a:rPr>
+              <a:t>GPU</a:t>
+            </a:r>
+            <a:r>
+              <a:rPr lang="zh-CN" altLang="en-US" b="0" i="0" dirty="0">
+                <a:solidFill>
+                  <a:srgbClr val="060607"/>
+                </a:solidFill>
+                <a:effectLst/>
+                <a:latin typeface="-apple-system"/>
+              </a:rPr>
+              <a:t> </a:t>
+            </a:r>
+            <a:r>
+              <a:rPr lang="en-US" altLang="zh-CN" b="0" i="0" dirty="0">
+                <a:solidFill>
+                  <a:srgbClr val="060607"/>
+                </a:solidFill>
+                <a:effectLst/>
+                <a:latin typeface="-apple-system"/>
+              </a:rPr>
+              <a:t>and</a:t>
+            </a:r>
+            <a:r>
+              <a:rPr lang="zh-CN" altLang="en-US" b="0" i="0" dirty="0">
+                <a:solidFill>
+                  <a:srgbClr val="060607"/>
+                </a:solidFill>
+                <a:effectLst/>
+                <a:latin typeface="-apple-system"/>
+              </a:rPr>
+              <a:t> </a:t>
+            </a:r>
+            <a:r>
+              <a:rPr lang="en-US" altLang="zh-CN" b="0" i="0" dirty="0">
+                <a:solidFill>
+                  <a:srgbClr val="060607"/>
+                </a:solidFill>
+                <a:effectLst/>
+                <a:latin typeface="-apple-system"/>
+              </a:rPr>
+              <a:t>external</a:t>
+            </a:r>
+            <a:r>
+              <a:rPr lang="zh-CN" altLang="en-US" b="0" i="0" dirty="0">
+                <a:solidFill>
+                  <a:srgbClr val="060607"/>
+                </a:solidFill>
+                <a:effectLst/>
+                <a:latin typeface="-apple-system"/>
+              </a:rPr>
+              <a:t> </a:t>
+            </a:r>
+            <a:r>
+              <a:rPr lang="en-US" altLang="zh-CN" b="0" i="0" dirty="0">
+                <a:solidFill>
+                  <a:srgbClr val="060607"/>
+                </a:solidFill>
+                <a:effectLst/>
+                <a:latin typeface="-apple-system"/>
+              </a:rPr>
+              <a:t>memory.</a:t>
+            </a:r>
+            <a:endParaRPr lang="en-US" altLang="zh-CN" b="0" i="0" dirty="0">
+              <a:solidFill>
+                <a:srgbClr val="060607"/>
+              </a:solidFill>
+              <a:effectLst/>
+              <a:latin typeface="-apple-system"/>
+            </a:endParaRPr>
+          </a:p>
+          <a:p>
+            <a:endParaRPr lang="en-US" dirty="0"/>
+          </a:p>
+          <a:p>
+            <a:r>
+              <a:rPr lang="en-US" dirty="0"/>
+              <a:t>Firstly, we've adopted a layer-based pipeline data loading method. Recognizing that LLM computation occurs layer by layer, this approach allows us to load data in a pipelined fashion. It ensures that while one layer is being processed, the subsequent layer's data is being preloaded. This overlap of data loading and computation significantly reduces idle times and enhances the throughput of our system.</a:t>
+            </a:r>
+            <a:endParaRPr lang="en-US" dirty="0"/>
+          </a:p>
+          <a:p>
+            <a:endParaRPr lang="en-US" dirty="0"/>
+          </a:p>
+          <a:p>
+            <a:r>
+              <a:rPr lang="en-US" dirty="0"/>
+              <a:t>Secondly, we use asynchronous data offloading. This technique is crucial in managing memory usage efficiently. By setting thresholds that trigger offloading when memory utilization approaches capacity, we prevent GPU out-of-memory errors from impacting the inference process. The offloading operation is performed asynchronously, ensuring that it does not disrupt the critical path of our computations.</a:t>
+            </a:r>
+            <a:endParaRPr lang="en-US" dirty="0"/>
+          </a:p>
+        </p:txBody>
+      </p:sp>
+      <p:sp>
+        <p:nvSpPr>
+          <p:cNvPr id="4" name="Slide Number Placeholder 3"/>
+          <p:cNvSpPr>
+            <a:spLocks noGrp="1"/>
+          </p:cNvSpPr>
+          <p:nvPr>
+            <p:ph type="sldNum" sz="quarter" idx="10"/>
+          </p:nvPr>
+        </p:nvSpPr>
+        <p:spPr/>
+        <p:txBody>
+          <a:bodyPr/>
+          <a:lstStyle/>
+          <a:p>
+            <a:fld id="{F7021451-1387-4CA6-816F-3879F97B5CBC}" type="slidenum">
+              <a:rPr lang="en-US"/>
+            </a:fld>
+            <a:endParaRPr lang="en-US"/>
+          </a:p>
+        </p:txBody>
+      </p:sp>
+    </p:spTree>
+  </p:cSld>
+  <p:clrMapOvr>
+    <a:masterClrMapping/>
+  </p:clrMapOvr>
+</p:notes>
+</file>
+
+<file path=ppt/notesSlides/notesSlide23.xml><?xml version="1.0" encoding="utf-8"?>
+<p:notes xmlns:a="http://schemas.openxmlformats.org/drawingml/2006/main" xmlns:r="http://schemas.openxmlformats.org/officeDocument/2006/relationships" xmlns:p="http://schemas.openxmlformats.org/presentationml/2006/main">
+  <p:cSld>
+    <p:spTree>
+      <p:nvGrpSpPr>
+        <p:cNvPr id="1" name=""/>
+        <p:cNvGrpSpPr/>
+        <p:nvPr/>
+      </p:nvGrpSpPr>
+      <p:grpSpPr>
+        <a:xfrm>
+          <a:off x="0" y="0"/>
+          <a:ext cx="0" cy="0"/>
+          <a:chOff x="0" y="0"/>
+          <a:chExt cx="0" cy="0"/>
+        </a:xfrm>
+      </p:grpSpPr>
+      <p:sp>
+        <p:nvSpPr>
+          <p:cNvPr id="2" name="Slide Image Placeholder 1"/>
+          <p:cNvSpPr>
+            <a:spLocks noGrp="1" noRot="1" noChangeAspect="1"/>
+          </p:cNvSpPr>
+          <p:nvPr>
+            <p:ph type="sldImg"/>
+          </p:nvPr>
+        </p:nvSpPr>
+        <p:spPr/>
+      </p:sp>
+      <p:sp>
+        <p:nvSpPr>
+          <p:cNvPr id="3" name="Notes Placeholder 2"/>
+          <p:cNvSpPr>
+            <a:spLocks noGrp="1"/>
+          </p:cNvSpPr>
+          <p:nvPr>
+            <p:ph type="body" idx="1"/>
+          </p:nvPr>
+        </p:nvSpPr>
+        <p:spPr/>
+        <p:txBody>
+          <a:bodyPr/>
+          <a:lstStyle/>
+          <a:p>
+            <a:r>
+              <a:rPr lang="en-US" altLang="zh-CN" dirty="0"/>
+              <a:t>Finally,</a:t>
+            </a:r>
+            <a:r>
+              <a:rPr lang="zh-CN" altLang="en-US" dirty="0"/>
+              <a:t> </a:t>
+            </a:r>
+            <a:r>
+              <a:rPr lang="en-US" altLang="zh-CN" b="0" i="0" dirty="0">
+                <a:solidFill>
+                  <a:srgbClr val="060607"/>
+                </a:solidFill>
+                <a:effectLst/>
+                <a:latin typeface="-apple-system"/>
+              </a:rPr>
+              <a:t>we</a:t>
+            </a:r>
+            <a:r>
+              <a:rPr lang="zh-CN" altLang="en-US" b="0" i="0" dirty="0">
+                <a:solidFill>
+                  <a:srgbClr val="060607"/>
+                </a:solidFill>
+                <a:effectLst/>
+                <a:latin typeface="-apple-system"/>
+              </a:rPr>
+              <a:t> </a:t>
+            </a:r>
+            <a:r>
+              <a:rPr lang="en-US" altLang="zh-CN" b="0" i="0" dirty="0">
+                <a:solidFill>
+                  <a:srgbClr val="060607"/>
+                </a:solidFill>
+                <a:effectLst/>
+                <a:latin typeface="-apple-system"/>
+              </a:rPr>
+              <a:t>use several well-established techniques to handle</a:t>
+            </a:r>
+            <a:r>
+              <a:rPr lang="zh-CN" altLang="en-US" b="0" i="0" dirty="0">
+                <a:solidFill>
+                  <a:srgbClr val="060607"/>
+                </a:solidFill>
+                <a:effectLst/>
+                <a:latin typeface="-apple-system"/>
+              </a:rPr>
+              <a:t> </a:t>
+            </a:r>
+            <a:r>
+              <a:rPr lang="en-US" altLang="zh-CN" b="0" i="0" dirty="0">
+                <a:solidFill>
+                  <a:srgbClr val="060607"/>
+                </a:solidFill>
+                <a:effectLst/>
+                <a:latin typeface="-apple-system"/>
+              </a:rPr>
+              <a:t>the</a:t>
+            </a:r>
+            <a:r>
+              <a:rPr lang="zh-CN" altLang="en-US" b="0" i="0" dirty="0">
+                <a:solidFill>
+                  <a:srgbClr val="060607"/>
+                </a:solidFill>
+                <a:effectLst/>
+                <a:latin typeface="-apple-system"/>
+              </a:rPr>
+              <a:t> </a:t>
+            </a:r>
+            <a:r>
+              <a:rPr lang="en-US" altLang="zh-CN" b="0" i="0" dirty="0">
+                <a:solidFill>
+                  <a:srgbClr val="060607"/>
+                </a:solidFill>
+                <a:effectLst/>
+                <a:latin typeface="-apple-system"/>
+              </a:rPr>
+              <a:t>data</a:t>
+            </a:r>
+            <a:r>
+              <a:rPr lang="zh-CN" altLang="en-US" b="0" i="0" dirty="0">
+                <a:solidFill>
+                  <a:srgbClr val="060607"/>
+                </a:solidFill>
+                <a:effectLst/>
+                <a:latin typeface="-apple-system"/>
+              </a:rPr>
+              <a:t> </a:t>
+            </a:r>
+            <a:r>
+              <a:rPr lang="en-US" altLang="zh-CN" b="0" i="0" dirty="0">
+                <a:solidFill>
+                  <a:srgbClr val="060607"/>
+                </a:solidFill>
+                <a:effectLst/>
+                <a:latin typeface="-apple-system"/>
+              </a:rPr>
+              <a:t>transmission</a:t>
+            </a:r>
+            <a:r>
+              <a:rPr lang="zh-CN" altLang="en-US" b="0" i="0" dirty="0">
+                <a:solidFill>
+                  <a:srgbClr val="060607"/>
+                </a:solidFill>
+                <a:effectLst/>
+                <a:latin typeface="-apple-system"/>
+              </a:rPr>
+              <a:t> </a:t>
+            </a:r>
+            <a:r>
+              <a:rPr lang="en-US" altLang="zh-CN" b="0" i="0" dirty="0">
+                <a:solidFill>
+                  <a:srgbClr val="060607"/>
+                </a:solidFill>
+                <a:effectLst/>
+                <a:latin typeface="-apple-system"/>
+              </a:rPr>
+              <a:t>between</a:t>
+            </a:r>
+            <a:r>
+              <a:rPr lang="zh-CN" altLang="en-US" b="0" i="0" dirty="0">
+                <a:solidFill>
+                  <a:srgbClr val="060607"/>
+                </a:solidFill>
+                <a:effectLst/>
+                <a:latin typeface="-apple-system"/>
+              </a:rPr>
+              <a:t> </a:t>
+            </a:r>
+            <a:r>
+              <a:rPr lang="en-US" altLang="zh-CN" b="0" i="0" dirty="0">
+                <a:solidFill>
+                  <a:srgbClr val="060607"/>
+                </a:solidFill>
+                <a:effectLst/>
+                <a:latin typeface="-apple-system"/>
+              </a:rPr>
+              <a:t>GPU</a:t>
+            </a:r>
+            <a:r>
+              <a:rPr lang="zh-CN" altLang="en-US" b="0" i="0" dirty="0">
+                <a:solidFill>
+                  <a:srgbClr val="060607"/>
+                </a:solidFill>
+                <a:effectLst/>
+                <a:latin typeface="-apple-system"/>
+              </a:rPr>
+              <a:t> </a:t>
+            </a:r>
+            <a:r>
+              <a:rPr lang="en-US" altLang="zh-CN" b="0" i="0" dirty="0">
+                <a:solidFill>
+                  <a:srgbClr val="060607"/>
+                </a:solidFill>
+                <a:effectLst/>
+                <a:latin typeface="-apple-system"/>
+              </a:rPr>
+              <a:t>and</a:t>
+            </a:r>
+            <a:r>
+              <a:rPr lang="zh-CN" altLang="en-US" b="0" i="0" dirty="0">
+                <a:solidFill>
+                  <a:srgbClr val="060607"/>
+                </a:solidFill>
+                <a:effectLst/>
+                <a:latin typeface="-apple-system"/>
+              </a:rPr>
+              <a:t> </a:t>
+            </a:r>
+            <a:r>
+              <a:rPr lang="en-US" altLang="zh-CN" b="0" i="0" dirty="0">
+                <a:solidFill>
+                  <a:srgbClr val="060607"/>
+                </a:solidFill>
+                <a:effectLst/>
+                <a:latin typeface="-apple-system"/>
+              </a:rPr>
+              <a:t>external</a:t>
+            </a:r>
+            <a:r>
+              <a:rPr lang="zh-CN" altLang="en-US" b="0" i="0" dirty="0">
+                <a:solidFill>
+                  <a:srgbClr val="060607"/>
+                </a:solidFill>
+                <a:effectLst/>
+                <a:latin typeface="-apple-system"/>
+              </a:rPr>
+              <a:t> </a:t>
+            </a:r>
+            <a:r>
+              <a:rPr lang="en-US" altLang="zh-CN" b="0" i="0" dirty="0">
+                <a:solidFill>
+                  <a:srgbClr val="060607"/>
+                </a:solidFill>
+                <a:effectLst/>
+                <a:latin typeface="-apple-system"/>
+              </a:rPr>
+              <a:t>memory.</a:t>
+            </a:r>
+            <a:endParaRPr lang="en-US" altLang="zh-CN" b="0" i="0" dirty="0">
+              <a:solidFill>
+                <a:srgbClr val="060607"/>
+              </a:solidFill>
+              <a:effectLst/>
+              <a:latin typeface="-apple-system"/>
+            </a:endParaRPr>
+          </a:p>
+          <a:p>
+            <a:endParaRPr lang="en-US" dirty="0"/>
+          </a:p>
+          <a:p>
+            <a:r>
+              <a:rPr lang="en-US" dirty="0"/>
+              <a:t>Firstly, we've adopted a layer-based pipeline data loading method. Recognizing that LLM computation occurs layer by layer, this approach allows us to load data in a pipelined fashion. It ensures that while one layer is being processed, the subsequent layer's data is being preloaded. This overlap of data loading and computation significantly reduces idle times and enhances the throughput of our system.</a:t>
+            </a:r>
+            <a:endParaRPr lang="en-US" dirty="0"/>
+          </a:p>
+          <a:p>
+            <a:endParaRPr lang="en-US" dirty="0"/>
+          </a:p>
+          <a:p>
+            <a:r>
+              <a:rPr lang="en-US" dirty="0"/>
+              <a:t>Secondly, we use asynchronous data offloading. This technique is crucial in managing memory usage efficiently. By setting thresholds that trigger offloading when memory utilization approaches capacity, we prevent GPU out-of-memory errors from impacting the inference process. The offloading operation is performed asynchronously, ensuring that it does not disrupt the critical path of our computations.</a:t>
+            </a:r>
+            <a:endParaRPr lang="en-US" dirty="0"/>
+          </a:p>
+        </p:txBody>
+      </p:sp>
+      <p:sp>
+        <p:nvSpPr>
+          <p:cNvPr id="4" name="Slide Number Placeholder 3"/>
+          <p:cNvSpPr>
+            <a:spLocks noGrp="1"/>
+          </p:cNvSpPr>
+          <p:nvPr>
+            <p:ph type="sldNum" sz="quarter" idx="10"/>
+          </p:nvPr>
+        </p:nvSpPr>
+        <p:spPr/>
+        <p:txBody>
+          <a:bodyPr/>
+          <a:lstStyle/>
+          <a:p>
+            <a:fld id="{F7021451-1387-4CA6-816F-3879F97B5CBC}" type="slidenum">
+              <a:rPr lang="en-US"/>
+            </a:fld>
+            <a:endParaRPr lang="en-US"/>
+          </a:p>
+        </p:txBody>
+      </p:sp>
+    </p:spTree>
+  </p:cSld>
+  <p:clrMapOvr>
+    <a:masterClrMapping/>
+  </p:clrMapOvr>
+</p:notes>
+</file>
+
+<file path=ppt/notesSlides/notesSlide24.xml><?xml version="1.0" encoding="utf-8"?>
+<p:notes xmlns:a="http://schemas.openxmlformats.org/drawingml/2006/main" xmlns:r="http://schemas.openxmlformats.org/officeDocument/2006/relationships" xmlns:p="http://schemas.openxmlformats.org/presentationml/2006/main">
+  <p:cSld>
+    <p:spTree>
+      <p:nvGrpSpPr>
+        <p:cNvPr id="1" name=""/>
+        <p:cNvGrpSpPr/>
+        <p:nvPr/>
+      </p:nvGrpSpPr>
+      <p:grpSpPr>
+        <a:xfrm>
+          <a:off x="0" y="0"/>
+          <a:ext cx="0" cy="0"/>
+          <a:chOff x="0" y="0"/>
+          <a:chExt cx="0" cy="0"/>
+        </a:xfrm>
+      </p:grpSpPr>
+      <p:sp>
+        <p:nvSpPr>
+          <p:cNvPr id="2" name="Slide Image Placeholder 1"/>
+          <p:cNvSpPr>
+            <a:spLocks noGrp="1" noRot="1" noChangeAspect="1"/>
+          </p:cNvSpPr>
+          <p:nvPr>
+            <p:ph type="sldImg"/>
+          </p:nvPr>
+        </p:nvSpPr>
+        <p:spPr/>
+      </p:sp>
+      <p:sp>
+        <p:nvSpPr>
+          <p:cNvPr id="3" name="Notes Placeholder 2"/>
+          <p:cNvSpPr>
+            <a:spLocks noGrp="1"/>
+          </p:cNvSpPr>
+          <p:nvPr>
+            <p:ph type="body" idx="1"/>
+          </p:nvPr>
+        </p:nvSpPr>
+        <p:spPr/>
+        <p:txBody>
+          <a:bodyPr/>
+          <a:lstStyle/>
+          <a:p>
+            <a:endParaRPr lang="en-US" dirty="0"/>
+          </a:p>
+        </p:txBody>
+      </p:sp>
+      <p:sp>
+        <p:nvSpPr>
+          <p:cNvPr id="4" name="Slide Number Placeholder 3"/>
+          <p:cNvSpPr>
+            <a:spLocks noGrp="1"/>
+          </p:cNvSpPr>
+          <p:nvPr>
+            <p:ph type="sldNum" sz="quarter" idx="10"/>
+          </p:nvPr>
+        </p:nvSpPr>
+        <p:spPr/>
+        <p:txBody>
+          <a:bodyPr/>
+          <a:lstStyle/>
+          <a:p>
+            <a:fld id="{F7021451-1387-4CA6-816F-3879F97B5CBC}" type="slidenum">
+              <a:rPr lang="en-US"/>
+            </a:fld>
+            <a:endParaRPr lang="en-US"/>
+          </a:p>
+        </p:txBody>
+      </p:sp>
+    </p:spTree>
+  </p:cSld>
+  <p:clrMapOvr>
+    <a:masterClrMapping/>
+  </p:clrMapOvr>
+</p:notes>
+</file>
+
+<file path=ppt/notesSlides/notesSlide25.xml><?xml version="1.0" encoding="utf-8"?>
+<p:notes xmlns:a="http://schemas.openxmlformats.org/drawingml/2006/main" xmlns:r="http://schemas.openxmlformats.org/officeDocument/2006/relationships" xmlns:p="http://schemas.openxmlformats.org/presentationml/2006/main">
+  <p:cSld>
+    <p:spTree>
+      <p:nvGrpSpPr>
+        <p:cNvPr id="1" name=""/>
+        <p:cNvGrpSpPr/>
+        <p:nvPr/>
+      </p:nvGrpSpPr>
+      <p:grpSpPr>
+        <a:xfrm>
+          <a:off x="0" y="0"/>
+          <a:ext cx="0" cy="0"/>
+          <a:chOff x="0" y="0"/>
+          <a:chExt cx="0" cy="0"/>
+        </a:xfrm>
+      </p:grpSpPr>
+      <p:sp>
+        <p:nvSpPr>
+          <p:cNvPr id="2" name="Slide Image Placeholder 1"/>
+          <p:cNvSpPr>
+            <a:spLocks noGrp="1" noRot="1" noChangeAspect="1"/>
+          </p:cNvSpPr>
+          <p:nvPr>
+            <p:ph type="sldImg"/>
+          </p:nvPr>
+        </p:nvSpPr>
+        <p:spPr/>
+      </p:sp>
+      <p:sp>
+        <p:nvSpPr>
+          <p:cNvPr id="3" name="Notes Placeholder 2"/>
+          <p:cNvSpPr>
+            <a:spLocks noGrp="1"/>
+          </p:cNvSpPr>
+          <p:nvPr>
+            <p:ph type="body" idx="1"/>
+          </p:nvPr>
+        </p:nvSpPr>
+        <p:spPr/>
+        <p:txBody>
+          <a:bodyPr/>
+          <a:lstStyle/>
+          <a:p>
+            <a:r>
+              <a:rPr lang="en-US" altLang="zh-CN" dirty="0"/>
+              <a:t>Our</a:t>
+            </a:r>
+            <a:r>
+              <a:rPr lang="zh-CN" altLang="en-US" dirty="0"/>
+              <a:t> </a:t>
+            </a:r>
+            <a:r>
+              <a:rPr lang="en-US" altLang="zh-CN" dirty="0"/>
+              <a:t>preliminary</a:t>
+            </a:r>
+            <a:r>
+              <a:rPr lang="zh-CN" altLang="en-US" dirty="0"/>
+              <a:t> </a:t>
+            </a:r>
+            <a:r>
+              <a:rPr lang="en-US" altLang="zh-CN" dirty="0"/>
+              <a:t>experiment</a:t>
+            </a:r>
+            <a:r>
+              <a:rPr lang="zh-CN" altLang="en-US" dirty="0"/>
+              <a:t> </a:t>
+            </a:r>
+            <a:r>
+              <a:rPr lang="en-US" altLang="zh-CN" dirty="0"/>
+              <a:t>shows</a:t>
+            </a:r>
+            <a:r>
+              <a:rPr lang="zh-CN" altLang="en-US" dirty="0"/>
+              <a:t> </a:t>
+            </a:r>
+            <a:r>
+              <a:rPr lang="en-US" altLang="zh-CN" dirty="0"/>
+              <a:t>that:</a:t>
+            </a:r>
+            <a:endParaRPr lang="en-US" altLang="zh-CN" dirty="0"/>
+          </a:p>
+          <a:p>
+            <a:endParaRPr lang="en-US" altLang="zh-CN" sz="1200" dirty="0">
+              <a:latin typeface="Times New Roman" panose="02020603050405020304" pitchFamily="18" charset="0"/>
+              <a:cs typeface="Times New Roman" panose="02020603050405020304" pitchFamily="18" charset="0"/>
+            </a:endParaRPr>
+          </a:p>
+          <a:p>
+            <a:r>
+              <a:rPr lang="en-US" altLang="zh-CN" sz="1200" dirty="0">
+                <a:latin typeface="Times New Roman" panose="02020603050405020304" pitchFamily="18" charset="0"/>
+                <a:cs typeface="Times New Roman" panose="02020603050405020304" pitchFamily="18" charset="0"/>
+              </a:rPr>
+              <a:t>Leveraging stored KV cache for reuse yields</a:t>
+            </a:r>
+            <a:r>
+              <a:rPr lang="zh-CN" altLang="en-US" sz="1200" dirty="0">
+                <a:latin typeface="Times New Roman" panose="02020603050405020304" pitchFamily="18" charset="0"/>
+                <a:cs typeface="Times New Roman" panose="02020603050405020304" pitchFamily="18" charset="0"/>
+              </a:rPr>
+              <a:t> </a:t>
+            </a:r>
+            <a:r>
+              <a:rPr lang="en-US" altLang="zh-CN" sz="1200" dirty="0">
+                <a:latin typeface="Times New Roman" panose="02020603050405020304" pitchFamily="18" charset="0"/>
+                <a:cs typeface="Times New Roman" panose="02020603050405020304" pitchFamily="18" charset="0"/>
+              </a:rPr>
+              <a:t>considerable improvements over re-computation.</a:t>
+            </a:r>
+            <a:endParaRPr lang="en-US" altLang="zh-CN" sz="1200" dirty="0">
+              <a:latin typeface="Times New Roman" panose="02020603050405020304" pitchFamily="18" charset="0"/>
+              <a:cs typeface="Times New Roman" panose="02020603050405020304" pitchFamily="18" charset="0"/>
+            </a:endParaRPr>
+          </a:p>
+          <a:p>
+            <a:endParaRPr lang="en-US" altLang="zh-CN" sz="1200" dirty="0">
+              <a:latin typeface="Times New Roman" panose="02020603050405020304" pitchFamily="18" charset="0"/>
+              <a:cs typeface="Times New Roman" panose="02020603050405020304" pitchFamily="18" charset="0"/>
+            </a:endParaRPr>
+          </a:p>
+          <a:p>
+            <a:r>
+              <a:rPr lang="en-US" altLang="zh-CN" b="0" i="0" dirty="0">
+                <a:solidFill>
+                  <a:srgbClr val="060607"/>
+                </a:solidFill>
+                <a:effectLst/>
+                <a:latin typeface="-apple-system"/>
+              </a:rPr>
+              <a:t>we find that the </a:t>
+            </a:r>
+            <a:r>
+              <a:rPr lang="en-US" altLang="zh-CN" b="1" i="0" dirty="0">
+                <a:solidFill>
+                  <a:srgbClr val="060607"/>
+                </a:solidFill>
+                <a:effectLst/>
+                <a:latin typeface="-apple-system"/>
+              </a:rPr>
+              <a:t>KV cache reuse has the potential to reduce Time to First Token (TTFT) by 30% in scenarios with long context</a:t>
+            </a:r>
+            <a:r>
+              <a:rPr lang="en-US" altLang="zh-CN" b="0" i="0" dirty="0">
+                <a:solidFill>
+                  <a:srgbClr val="060607"/>
+                </a:solidFill>
+                <a:effectLst/>
+                <a:latin typeface="-apple-system"/>
+              </a:rPr>
+              <a:t>. </a:t>
+            </a:r>
+            <a:endParaRPr lang="en-US" altLang="zh-CN" sz="1200" b="0" i="0" dirty="0">
+              <a:solidFill>
+                <a:srgbClr val="060607"/>
+              </a:solidFill>
+              <a:effectLst/>
+              <a:latin typeface="Times New Roman" panose="02020603050405020304" pitchFamily="18" charset="0"/>
+              <a:cs typeface="Times New Roman" panose="02020603050405020304" pitchFamily="18" charset="0"/>
+            </a:endParaRPr>
+          </a:p>
+          <a:p>
+            <a:endParaRPr lang="en-US" altLang="zh-CN" sz="1200" b="0" i="0" dirty="0">
+              <a:solidFill>
+                <a:srgbClr val="060607"/>
+              </a:solidFill>
+              <a:effectLst/>
+              <a:latin typeface="Times New Roman" panose="02020603050405020304" pitchFamily="18" charset="0"/>
+              <a:cs typeface="Times New Roman" panose="02020603050405020304" pitchFamily="18" charset="0"/>
+            </a:endParaRPr>
+          </a:p>
+          <a:p>
+            <a:r>
+              <a:rPr lang="en-US" altLang="zh-CN" b="0" i="0" dirty="0">
+                <a:solidFill>
+                  <a:srgbClr val="060607"/>
+                </a:solidFill>
+                <a:effectLst/>
+                <a:latin typeface="-apple-system"/>
+              </a:rPr>
+              <a:t>Furthermore, when we look at the performance of our system with the OPT-13B model, the benefits become even more pronounced. </a:t>
+            </a:r>
+            <a:r>
+              <a:rPr lang="en-US" altLang="zh-CN" b="0" i="0">
+                <a:solidFill>
+                  <a:srgbClr val="060607"/>
+                </a:solidFill>
+                <a:effectLst/>
+                <a:latin typeface="-apple-system"/>
+              </a:rPr>
+              <a:t>Here, the reduction in TTFT </a:t>
+            </a:r>
+            <a:r>
+              <a:rPr lang="en-US" altLang="zh-CN" b="1" i="0">
+                <a:solidFill>
+                  <a:srgbClr val="060607"/>
+                </a:solidFill>
+                <a:effectLst/>
+                <a:latin typeface="-apple-system"/>
+              </a:rPr>
+              <a:t>exceeds 60%</a:t>
+            </a:r>
+            <a:r>
+              <a:rPr lang="en-US" altLang="zh-CN" b="0" i="0">
+                <a:solidFill>
+                  <a:srgbClr val="060607"/>
+                </a:solidFill>
+                <a:effectLst/>
+                <a:latin typeface="-apple-system"/>
+              </a:rPr>
+              <a:t>. </a:t>
+            </a:r>
+            <a:endParaRPr lang="en-US" altLang="zh-CN" sz="1200" dirty="0">
+              <a:latin typeface="Times New Roman" panose="02020603050405020304" pitchFamily="18" charset="0"/>
+              <a:cs typeface="Times New Roman" panose="02020603050405020304" pitchFamily="18" charset="0"/>
+            </a:endParaRPr>
+          </a:p>
+        </p:txBody>
+      </p:sp>
+      <p:sp>
+        <p:nvSpPr>
+          <p:cNvPr id="4" name="Slide Number Placeholder 3"/>
+          <p:cNvSpPr>
+            <a:spLocks noGrp="1"/>
+          </p:cNvSpPr>
+          <p:nvPr>
+            <p:ph type="sldNum" sz="quarter" idx="10"/>
+          </p:nvPr>
+        </p:nvSpPr>
+        <p:spPr/>
+        <p:txBody>
+          <a:bodyPr/>
+          <a:lstStyle/>
+          <a:p>
+            <a:fld id="{F7021451-1387-4CA6-816F-3879F97B5CBC}" type="slidenum">
+              <a:rPr lang="en-US"/>
+            </a:fld>
+            <a:endParaRPr lang="en-US"/>
+          </a:p>
+        </p:txBody>
+      </p:sp>
+    </p:spTree>
+  </p:cSld>
+  <p:clrMapOvr>
+    <a:masterClrMapping/>
+  </p:clrMapOvr>
+</p:notes>
+</file>
+
+<file path=ppt/notesSlides/notesSlide26.xml><?xml version="1.0" encoding="utf-8"?>
+<p:notes xmlns:a="http://schemas.openxmlformats.org/drawingml/2006/main" xmlns:r="http://schemas.openxmlformats.org/officeDocument/2006/relationships" xmlns:p="http://schemas.openxmlformats.org/presentationml/2006/main">
+  <p:cSld>
+    <p:spTree>
+      <p:nvGrpSpPr>
+        <p:cNvPr id="1" name=""/>
+        <p:cNvGrpSpPr/>
+        <p:nvPr/>
+      </p:nvGrpSpPr>
+      <p:grpSpPr>
+        <a:xfrm>
+          <a:off x="0" y="0"/>
+          <a:ext cx="0" cy="0"/>
+          <a:chOff x="0" y="0"/>
+          <a:chExt cx="0" cy="0"/>
+        </a:xfrm>
+      </p:grpSpPr>
+      <p:sp>
+        <p:nvSpPr>
+          <p:cNvPr id="2" name="Slide Image Placeholder 1"/>
+          <p:cNvSpPr>
+            <a:spLocks noGrp="1" noRot="1" noChangeAspect="1"/>
+          </p:cNvSpPr>
+          <p:nvPr>
+            <p:ph type="sldImg"/>
+          </p:nvPr>
+        </p:nvSpPr>
+        <p:spPr/>
+      </p:sp>
+      <p:sp>
+        <p:nvSpPr>
+          <p:cNvPr id="3" name="Notes Placeholder 2"/>
+          <p:cNvSpPr>
+            <a:spLocks noGrp="1"/>
+          </p:cNvSpPr>
+          <p:nvPr>
+            <p:ph type="body" idx="1"/>
+          </p:nvPr>
+        </p:nvSpPr>
+        <p:spPr/>
+        <p:txBody>
+          <a:bodyPr/>
+          <a:lstStyle/>
+          <a:p>
+            <a:r>
+              <a:rPr lang="en-US" altLang="zh-CN" dirty="0"/>
+              <a:t>Our</a:t>
+            </a:r>
+            <a:r>
+              <a:rPr lang="zh-CN" altLang="en-US" dirty="0"/>
+              <a:t> </a:t>
+            </a:r>
+            <a:r>
+              <a:rPr lang="en-US" altLang="zh-CN" dirty="0"/>
+              <a:t>preliminary</a:t>
+            </a:r>
+            <a:r>
+              <a:rPr lang="zh-CN" altLang="en-US" dirty="0"/>
+              <a:t> </a:t>
+            </a:r>
+            <a:r>
+              <a:rPr lang="en-US" altLang="zh-CN" dirty="0"/>
+              <a:t>experiment</a:t>
+            </a:r>
+            <a:r>
+              <a:rPr lang="zh-CN" altLang="en-US" dirty="0"/>
+              <a:t> </a:t>
+            </a:r>
+            <a:r>
+              <a:rPr lang="en-US" altLang="zh-CN" dirty="0"/>
+              <a:t>shows</a:t>
+            </a:r>
+            <a:r>
+              <a:rPr lang="zh-CN" altLang="en-US" dirty="0"/>
+              <a:t> </a:t>
+            </a:r>
+            <a:r>
+              <a:rPr lang="en-US" altLang="zh-CN" dirty="0"/>
+              <a:t>that:</a:t>
+            </a:r>
+            <a:endParaRPr lang="en-US" altLang="zh-CN" dirty="0"/>
+          </a:p>
+          <a:p>
+            <a:endParaRPr lang="en-US" altLang="zh-CN" sz="1200" dirty="0">
+              <a:latin typeface="Times New Roman" panose="02020603050405020304" pitchFamily="18" charset="0"/>
+              <a:cs typeface="Times New Roman" panose="02020603050405020304" pitchFamily="18" charset="0"/>
+            </a:endParaRPr>
+          </a:p>
+          <a:p>
+            <a:r>
+              <a:rPr lang="en-US" altLang="zh-CN" sz="1200" dirty="0">
+                <a:latin typeface="Times New Roman" panose="02020603050405020304" pitchFamily="18" charset="0"/>
+                <a:cs typeface="Times New Roman" panose="02020603050405020304" pitchFamily="18" charset="0"/>
+              </a:rPr>
+              <a:t>Leveraging stored KV cache for reuse yields</a:t>
+            </a:r>
+            <a:r>
+              <a:rPr lang="zh-CN" altLang="en-US" sz="1200" dirty="0">
+                <a:latin typeface="Times New Roman" panose="02020603050405020304" pitchFamily="18" charset="0"/>
+                <a:cs typeface="Times New Roman" panose="02020603050405020304" pitchFamily="18" charset="0"/>
+              </a:rPr>
+              <a:t> </a:t>
+            </a:r>
+            <a:r>
+              <a:rPr lang="en-US" altLang="zh-CN" sz="1200" dirty="0">
+                <a:latin typeface="Times New Roman" panose="02020603050405020304" pitchFamily="18" charset="0"/>
+                <a:cs typeface="Times New Roman" panose="02020603050405020304" pitchFamily="18" charset="0"/>
+              </a:rPr>
+              <a:t>considerable improvements over re-computation.</a:t>
+            </a:r>
+            <a:endParaRPr lang="en-US" altLang="zh-CN" sz="1200" dirty="0">
+              <a:latin typeface="Times New Roman" panose="02020603050405020304" pitchFamily="18" charset="0"/>
+              <a:cs typeface="Times New Roman" panose="02020603050405020304" pitchFamily="18" charset="0"/>
+            </a:endParaRPr>
+          </a:p>
+          <a:p>
+            <a:endParaRPr lang="en-US" altLang="zh-CN" sz="1200" dirty="0">
+              <a:latin typeface="Times New Roman" panose="02020603050405020304" pitchFamily="18" charset="0"/>
+              <a:cs typeface="Times New Roman" panose="02020603050405020304" pitchFamily="18" charset="0"/>
+            </a:endParaRPr>
+          </a:p>
+          <a:p>
+            <a:r>
+              <a:rPr lang="en-US" altLang="zh-CN" b="0" i="0" dirty="0">
+                <a:solidFill>
+                  <a:srgbClr val="060607"/>
+                </a:solidFill>
+                <a:effectLst/>
+                <a:latin typeface="-apple-system"/>
+              </a:rPr>
+              <a:t>we find that the </a:t>
+            </a:r>
+            <a:r>
+              <a:rPr lang="en-US" altLang="zh-CN" b="1" i="0" dirty="0">
+                <a:solidFill>
+                  <a:srgbClr val="060607"/>
+                </a:solidFill>
+                <a:effectLst/>
+                <a:latin typeface="-apple-system"/>
+              </a:rPr>
+              <a:t>KV cache reuse has the potential to reduce Time to First Token (TTFT) by 30% in scenarios with long context</a:t>
+            </a:r>
+            <a:r>
+              <a:rPr lang="en-US" altLang="zh-CN" b="0" i="0" dirty="0">
+                <a:solidFill>
+                  <a:srgbClr val="060607"/>
+                </a:solidFill>
+                <a:effectLst/>
+                <a:latin typeface="-apple-system"/>
+              </a:rPr>
+              <a:t>. </a:t>
+            </a:r>
+            <a:endParaRPr lang="en-US" altLang="zh-CN" sz="1200" b="0" i="0" dirty="0">
+              <a:solidFill>
+                <a:srgbClr val="060607"/>
+              </a:solidFill>
+              <a:effectLst/>
+              <a:latin typeface="Times New Roman" panose="02020603050405020304" pitchFamily="18" charset="0"/>
+              <a:cs typeface="Times New Roman" panose="02020603050405020304" pitchFamily="18" charset="0"/>
+            </a:endParaRPr>
+          </a:p>
+          <a:p>
+            <a:endParaRPr lang="en-US" altLang="zh-CN" sz="1200" b="0" i="0" dirty="0">
+              <a:solidFill>
+                <a:srgbClr val="060607"/>
+              </a:solidFill>
+              <a:effectLst/>
+              <a:latin typeface="Times New Roman" panose="02020603050405020304" pitchFamily="18" charset="0"/>
+              <a:cs typeface="Times New Roman" panose="02020603050405020304" pitchFamily="18" charset="0"/>
+            </a:endParaRPr>
+          </a:p>
+          <a:p>
+            <a:r>
+              <a:rPr lang="en-US" altLang="zh-CN" b="0" i="0" dirty="0">
+                <a:solidFill>
+                  <a:srgbClr val="060607"/>
+                </a:solidFill>
+                <a:effectLst/>
+                <a:latin typeface="-apple-system"/>
+              </a:rPr>
+              <a:t>Furthermore, when we look at the performance of our system with the OPT-13B model, the benefits become even more pronounced. </a:t>
+            </a:r>
+            <a:r>
+              <a:rPr lang="en-US" altLang="zh-CN" b="0" i="0">
+                <a:solidFill>
+                  <a:srgbClr val="060607"/>
+                </a:solidFill>
+                <a:effectLst/>
+                <a:latin typeface="-apple-system"/>
+              </a:rPr>
+              <a:t>Here, the reduction in TTFT </a:t>
+            </a:r>
+            <a:r>
+              <a:rPr lang="en-US" altLang="zh-CN" b="1" i="0">
+                <a:solidFill>
+                  <a:srgbClr val="060607"/>
+                </a:solidFill>
+                <a:effectLst/>
+                <a:latin typeface="-apple-system"/>
+              </a:rPr>
+              <a:t>exceeds 60%</a:t>
+            </a:r>
+            <a:r>
+              <a:rPr lang="en-US" altLang="zh-CN" b="0" i="0">
+                <a:solidFill>
+                  <a:srgbClr val="060607"/>
+                </a:solidFill>
+                <a:effectLst/>
+                <a:latin typeface="-apple-system"/>
+              </a:rPr>
+              <a:t>. </a:t>
+            </a:r>
+            <a:endParaRPr lang="en-US" altLang="zh-CN" sz="1200" dirty="0">
+              <a:latin typeface="Times New Roman" panose="02020603050405020304" pitchFamily="18" charset="0"/>
+              <a:cs typeface="Times New Roman" panose="02020603050405020304" pitchFamily="18" charset="0"/>
+            </a:endParaRPr>
+          </a:p>
+        </p:txBody>
+      </p:sp>
+      <p:sp>
+        <p:nvSpPr>
+          <p:cNvPr id="4" name="Slide Number Placeholder 3"/>
+          <p:cNvSpPr>
+            <a:spLocks noGrp="1"/>
+          </p:cNvSpPr>
+          <p:nvPr>
+            <p:ph type="sldNum" sz="quarter" idx="10"/>
+          </p:nvPr>
+        </p:nvSpPr>
+        <p:spPr/>
+        <p:txBody>
+          <a:bodyPr/>
+          <a:lstStyle/>
+          <a:p>
+            <a:fld id="{F7021451-1387-4CA6-816F-3879F97B5CBC}" type="slidenum">
+              <a:rPr lang="en-US"/>
+            </a:fld>
+            <a:endParaRPr lang="en-US"/>
+          </a:p>
+        </p:txBody>
+      </p:sp>
+    </p:spTree>
+  </p:cSld>
+  <p:clrMapOvr>
+    <a:masterClrMapping/>
+  </p:clrMapOvr>
+</p:notes>
+</file>
+
+<file path=ppt/notesSlides/notesSlide27.xml><?xml version="1.0" encoding="utf-8"?>
+<p:notes xmlns:a="http://schemas.openxmlformats.org/drawingml/2006/main" xmlns:r="http://schemas.openxmlformats.org/officeDocument/2006/relationships" xmlns:p="http://schemas.openxmlformats.org/presentationml/2006/main">
+  <p:cSld>
+    <p:spTree>
+      <p:nvGrpSpPr>
+        <p:cNvPr id="1" name=""/>
+        <p:cNvGrpSpPr/>
+        <p:nvPr/>
+      </p:nvGrpSpPr>
+      <p:grpSpPr>
+        <a:xfrm>
+          <a:off x="0" y="0"/>
+          <a:ext cx="0" cy="0"/>
+          <a:chOff x="0" y="0"/>
+          <a:chExt cx="0" cy="0"/>
+        </a:xfrm>
+      </p:grpSpPr>
+      <p:sp>
+        <p:nvSpPr>
+          <p:cNvPr id="2" name="Slide Image Placeholder 1"/>
+          <p:cNvSpPr>
+            <a:spLocks noGrp="1" noRot="1" noChangeAspect="1"/>
+          </p:cNvSpPr>
+          <p:nvPr>
+            <p:ph type="sldImg"/>
+          </p:nvPr>
+        </p:nvSpPr>
+        <p:spPr/>
+      </p:sp>
+      <p:sp>
+        <p:nvSpPr>
+          <p:cNvPr id="3" name="Notes Placeholder 2"/>
+          <p:cNvSpPr>
+            <a:spLocks noGrp="1"/>
+          </p:cNvSpPr>
+          <p:nvPr>
+            <p:ph type="body" idx="1"/>
+          </p:nvPr>
+        </p:nvSpPr>
+        <p:spPr/>
+        <p:txBody>
+          <a:bodyPr/>
+          <a:lstStyle/>
+          <a:p>
+            <a:r>
+              <a:rPr lang="en-US" altLang="zh-CN" dirty="0"/>
+              <a:t>Our</a:t>
+            </a:r>
+            <a:r>
+              <a:rPr lang="zh-CN" altLang="en-US" dirty="0"/>
+              <a:t> </a:t>
+            </a:r>
+            <a:r>
+              <a:rPr lang="en-US" altLang="zh-CN" dirty="0"/>
+              <a:t>preliminary</a:t>
+            </a:r>
+            <a:r>
+              <a:rPr lang="zh-CN" altLang="en-US" dirty="0"/>
+              <a:t> </a:t>
+            </a:r>
+            <a:r>
+              <a:rPr lang="en-US" altLang="zh-CN" dirty="0"/>
+              <a:t>experiment</a:t>
+            </a:r>
+            <a:r>
+              <a:rPr lang="zh-CN" altLang="en-US" dirty="0"/>
+              <a:t> </a:t>
+            </a:r>
+            <a:r>
+              <a:rPr lang="en-US" altLang="zh-CN" dirty="0"/>
+              <a:t>shows</a:t>
+            </a:r>
+            <a:r>
+              <a:rPr lang="zh-CN" altLang="en-US" dirty="0"/>
+              <a:t> </a:t>
+            </a:r>
+            <a:r>
+              <a:rPr lang="en-US" altLang="zh-CN" dirty="0"/>
+              <a:t>that:</a:t>
+            </a:r>
+            <a:endParaRPr lang="en-US" altLang="zh-CN" dirty="0"/>
+          </a:p>
+          <a:p>
+            <a:endParaRPr lang="en-US" altLang="zh-CN" sz="1200" dirty="0">
+              <a:latin typeface="Times New Roman" panose="02020603050405020304" pitchFamily="18" charset="0"/>
+              <a:cs typeface="Times New Roman" panose="02020603050405020304" pitchFamily="18" charset="0"/>
+            </a:endParaRPr>
+          </a:p>
+          <a:p>
+            <a:r>
+              <a:rPr lang="en-US" altLang="zh-CN" sz="1200" dirty="0">
+                <a:latin typeface="Times New Roman" panose="02020603050405020304" pitchFamily="18" charset="0"/>
+                <a:cs typeface="Times New Roman" panose="02020603050405020304" pitchFamily="18" charset="0"/>
+              </a:rPr>
+              <a:t>Leveraging stored KV cache for reuse yields</a:t>
+            </a:r>
+            <a:r>
+              <a:rPr lang="zh-CN" altLang="en-US" sz="1200" dirty="0">
+                <a:latin typeface="Times New Roman" panose="02020603050405020304" pitchFamily="18" charset="0"/>
+                <a:cs typeface="Times New Roman" panose="02020603050405020304" pitchFamily="18" charset="0"/>
+              </a:rPr>
+              <a:t> </a:t>
+            </a:r>
+            <a:r>
+              <a:rPr lang="en-US" altLang="zh-CN" sz="1200" dirty="0">
+                <a:latin typeface="Times New Roman" panose="02020603050405020304" pitchFamily="18" charset="0"/>
+                <a:cs typeface="Times New Roman" panose="02020603050405020304" pitchFamily="18" charset="0"/>
+              </a:rPr>
+              <a:t>considerable improvements over re-computation.</a:t>
+            </a:r>
+            <a:endParaRPr lang="en-US" altLang="zh-CN" sz="1200" dirty="0">
+              <a:latin typeface="Times New Roman" panose="02020603050405020304" pitchFamily="18" charset="0"/>
+              <a:cs typeface="Times New Roman" panose="02020603050405020304" pitchFamily="18" charset="0"/>
+            </a:endParaRPr>
+          </a:p>
+          <a:p>
+            <a:endParaRPr lang="en-US" altLang="zh-CN" sz="1200" dirty="0">
+              <a:latin typeface="Times New Roman" panose="02020603050405020304" pitchFamily="18" charset="0"/>
+              <a:cs typeface="Times New Roman" panose="02020603050405020304" pitchFamily="18" charset="0"/>
+            </a:endParaRPr>
+          </a:p>
+          <a:p>
+            <a:r>
+              <a:rPr lang="en-US" altLang="zh-CN" b="0" i="0" dirty="0">
+                <a:solidFill>
+                  <a:srgbClr val="060607"/>
+                </a:solidFill>
+                <a:effectLst/>
+                <a:latin typeface="-apple-system"/>
+              </a:rPr>
+              <a:t>we find that the </a:t>
+            </a:r>
+            <a:r>
+              <a:rPr lang="en-US" altLang="zh-CN" b="1" i="0" dirty="0">
+                <a:solidFill>
+                  <a:srgbClr val="060607"/>
+                </a:solidFill>
+                <a:effectLst/>
+                <a:latin typeface="-apple-system"/>
+              </a:rPr>
+              <a:t>KV cache reuse has the potential to reduce Time to First Token (TTFT) by 30% in scenarios with long context</a:t>
+            </a:r>
+            <a:r>
+              <a:rPr lang="en-US" altLang="zh-CN" b="0" i="0" dirty="0">
+                <a:solidFill>
+                  <a:srgbClr val="060607"/>
+                </a:solidFill>
+                <a:effectLst/>
+                <a:latin typeface="-apple-system"/>
+              </a:rPr>
+              <a:t>. </a:t>
+            </a:r>
+            <a:endParaRPr lang="en-US" altLang="zh-CN" sz="1200" b="0" i="0" dirty="0">
+              <a:solidFill>
+                <a:srgbClr val="060607"/>
+              </a:solidFill>
+              <a:effectLst/>
+              <a:latin typeface="Times New Roman" panose="02020603050405020304" pitchFamily="18" charset="0"/>
+              <a:cs typeface="Times New Roman" panose="02020603050405020304" pitchFamily="18" charset="0"/>
+            </a:endParaRPr>
+          </a:p>
+          <a:p>
+            <a:endParaRPr lang="en-US" altLang="zh-CN" sz="1200" b="0" i="0" dirty="0">
+              <a:solidFill>
+                <a:srgbClr val="060607"/>
+              </a:solidFill>
+              <a:effectLst/>
+              <a:latin typeface="Times New Roman" panose="02020603050405020304" pitchFamily="18" charset="0"/>
+              <a:cs typeface="Times New Roman" panose="02020603050405020304" pitchFamily="18" charset="0"/>
+            </a:endParaRPr>
+          </a:p>
+          <a:p>
+            <a:r>
+              <a:rPr lang="en-US" altLang="zh-CN" b="0" i="0" dirty="0">
+                <a:solidFill>
+                  <a:srgbClr val="060607"/>
+                </a:solidFill>
+                <a:effectLst/>
+                <a:latin typeface="-apple-system"/>
+              </a:rPr>
+              <a:t>Furthermore, when we look at the performance of our system with the OPT-13B model, the benefits become even more pronounced. </a:t>
+            </a:r>
+            <a:r>
+              <a:rPr lang="en-US" altLang="zh-CN" b="0" i="0">
+                <a:solidFill>
+                  <a:srgbClr val="060607"/>
+                </a:solidFill>
+                <a:effectLst/>
+                <a:latin typeface="-apple-system"/>
+              </a:rPr>
+              <a:t>Here, the reduction in TTFT </a:t>
+            </a:r>
+            <a:r>
+              <a:rPr lang="en-US" altLang="zh-CN" b="1" i="0">
+                <a:solidFill>
+                  <a:srgbClr val="060607"/>
+                </a:solidFill>
+                <a:effectLst/>
+                <a:latin typeface="-apple-system"/>
+              </a:rPr>
+              <a:t>exceeds 60%</a:t>
+            </a:r>
+            <a:r>
+              <a:rPr lang="en-US" altLang="zh-CN" b="0" i="0">
+                <a:solidFill>
+                  <a:srgbClr val="060607"/>
+                </a:solidFill>
+                <a:effectLst/>
+                <a:latin typeface="-apple-system"/>
+              </a:rPr>
+              <a:t>. </a:t>
+            </a:r>
+            <a:endParaRPr lang="en-US" altLang="zh-CN" sz="1200" dirty="0">
+              <a:latin typeface="Times New Roman" panose="02020603050405020304" pitchFamily="18" charset="0"/>
+              <a:cs typeface="Times New Roman" panose="02020603050405020304" pitchFamily="18" charset="0"/>
+            </a:endParaRPr>
+          </a:p>
+        </p:txBody>
+      </p:sp>
+      <p:sp>
+        <p:nvSpPr>
+          <p:cNvPr id="4" name="Slide Number Placeholder 3"/>
+          <p:cNvSpPr>
+            <a:spLocks noGrp="1"/>
+          </p:cNvSpPr>
+          <p:nvPr>
+            <p:ph type="sldNum" sz="quarter" idx="10"/>
+          </p:nvPr>
+        </p:nvSpPr>
+        <p:spPr/>
+        <p:txBody>
+          <a:bodyPr/>
+          <a:lstStyle/>
+          <a:p>
+            <a:fld id="{F7021451-1387-4CA6-816F-3879F97B5CBC}" type="slidenum">
+              <a:rPr lang="en-US"/>
+            </a:fld>
+            <a:endParaRPr lang="en-US"/>
+          </a:p>
+        </p:txBody>
+      </p:sp>
+    </p:spTree>
+  </p:cSld>
+  <p:clrMapOvr>
+    <a:masterClrMapping/>
+  </p:clrMapOvr>
+</p:notes>
+</file>
+
+<file path=ppt/notesSlides/notesSlide28.xml><?xml version="1.0" encoding="utf-8"?>
+<p:notes xmlns:a="http://schemas.openxmlformats.org/drawingml/2006/main" xmlns:r="http://schemas.openxmlformats.org/officeDocument/2006/relationships" xmlns:p="http://schemas.openxmlformats.org/presentationml/2006/main">
+  <p:cSld>
+    <p:spTree>
+      <p:nvGrpSpPr>
+        <p:cNvPr id="1" name=""/>
+        <p:cNvGrpSpPr/>
+        <p:nvPr/>
+      </p:nvGrpSpPr>
+      <p:grpSpPr>
+        <a:xfrm>
+          <a:off x="0" y="0"/>
+          <a:ext cx="0" cy="0"/>
+          <a:chOff x="0" y="0"/>
+          <a:chExt cx="0" cy="0"/>
+        </a:xfrm>
+      </p:grpSpPr>
+      <p:sp>
+        <p:nvSpPr>
+          <p:cNvPr id="2" name="Slide Image Placeholder 1"/>
+          <p:cNvSpPr>
+            <a:spLocks noGrp="1" noRot="1" noChangeAspect="1"/>
+          </p:cNvSpPr>
+          <p:nvPr>
+            <p:ph type="sldImg"/>
+          </p:nvPr>
+        </p:nvSpPr>
+        <p:spPr/>
+      </p:sp>
+      <p:sp>
+        <p:nvSpPr>
+          <p:cNvPr id="3" name="Notes Placeholder 2"/>
+          <p:cNvSpPr>
+            <a:spLocks noGrp="1"/>
+          </p:cNvSpPr>
+          <p:nvPr>
+            <p:ph type="body" idx="1"/>
+          </p:nvPr>
+        </p:nvSpPr>
+        <p:spPr/>
+        <p:txBody>
+          <a:bodyPr/>
+          <a:lstStyle/>
+          <a:p>
+            <a:r>
+              <a:rPr lang="en-US" altLang="zh-CN" dirty="0"/>
+              <a:t>Our</a:t>
+            </a:r>
+            <a:r>
+              <a:rPr lang="zh-CN" altLang="en-US" dirty="0"/>
+              <a:t> </a:t>
+            </a:r>
+            <a:r>
+              <a:rPr lang="en-US" altLang="zh-CN" dirty="0"/>
+              <a:t>preliminary</a:t>
+            </a:r>
+            <a:r>
+              <a:rPr lang="zh-CN" altLang="en-US" dirty="0"/>
+              <a:t> </a:t>
+            </a:r>
+            <a:r>
+              <a:rPr lang="en-US" altLang="zh-CN" dirty="0"/>
+              <a:t>experiment</a:t>
+            </a:r>
+            <a:r>
+              <a:rPr lang="zh-CN" altLang="en-US" dirty="0"/>
+              <a:t> </a:t>
+            </a:r>
+            <a:r>
+              <a:rPr lang="en-US" altLang="zh-CN" dirty="0"/>
+              <a:t>shows</a:t>
+            </a:r>
+            <a:r>
+              <a:rPr lang="zh-CN" altLang="en-US" dirty="0"/>
+              <a:t> </a:t>
+            </a:r>
+            <a:r>
+              <a:rPr lang="en-US" altLang="zh-CN" dirty="0"/>
+              <a:t>that:</a:t>
+            </a:r>
+            <a:endParaRPr lang="en-US" altLang="zh-CN" dirty="0"/>
+          </a:p>
+          <a:p>
+            <a:endParaRPr lang="en-US" altLang="zh-CN" sz="1200" dirty="0">
+              <a:latin typeface="Times New Roman" panose="02020603050405020304" pitchFamily="18" charset="0"/>
+              <a:cs typeface="Times New Roman" panose="02020603050405020304" pitchFamily="18" charset="0"/>
+            </a:endParaRPr>
+          </a:p>
+          <a:p>
+            <a:r>
+              <a:rPr lang="en-US" altLang="zh-CN" sz="1200" dirty="0">
+                <a:latin typeface="Times New Roman" panose="02020603050405020304" pitchFamily="18" charset="0"/>
+                <a:cs typeface="Times New Roman" panose="02020603050405020304" pitchFamily="18" charset="0"/>
+              </a:rPr>
+              <a:t>Leveraging stored KV cache for reuse yields</a:t>
+            </a:r>
+            <a:r>
+              <a:rPr lang="zh-CN" altLang="en-US" sz="1200" dirty="0">
+                <a:latin typeface="Times New Roman" panose="02020603050405020304" pitchFamily="18" charset="0"/>
+                <a:cs typeface="Times New Roman" panose="02020603050405020304" pitchFamily="18" charset="0"/>
+              </a:rPr>
+              <a:t> </a:t>
+            </a:r>
+            <a:r>
+              <a:rPr lang="en-US" altLang="zh-CN" sz="1200" dirty="0">
+                <a:latin typeface="Times New Roman" panose="02020603050405020304" pitchFamily="18" charset="0"/>
+                <a:cs typeface="Times New Roman" panose="02020603050405020304" pitchFamily="18" charset="0"/>
+              </a:rPr>
+              <a:t>considerable improvements over re-computation.</a:t>
+            </a:r>
+            <a:endParaRPr lang="en-US" altLang="zh-CN" sz="1200" dirty="0">
+              <a:latin typeface="Times New Roman" panose="02020603050405020304" pitchFamily="18" charset="0"/>
+              <a:cs typeface="Times New Roman" panose="02020603050405020304" pitchFamily="18" charset="0"/>
+            </a:endParaRPr>
+          </a:p>
+          <a:p>
+            <a:endParaRPr lang="en-US" altLang="zh-CN" sz="1200" dirty="0">
+              <a:latin typeface="Times New Roman" panose="02020603050405020304" pitchFamily="18" charset="0"/>
+              <a:cs typeface="Times New Roman" panose="02020603050405020304" pitchFamily="18" charset="0"/>
+            </a:endParaRPr>
+          </a:p>
+          <a:p>
+            <a:r>
+              <a:rPr lang="en-US" altLang="zh-CN" b="0" i="0" dirty="0">
+                <a:solidFill>
+                  <a:srgbClr val="060607"/>
+                </a:solidFill>
+                <a:effectLst/>
+                <a:latin typeface="-apple-system"/>
+              </a:rPr>
+              <a:t>we find that the </a:t>
+            </a:r>
+            <a:r>
+              <a:rPr lang="en-US" altLang="zh-CN" b="1" i="0" dirty="0">
+                <a:solidFill>
+                  <a:srgbClr val="060607"/>
+                </a:solidFill>
+                <a:effectLst/>
+                <a:latin typeface="-apple-system"/>
+              </a:rPr>
+              <a:t>KV cache reuse has the potential to reduce Time to First Token (TTFT) by 30% in scenarios with long context</a:t>
+            </a:r>
+            <a:r>
+              <a:rPr lang="en-US" altLang="zh-CN" b="0" i="0" dirty="0">
+                <a:solidFill>
+                  <a:srgbClr val="060607"/>
+                </a:solidFill>
+                <a:effectLst/>
+                <a:latin typeface="-apple-system"/>
+              </a:rPr>
+              <a:t>. </a:t>
+            </a:r>
+            <a:endParaRPr lang="en-US" altLang="zh-CN" sz="1200" b="0" i="0" dirty="0">
+              <a:solidFill>
+                <a:srgbClr val="060607"/>
+              </a:solidFill>
+              <a:effectLst/>
+              <a:latin typeface="Times New Roman" panose="02020603050405020304" pitchFamily="18" charset="0"/>
+              <a:cs typeface="Times New Roman" panose="02020603050405020304" pitchFamily="18" charset="0"/>
+            </a:endParaRPr>
+          </a:p>
+          <a:p>
+            <a:endParaRPr lang="en-US" altLang="zh-CN" sz="1200" b="0" i="0" dirty="0">
+              <a:solidFill>
+                <a:srgbClr val="060607"/>
+              </a:solidFill>
+              <a:effectLst/>
+              <a:latin typeface="Times New Roman" panose="02020603050405020304" pitchFamily="18" charset="0"/>
+              <a:cs typeface="Times New Roman" panose="02020603050405020304" pitchFamily="18" charset="0"/>
+            </a:endParaRPr>
+          </a:p>
+          <a:p>
+            <a:r>
+              <a:rPr lang="en-US" altLang="zh-CN" b="0" i="0" dirty="0">
+                <a:solidFill>
+                  <a:srgbClr val="060607"/>
+                </a:solidFill>
+                <a:effectLst/>
+                <a:latin typeface="-apple-system"/>
+              </a:rPr>
+              <a:t>Furthermore, when we look at the performance of our system with the OPT-13B model, the benefits become even more pronounced. </a:t>
+            </a:r>
+            <a:r>
+              <a:rPr lang="en-US" altLang="zh-CN" b="0" i="0">
+                <a:solidFill>
+                  <a:srgbClr val="060607"/>
+                </a:solidFill>
+                <a:effectLst/>
+                <a:latin typeface="-apple-system"/>
+              </a:rPr>
+              <a:t>Here, the reduction in TTFT </a:t>
+            </a:r>
+            <a:r>
+              <a:rPr lang="en-US" altLang="zh-CN" b="1" i="0">
+                <a:solidFill>
+                  <a:srgbClr val="060607"/>
+                </a:solidFill>
+                <a:effectLst/>
+                <a:latin typeface="-apple-system"/>
+              </a:rPr>
+              <a:t>exceeds 60%</a:t>
+            </a:r>
+            <a:r>
+              <a:rPr lang="en-US" altLang="zh-CN" b="0" i="0">
+                <a:solidFill>
+                  <a:srgbClr val="060607"/>
+                </a:solidFill>
+                <a:effectLst/>
+                <a:latin typeface="-apple-system"/>
+              </a:rPr>
+              <a:t>. </a:t>
+            </a:r>
+            <a:endParaRPr lang="en-US" altLang="zh-CN" sz="1200" dirty="0">
+              <a:latin typeface="Times New Roman" panose="02020603050405020304" pitchFamily="18" charset="0"/>
+              <a:cs typeface="Times New Roman" panose="02020603050405020304" pitchFamily="18" charset="0"/>
+            </a:endParaRPr>
+          </a:p>
+        </p:txBody>
+      </p:sp>
+      <p:sp>
+        <p:nvSpPr>
+          <p:cNvPr id="4" name="Slide Number Placeholder 3"/>
+          <p:cNvSpPr>
+            <a:spLocks noGrp="1"/>
+          </p:cNvSpPr>
+          <p:nvPr>
+            <p:ph type="sldNum" sz="quarter" idx="10"/>
+          </p:nvPr>
+        </p:nvSpPr>
+        <p:spPr/>
+        <p:txBody>
+          <a:bodyPr/>
+          <a:lstStyle/>
+          <a:p>
+            <a:fld id="{F7021451-1387-4CA6-816F-3879F97B5CBC}" type="slidenum">
+              <a:rPr lang="en-US"/>
+            </a:fld>
+            <a:endParaRPr lang="en-US"/>
+          </a:p>
+        </p:txBody>
+      </p:sp>
+    </p:spTree>
+  </p:cSld>
+  <p:clrMapOvr>
+    <a:masterClrMapping/>
+  </p:clrMapOvr>
+</p:notes>
+</file>
+
+<file path=ppt/notesSlides/notesSlide29.xml><?xml version="1.0" encoding="utf-8"?>
 <p:notes xmlns:a="http://schemas.openxmlformats.org/drawingml/2006/main" xmlns:r="http://schemas.openxmlformats.org/officeDocument/2006/relationships" xmlns:p="http://schemas.openxmlformats.org/presentationml/2006/main">
   <p:cSld>
     <p:spTree>
@@ -7330,10 +9068,8 @@
       </p:sp>
       <p:pic>
         <p:nvPicPr>
-          <p:cNvPr id="5" name="图片 4"/>
-          <p:cNvPicPr>
-            <a:picLocks noChangeAspect="1"/>
-          </p:cNvPicPr>
+          <p:cNvPr id="7" name="图片 6"/>
+          <p:cNvPicPr/>
           <p:nvPr/>
         </p:nvPicPr>
         <p:blipFill>
@@ -7344,8 +9080,8 @@
         </p:blipFill>
         <p:spPr>
           <a:xfrm>
-            <a:off x="363906" y="2506859"/>
-            <a:ext cx="3811855" cy="1905928"/>
+            <a:off x="4745990" y="2369820"/>
+            <a:ext cx="3735070" cy="1879600"/>
           </a:xfrm>
           <a:prstGeom prst="rect">
             <a:avLst/>
@@ -7354,7 +9090,7 @@
       </p:pic>
       <p:pic>
         <p:nvPicPr>
-          <p:cNvPr id="6" name="图片 5"/>
+          <p:cNvPr id="8" name="图片 7"/>
           <p:cNvPicPr>
             <a:picLocks noChangeAspect="1"/>
           </p:cNvPicPr>
@@ -7368,8 +9104,8 @@
         </p:blipFill>
         <p:spPr>
           <a:xfrm>
-            <a:off x="4619625" y="2455079"/>
-            <a:ext cx="4048563" cy="1855591"/>
+            <a:off x="855980" y="1961515"/>
+            <a:ext cx="3369945" cy="2983230"/>
           </a:xfrm>
           <a:prstGeom prst="rect">
             <a:avLst/>
@@ -10868,7 +12604,7 @@
         <p:spPr>
           <a:xfrm>
             <a:off x="762000" y="1304925"/>
-            <a:ext cx="4240306" cy="3452813"/>
+            <a:ext cx="4107180" cy="3453130"/>
           </a:xfrm>
           <a:prstGeom prst="rect">
             <a:avLst/>
@@ -11397,10 +13133,8 @@
       </p:sp>
       <p:pic>
         <p:nvPicPr>
-          <p:cNvPr id="5" name="图片 4"/>
-          <p:cNvPicPr>
-            <a:picLocks noChangeAspect="1"/>
-          </p:cNvPicPr>
+          <p:cNvPr id="6" name="图片 5"/>
+          <p:cNvPicPr/>
           <p:nvPr/>
         </p:nvPicPr>
         <p:blipFill>
@@ -11411,8 +13145,8 @@
         </p:blipFill>
         <p:spPr>
           <a:xfrm>
-            <a:off x="5088357" y="1495606"/>
-            <a:ext cx="3900952" cy="2597903"/>
+            <a:off x="4697095" y="1447165"/>
+            <a:ext cx="4334510" cy="2834005"/>
           </a:xfrm>
           <a:prstGeom prst="rect">
             <a:avLst/>
@@ -18150,7 +19884,7 @@
             </p:nvSpPr>
             <p:spPr>
               <a:xfrm>
-                <a:off x="762000" y="1304925"/>
+                <a:off x="762000" y="1177925"/>
                 <a:ext cx="7715250" cy="3452813"/>
               </a:xfrm>
               <a:prstGeom prst="rect">
@@ -19248,7 +20982,7 @@
             </p:nvSpPr>
             <p:spPr>
               <a:xfrm>
-                <a:off x="762000" y="1304925"/>
+                <a:off x="762000" y="1177925"/>
                 <a:ext cx="7715250" cy="3452813"/>
               </a:xfrm>
               <a:prstGeom prst="rect">
@@ -19351,7 +21085,7 @@
         <p:spPr>
           <a:xfrm>
             <a:off x="1524000" y="1809750"/>
-            <a:ext cx="6491287" cy="2038351"/>
+            <a:ext cx="6490970" cy="2409190"/>
           </a:xfrm>
           <a:prstGeom prst="rect">
             <a:avLst/>
@@ -19563,6 +21297,30 @@
                 <a:cs typeface="Times New Roman" panose="02020603050405020304" pitchFamily="18" charset="0"/>
               </a:rPr>
               <a:t>Details</a:t>
+            </a:r>
+            <a:endParaRPr lang="en-US" altLang="zh-CN" sz="2000" dirty="0">
+              <a:solidFill>
+                <a:srgbClr val="383838"/>
+              </a:solidFill>
+              <a:latin typeface="Times New Roman" panose="02020603050405020304" pitchFamily="18" charset="0"/>
+              <a:ea typeface="Noto Sans SC" pitchFamily="34" charset="-122"/>
+              <a:cs typeface="Times New Roman" panose="02020603050405020304" pitchFamily="18" charset="0"/>
+            </a:endParaRPr>
+          </a:p>
+          <a:p>
+            <a:pPr marL="342900" indent="-342900" algn="l">
+              <a:lnSpc>
+                <a:spcPct val="150000"/>
+              </a:lnSpc>
+              <a:buSzPct val="100000"/>
+              <a:buChar char="•"/>
+            </a:pPr>
+            <a:r>
+              <a:rPr lang="en-US" sz="2000" dirty="0">
+                <a:latin typeface="Times New Roman" panose="02020603050405020304" pitchFamily="18" charset="0"/>
+                <a:cs typeface="Times New Roman" panose="02020603050405020304" pitchFamily="18" charset="0"/>
+              </a:rPr>
+              <a:t>TestBed and Implementation</a:t>
             </a:r>
             <a:endParaRPr lang="en-US" sz="2000" dirty="0">
               <a:latin typeface="Times New Roman" panose="02020603050405020304" pitchFamily="18" charset="0"/>
@@ -19726,49 +21484,7 @@
                 <a:latin typeface="Times New Roman" panose="02020603050405020304" pitchFamily="18" charset="0"/>
                 <a:cs typeface="Times New Roman" panose="02020603050405020304" pitchFamily="18" charset="0"/>
               </a:rPr>
-              <a:t>Our</a:t>
-            </a:r>
-            <a:r>
-              <a:rPr lang="zh-CN" altLang="en-US" sz="3200" b="1" dirty="0">
-                <a:latin typeface="Times New Roman" panose="02020603050405020304" pitchFamily="18" charset="0"/>
-                <a:cs typeface="Times New Roman" panose="02020603050405020304" pitchFamily="18" charset="0"/>
-              </a:rPr>
-              <a:t> </a:t>
-            </a:r>
-            <a:r>
-              <a:rPr lang="en-US" altLang="zh-CN" sz="3200" b="1" dirty="0">
-                <a:latin typeface="Times New Roman" panose="02020603050405020304" pitchFamily="18" charset="0"/>
-                <a:cs typeface="Times New Roman" panose="02020603050405020304" pitchFamily="18" charset="0"/>
-              </a:rPr>
-              <a:t>Experiment</a:t>
-            </a:r>
-            <a:r>
-              <a:rPr lang="zh-CN" altLang="en-US" sz="3200" b="1" dirty="0">
-                <a:latin typeface="Times New Roman" panose="02020603050405020304" pitchFamily="18" charset="0"/>
-                <a:cs typeface="Times New Roman" panose="02020603050405020304" pitchFamily="18" charset="0"/>
-              </a:rPr>
-              <a:t> </a:t>
-            </a:r>
-            <a:r>
-              <a:rPr lang="en-US" altLang="zh-CN" sz="3200" b="1" dirty="0">
-                <a:latin typeface="Times New Roman" panose="02020603050405020304" pitchFamily="18" charset="0"/>
-                <a:cs typeface="Times New Roman" panose="02020603050405020304" pitchFamily="18" charset="0"/>
-              </a:rPr>
-              <a:t>and</a:t>
-            </a:r>
-            <a:r>
-              <a:rPr lang="zh-CN" altLang="en-US" sz="3200" b="1" dirty="0">
-                <a:latin typeface="Times New Roman" panose="02020603050405020304" pitchFamily="18" charset="0"/>
-                <a:cs typeface="Times New Roman" panose="02020603050405020304" pitchFamily="18" charset="0"/>
-              </a:rPr>
-              <a:t> </a:t>
-            </a:r>
-            <a:r>
-              <a:rPr lang="en-US" altLang="zh-CN" sz="3200" b="1" dirty="0">
-                <a:latin typeface="Times New Roman" panose="02020603050405020304" pitchFamily="18" charset="0"/>
-                <a:cs typeface="Times New Roman" panose="02020603050405020304" pitchFamily="18" charset="0"/>
-              </a:rPr>
-              <a:t>Conclusions</a:t>
+              <a:t>TestBed and Implementation</a:t>
             </a:r>
             <a:endParaRPr lang="en-US" sz="3200" b="1" dirty="0">
               <a:latin typeface="Times New Roman" panose="02020603050405020304" pitchFamily="18" charset="0"/>
@@ -19846,6 +21562,1408 @@
             </a:pPr>
             <a:r>
               <a:rPr lang="en-US" sz="2400" dirty="0">
+                <a:latin typeface="Times New Roman" panose="02020603050405020304" pitchFamily="18" charset="0"/>
+                <a:cs typeface="Times New Roman" panose="02020603050405020304" pitchFamily="18" charset="0"/>
+              </a:rPr>
+              <a:t>Implementation</a:t>
+            </a:r>
+            <a:endParaRPr lang="en-US" sz="2400" dirty="0">
+              <a:latin typeface="Times New Roman" panose="02020603050405020304" pitchFamily="18" charset="0"/>
+              <a:cs typeface="Times New Roman" panose="02020603050405020304" pitchFamily="18" charset="0"/>
+            </a:endParaRPr>
+          </a:p>
+        </p:txBody>
+      </p:sp>
+      <p:sp>
+        <p:nvSpPr>
+          <p:cNvPr id="4" name="Text 2"/>
+          <p:cNvSpPr/>
+          <p:nvPr/>
+        </p:nvSpPr>
+        <p:spPr>
+          <a:xfrm>
+            <a:off x="762000" y="961390"/>
+            <a:ext cx="7715250" cy="3452813"/>
+          </a:xfrm>
+          <a:prstGeom prst="rect">
+            <a:avLst/>
+          </a:prstGeom>
+          <a:noFill/>
+        </p:spPr>
+        <p:txBody>
+          <a:bodyPr wrap="square" rtlCol="0" anchor="t"/>
+          <a:lstStyle/>
+          <a:p>
+            <a:pPr marL="342900" indent="-342900" algn="l">
+              <a:lnSpc>
+                <a:spcPct val="150000"/>
+              </a:lnSpc>
+              <a:buSzPct val="100000"/>
+              <a:buChar char="•"/>
+            </a:pPr>
+            <a:r>
+              <a:rPr lang="en-US" sz="1200" dirty="0">
+                <a:solidFill>
+                  <a:srgbClr val="383838"/>
+                </a:solidFill>
+                <a:latin typeface="Times New Roman" panose="02020603050405020304" pitchFamily="18" charset="0"/>
+                <a:ea typeface="Noto Sans SC" pitchFamily="34" charset="-122"/>
+                <a:cs typeface="Times New Roman" panose="02020603050405020304" pitchFamily="18" charset="0"/>
+              </a:rPr>
+              <a:t>Testbed</a:t>
+            </a:r>
+            <a:endParaRPr lang="en-US" sz="1200" dirty="0">
+              <a:solidFill>
+                <a:srgbClr val="383838"/>
+              </a:solidFill>
+              <a:latin typeface="Times New Roman" panose="02020603050405020304" pitchFamily="18" charset="0"/>
+              <a:ea typeface="Noto Sans SC" pitchFamily="34" charset="-122"/>
+              <a:cs typeface="Times New Roman" panose="02020603050405020304" pitchFamily="18" charset="0"/>
+            </a:endParaRPr>
+          </a:p>
+          <a:p>
+            <a:pPr marL="800100" lvl="1" indent="-342900" algn="l">
+              <a:lnSpc>
+                <a:spcPct val="150000"/>
+              </a:lnSpc>
+              <a:buSzPct val="100000"/>
+              <a:buChar char="•"/>
+            </a:pPr>
+            <a:r>
+              <a:rPr lang="en-US" sz="1200" dirty="0">
+                <a:solidFill>
+                  <a:srgbClr val="383838"/>
+                </a:solidFill>
+                <a:latin typeface="Times New Roman" panose="02020603050405020304" pitchFamily="18" charset="0"/>
+                <a:ea typeface="Noto Sans SC" pitchFamily="34" charset="-122"/>
+                <a:cs typeface="Times New Roman" panose="02020603050405020304" pitchFamily="18" charset="0"/>
+              </a:rPr>
+              <a:t>Based on vLLM framework [1]</a:t>
+            </a:r>
+            <a:endParaRPr lang="en-US" sz="1200" dirty="0">
+              <a:solidFill>
+                <a:srgbClr val="383838"/>
+              </a:solidFill>
+              <a:latin typeface="Times New Roman" panose="02020603050405020304" pitchFamily="18" charset="0"/>
+              <a:ea typeface="Noto Sans SC" pitchFamily="34" charset="-122"/>
+              <a:cs typeface="Times New Roman" panose="02020603050405020304" pitchFamily="18" charset="0"/>
+            </a:endParaRPr>
+          </a:p>
+          <a:p>
+            <a:pPr marL="800100" lvl="1" indent="-342900">
+              <a:lnSpc>
+                <a:spcPct val="150000"/>
+              </a:lnSpc>
+              <a:buSzPct val="100000"/>
+              <a:buChar char="•"/>
+            </a:pPr>
+            <a:r>
+              <a:rPr lang="en-US" altLang="zh-CN" sz="1200" b="0" i="0" dirty="0">
+                <a:solidFill>
+                  <a:srgbClr val="060607"/>
+                </a:solidFill>
+                <a:effectLst/>
+                <a:latin typeface="Times New Roman" panose="02020603050405020304" pitchFamily="18" charset="0"/>
+                <a:cs typeface="Times New Roman" panose="02020603050405020304" pitchFamily="18" charset="0"/>
+              </a:rPr>
+              <a:t>Models: OPT-6.7B, OPT-13B, Llama2-7B, Llama2-13B</a:t>
+            </a:r>
+            <a:endParaRPr lang="en-US" altLang="zh-CN" sz="1200" b="0" i="0" dirty="0">
+              <a:solidFill>
+                <a:srgbClr val="060607"/>
+              </a:solidFill>
+              <a:effectLst/>
+              <a:latin typeface="Times New Roman" panose="02020603050405020304" pitchFamily="18" charset="0"/>
+              <a:cs typeface="Times New Roman" panose="02020603050405020304" pitchFamily="18" charset="0"/>
+            </a:endParaRPr>
+          </a:p>
+          <a:p>
+            <a:pPr marL="800100" lvl="1" indent="-342900">
+              <a:lnSpc>
+                <a:spcPct val="150000"/>
+              </a:lnSpc>
+              <a:buSzPct val="100000"/>
+              <a:buChar char="•"/>
+            </a:pPr>
+            <a:r>
+              <a:rPr lang="en-US" sz="1200" dirty="0">
+                <a:solidFill>
+                  <a:srgbClr val="383838"/>
+                </a:solidFill>
+                <a:latin typeface="Times New Roman" panose="02020603050405020304" pitchFamily="18" charset="0"/>
+                <a:ea typeface="Noto Sans SC" pitchFamily="34" charset="-122"/>
+                <a:cs typeface="Times New Roman" panose="02020603050405020304" pitchFamily="18" charset="0"/>
+              </a:rPr>
+              <a:t>Datasets: sharedGPT [2]</a:t>
+            </a:r>
+            <a:endParaRPr lang="en-US" sz="1200" dirty="0">
+              <a:solidFill>
+                <a:srgbClr val="383838"/>
+              </a:solidFill>
+              <a:latin typeface="Times New Roman" panose="02020603050405020304" pitchFamily="18" charset="0"/>
+              <a:ea typeface="Noto Sans SC" pitchFamily="34" charset="-122"/>
+              <a:cs typeface="Times New Roman" panose="02020603050405020304" pitchFamily="18" charset="0"/>
+            </a:endParaRPr>
+          </a:p>
+          <a:p>
+            <a:pPr marL="342900" indent="-342900" algn="l">
+              <a:lnSpc>
+                <a:spcPct val="150000"/>
+              </a:lnSpc>
+              <a:buSzPct val="100000"/>
+              <a:buChar char="•"/>
+            </a:pPr>
+            <a:r>
+              <a:rPr lang="en-US" sz="1200" dirty="0">
+                <a:solidFill>
+                  <a:srgbClr val="383838"/>
+                </a:solidFill>
+                <a:latin typeface="Times New Roman" panose="02020603050405020304" pitchFamily="18" charset="0"/>
+                <a:ea typeface="Noto Sans SC" pitchFamily="34" charset="-122"/>
+                <a:cs typeface="Times New Roman" panose="02020603050405020304" pitchFamily="18" charset="0"/>
+              </a:rPr>
+              <a:t>Implementation</a:t>
+            </a:r>
+            <a:endParaRPr lang="en-US" sz="1200" dirty="0">
+              <a:solidFill>
+                <a:srgbClr val="383838"/>
+              </a:solidFill>
+              <a:latin typeface="Times New Roman" panose="02020603050405020304" pitchFamily="18" charset="0"/>
+              <a:ea typeface="Noto Sans SC" pitchFamily="34" charset="-122"/>
+              <a:cs typeface="Times New Roman" panose="02020603050405020304" pitchFamily="18" charset="0"/>
+            </a:endParaRPr>
+          </a:p>
+          <a:p>
+            <a:pPr marL="800100" lvl="1" indent="-342900">
+              <a:lnSpc>
+                <a:spcPct val="150000"/>
+              </a:lnSpc>
+              <a:buSzPct val="100000"/>
+              <a:buChar char="•"/>
+            </a:pPr>
+            <a:r>
+              <a:rPr lang="en-US" altLang="zh-CN" sz="1200" b="0" i="0" dirty="0">
+                <a:solidFill>
+                  <a:srgbClr val="060607"/>
+                </a:solidFill>
+                <a:effectLst/>
+                <a:latin typeface="Times New Roman" panose="02020603050405020304" pitchFamily="18" charset="0"/>
+                <a:cs typeface="Times New Roman" panose="02020603050405020304" pitchFamily="18" charset="0"/>
+              </a:rPr>
+              <a:t>Memory management</a:t>
+            </a:r>
+            <a:endParaRPr lang="en-US" altLang="zh-CN" sz="1200" b="0" i="0" dirty="0">
+              <a:solidFill>
+                <a:srgbClr val="060607"/>
+              </a:solidFill>
+              <a:effectLst/>
+              <a:latin typeface="Times New Roman" panose="02020603050405020304" pitchFamily="18" charset="0"/>
+              <a:cs typeface="Times New Roman" panose="02020603050405020304" pitchFamily="18" charset="0"/>
+            </a:endParaRPr>
+          </a:p>
+          <a:p>
+            <a:pPr marL="800100" lvl="1" indent="-342900">
+              <a:lnSpc>
+                <a:spcPct val="150000"/>
+              </a:lnSpc>
+              <a:buSzPct val="100000"/>
+              <a:buChar char="•"/>
+            </a:pPr>
+            <a:r>
+              <a:rPr lang="en-US" altLang="zh-CN" sz="1200" dirty="0">
+                <a:latin typeface="Times New Roman" panose="02020603050405020304" pitchFamily="18" charset="0"/>
+                <a:cs typeface="Times New Roman" panose="02020603050405020304" pitchFamily="18" charset="0"/>
+              </a:rPr>
+              <a:t>Scheduler</a:t>
+            </a:r>
+            <a:endParaRPr lang="en-US" altLang="zh-CN" sz="1200" dirty="0">
+              <a:latin typeface="Times New Roman" panose="02020603050405020304" pitchFamily="18" charset="0"/>
+              <a:cs typeface="Times New Roman" panose="02020603050405020304" pitchFamily="18" charset="0"/>
+            </a:endParaRPr>
+          </a:p>
+          <a:p>
+            <a:pPr marL="800100" lvl="1" indent="-342900">
+              <a:lnSpc>
+                <a:spcPct val="150000"/>
+              </a:lnSpc>
+              <a:buSzPct val="100000"/>
+              <a:buChar char="•"/>
+            </a:pPr>
+            <a:r>
+              <a:rPr lang="en-US" altLang="zh-CN" sz="1200" dirty="0">
+                <a:latin typeface="Times New Roman" panose="02020603050405020304" pitchFamily="18" charset="0"/>
+                <a:cs typeface="Times New Roman" panose="02020603050405020304" pitchFamily="18" charset="0"/>
+              </a:rPr>
+              <a:t>Compression</a:t>
+            </a:r>
+            <a:endParaRPr lang="en-US" altLang="zh-CN" sz="1200" dirty="0">
+              <a:latin typeface="Times New Roman" panose="02020603050405020304" pitchFamily="18" charset="0"/>
+              <a:cs typeface="Times New Roman" panose="02020603050405020304" pitchFamily="18" charset="0"/>
+            </a:endParaRPr>
+          </a:p>
+        </p:txBody>
+      </p:sp>
+      <p:sp>
+        <p:nvSpPr>
+          <p:cNvPr id="5" name="文本框 4"/>
+          <p:cNvSpPr txBox="1"/>
+          <p:nvPr/>
+        </p:nvSpPr>
+        <p:spPr>
+          <a:xfrm>
+            <a:off x="410210" y="4667250"/>
+            <a:ext cx="8143240" cy="398780"/>
+          </a:xfrm>
+          <a:prstGeom prst="rect">
+            <a:avLst/>
+          </a:prstGeom>
+          <a:noFill/>
+        </p:spPr>
+        <p:txBody>
+          <a:bodyPr wrap="square" rtlCol="0">
+            <a:spAutoFit/>
+          </a:bodyPr>
+          <a:p>
+            <a:r>
+              <a:rPr lang="en-US" altLang="zh-CN" sz="1000">
+                <a:latin typeface="Times New Roman" panose="02020603050405020304" pitchFamily="18" charset="0"/>
+                <a:cs typeface="Times New Roman" panose="02020603050405020304" pitchFamily="18" charset="0"/>
+              </a:rPr>
+              <a:t>[1]:https://github.com/vllm-project/vllm; </a:t>
+            </a:r>
+            <a:endParaRPr lang="en-US" altLang="zh-CN" sz="1000">
+              <a:latin typeface="Times New Roman" panose="02020603050405020304" pitchFamily="18" charset="0"/>
+              <a:cs typeface="Times New Roman" panose="02020603050405020304" pitchFamily="18" charset="0"/>
+            </a:endParaRPr>
+          </a:p>
+          <a:p>
+            <a:r>
+              <a:rPr lang="en-US" altLang="zh-CN" sz="1000">
+                <a:latin typeface="Times New Roman" panose="02020603050405020304" pitchFamily="18" charset="0"/>
+                <a:cs typeface="Times New Roman" panose="02020603050405020304" pitchFamily="18" charset="0"/>
+              </a:rPr>
+              <a:t>[2]:https://sharegpt.com/</a:t>
+            </a:r>
+            <a:endParaRPr lang="en-US" altLang="zh-CN" sz="1000">
+              <a:latin typeface="Times New Roman" panose="02020603050405020304" pitchFamily="18" charset="0"/>
+              <a:cs typeface="Times New Roman" panose="02020603050405020304" pitchFamily="18" charset="0"/>
+            </a:endParaRPr>
+          </a:p>
+        </p:txBody>
+      </p:sp>
+      <p:pic>
+        <p:nvPicPr>
+          <p:cNvPr id="7" name="图片 6"/>
+          <p:cNvPicPr>
+            <a:picLocks noChangeAspect="1"/>
+          </p:cNvPicPr>
+          <p:nvPr/>
+        </p:nvPicPr>
+        <p:blipFill>
+          <a:blip r:embed="rId1"/>
+          <a:stretch>
+            <a:fillRect/>
+          </a:stretch>
+        </p:blipFill>
+        <p:spPr>
+          <a:xfrm>
+            <a:off x="5270500" y="2087880"/>
+            <a:ext cx="3061335" cy="2091690"/>
+          </a:xfrm>
+          <a:prstGeom prst="rect">
+            <a:avLst/>
+          </a:prstGeom>
+        </p:spPr>
+      </p:pic>
+      <p:cxnSp>
+        <p:nvCxnSpPr>
+          <p:cNvPr id="10" name="直接箭头连接符 9"/>
+          <p:cNvCxnSpPr/>
+          <p:nvPr/>
+        </p:nvCxnSpPr>
+        <p:spPr>
+          <a:xfrm>
+            <a:off x="3119755" y="2573655"/>
+            <a:ext cx="1854200" cy="379730"/>
+          </a:xfrm>
+          <a:prstGeom prst="straightConnector1">
+            <a:avLst/>
+          </a:prstGeom>
+          <a:ln w="31750" cap="rnd">
+            <a:solidFill>
+              <a:srgbClr val="FF0000"/>
+            </a:solidFill>
+            <a:round/>
+            <a:tailEnd type="arrow" w="med" len="med"/>
+          </a:ln>
+        </p:spPr>
+        <p:style>
+          <a:lnRef idx="0">
+            <a:srgbClr val="FFFFFF"/>
+          </a:lnRef>
+          <a:fillRef idx="0">
+            <a:srgbClr val="FFFFFF"/>
+          </a:fillRef>
+          <a:effectRef idx="0">
+            <a:srgbClr val="FFFFFF"/>
+          </a:effectRef>
+          <a:fontRef idx="minor">
+            <a:schemeClr val="tx1"/>
+          </a:fontRef>
+        </p:style>
+      </p:cxnSp>
+    </p:spTree>
+  </p:cSld>
+  <p:clrMapOvr>
+    <a:masterClrMapping/>
+  </p:clrMapOvr>
+</p:sld>
+</file>
+
+<file path=ppt/slides/slide22.xml><?xml version="1.0" encoding="utf-8"?>
+<p:sld xmlns:a="http://schemas.openxmlformats.org/drawingml/2006/main" xmlns:r="http://schemas.openxmlformats.org/officeDocument/2006/relationships" xmlns:p="http://schemas.openxmlformats.org/presentationml/2006/main">
+  <p:cSld>
+    <p:spTree>
+      <p:nvGrpSpPr>
+        <p:cNvPr id="1" name=""/>
+        <p:cNvGrpSpPr/>
+        <p:nvPr/>
+      </p:nvGrpSpPr>
+      <p:grpSpPr>
+        <a:xfrm>
+          <a:off x="0" y="0"/>
+          <a:ext cx="0" cy="0"/>
+          <a:chOff x="0" y="0"/>
+          <a:chExt cx="0" cy="0"/>
+        </a:xfrm>
+      </p:grpSpPr>
+      <p:sp>
+        <p:nvSpPr>
+          <p:cNvPr id="2" name="Shape 0"/>
+          <p:cNvSpPr/>
+          <p:nvPr/>
+        </p:nvSpPr>
+        <p:spPr>
+          <a:xfrm>
+            <a:off x="762000" y="781050"/>
+            <a:ext cx="7806690" cy="2679"/>
+          </a:xfrm>
+          <a:prstGeom prst="rect">
+            <a:avLst/>
+          </a:prstGeom>
+          <a:solidFill>
+            <a:srgbClr val="646464"/>
+          </a:solidFill>
+        </p:spPr>
+      </p:sp>
+      <p:sp>
+        <p:nvSpPr>
+          <p:cNvPr id="3" name="Text 1"/>
+          <p:cNvSpPr/>
+          <p:nvPr/>
+        </p:nvSpPr>
+        <p:spPr>
+          <a:xfrm>
+            <a:off x="762000" y="228600"/>
+            <a:ext cx="7806690" cy="552450"/>
+          </a:xfrm>
+          <a:prstGeom prst="rect">
+            <a:avLst/>
+          </a:prstGeom>
+          <a:noFill/>
+        </p:spPr>
+        <p:txBody>
+          <a:bodyPr wrap="square" rtlCol="0" anchor="ctr"/>
+          <a:lstStyle/>
+          <a:p>
+            <a:pPr marL="0" indent="0">
+              <a:buNone/>
+            </a:pPr>
+            <a:r>
+              <a:rPr lang="en-US" sz="2400" dirty="0">
+                <a:latin typeface="Times New Roman" panose="02020603050405020304" pitchFamily="18" charset="0"/>
+                <a:cs typeface="Times New Roman" panose="02020603050405020304" pitchFamily="18" charset="0"/>
+              </a:rPr>
+              <a:t>Implementation</a:t>
+            </a:r>
+            <a:endParaRPr lang="en-US" sz="2400" dirty="0">
+              <a:latin typeface="Times New Roman" panose="02020603050405020304" pitchFamily="18" charset="0"/>
+              <a:cs typeface="Times New Roman" panose="02020603050405020304" pitchFamily="18" charset="0"/>
+            </a:endParaRPr>
+          </a:p>
+        </p:txBody>
+      </p:sp>
+      <p:sp>
+        <p:nvSpPr>
+          <p:cNvPr id="4" name="Text 2"/>
+          <p:cNvSpPr/>
+          <p:nvPr/>
+        </p:nvSpPr>
+        <p:spPr>
+          <a:xfrm>
+            <a:off x="762000" y="961390"/>
+            <a:ext cx="7715250" cy="3452813"/>
+          </a:xfrm>
+          <a:prstGeom prst="rect">
+            <a:avLst/>
+          </a:prstGeom>
+          <a:noFill/>
+        </p:spPr>
+        <p:txBody>
+          <a:bodyPr wrap="square" rtlCol="0" anchor="t"/>
+          <a:lstStyle/>
+          <a:p>
+            <a:pPr marL="342900" indent="-342900" algn="l">
+              <a:lnSpc>
+                <a:spcPct val="150000"/>
+              </a:lnSpc>
+              <a:buSzPct val="100000"/>
+              <a:buChar char="•"/>
+            </a:pPr>
+            <a:r>
+              <a:rPr lang="en-US" sz="1200" dirty="0">
+                <a:solidFill>
+                  <a:srgbClr val="383838"/>
+                </a:solidFill>
+                <a:latin typeface="Times New Roman" panose="02020603050405020304" pitchFamily="18" charset="0"/>
+                <a:ea typeface="Noto Sans SC" pitchFamily="34" charset="-122"/>
+                <a:cs typeface="Times New Roman" panose="02020603050405020304" pitchFamily="18" charset="0"/>
+              </a:rPr>
+              <a:t>Testbed</a:t>
+            </a:r>
+            <a:endParaRPr lang="en-US" sz="1200" dirty="0">
+              <a:solidFill>
+                <a:srgbClr val="383838"/>
+              </a:solidFill>
+              <a:latin typeface="Times New Roman" panose="02020603050405020304" pitchFamily="18" charset="0"/>
+              <a:ea typeface="Noto Sans SC" pitchFamily="34" charset="-122"/>
+              <a:cs typeface="Times New Roman" panose="02020603050405020304" pitchFamily="18" charset="0"/>
+            </a:endParaRPr>
+          </a:p>
+          <a:p>
+            <a:pPr marL="800100" lvl="1" indent="-342900" algn="l">
+              <a:lnSpc>
+                <a:spcPct val="150000"/>
+              </a:lnSpc>
+              <a:buSzPct val="100000"/>
+              <a:buChar char="•"/>
+            </a:pPr>
+            <a:r>
+              <a:rPr lang="en-US" sz="1200" dirty="0">
+                <a:solidFill>
+                  <a:srgbClr val="383838"/>
+                </a:solidFill>
+                <a:latin typeface="Times New Roman" panose="02020603050405020304" pitchFamily="18" charset="0"/>
+                <a:ea typeface="Noto Sans SC" pitchFamily="34" charset="-122"/>
+                <a:cs typeface="Times New Roman" panose="02020603050405020304" pitchFamily="18" charset="0"/>
+              </a:rPr>
+              <a:t>Based on vLLM framework [1]</a:t>
+            </a:r>
+            <a:endParaRPr lang="en-US" sz="1200" dirty="0">
+              <a:solidFill>
+                <a:srgbClr val="383838"/>
+              </a:solidFill>
+              <a:latin typeface="Times New Roman" panose="02020603050405020304" pitchFamily="18" charset="0"/>
+              <a:ea typeface="Noto Sans SC" pitchFamily="34" charset="-122"/>
+              <a:cs typeface="Times New Roman" panose="02020603050405020304" pitchFamily="18" charset="0"/>
+            </a:endParaRPr>
+          </a:p>
+          <a:p>
+            <a:pPr marL="800100" lvl="1" indent="-342900">
+              <a:lnSpc>
+                <a:spcPct val="150000"/>
+              </a:lnSpc>
+              <a:buSzPct val="100000"/>
+              <a:buChar char="•"/>
+            </a:pPr>
+            <a:r>
+              <a:rPr lang="en-US" altLang="zh-CN" sz="1200" b="0" i="0" dirty="0">
+                <a:solidFill>
+                  <a:srgbClr val="060607"/>
+                </a:solidFill>
+                <a:effectLst/>
+                <a:latin typeface="Times New Roman" panose="02020603050405020304" pitchFamily="18" charset="0"/>
+                <a:cs typeface="Times New Roman" panose="02020603050405020304" pitchFamily="18" charset="0"/>
+              </a:rPr>
+              <a:t>Models: OPT-6.7B, OPT-13B, Llama2-7B, Llama2-13B</a:t>
+            </a:r>
+            <a:endParaRPr lang="en-US" altLang="zh-CN" sz="1200" b="0" i="0" dirty="0">
+              <a:solidFill>
+                <a:srgbClr val="060607"/>
+              </a:solidFill>
+              <a:effectLst/>
+              <a:latin typeface="Times New Roman" panose="02020603050405020304" pitchFamily="18" charset="0"/>
+              <a:cs typeface="Times New Roman" panose="02020603050405020304" pitchFamily="18" charset="0"/>
+            </a:endParaRPr>
+          </a:p>
+          <a:p>
+            <a:pPr marL="800100" lvl="1" indent="-342900">
+              <a:lnSpc>
+                <a:spcPct val="150000"/>
+              </a:lnSpc>
+              <a:buSzPct val="100000"/>
+              <a:buChar char="•"/>
+            </a:pPr>
+            <a:r>
+              <a:rPr lang="en-US" sz="1200" dirty="0">
+                <a:solidFill>
+                  <a:srgbClr val="383838"/>
+                </a:solidFill>
+                <a:latin typeface="Times New Roman" panose="02020603050405020304" pitchFamily="18" charset="0"/>
+                <a:ea typeface="Noto Sans SC" pitchFamily="34" charset="-122"/>
+                <a:cs typeface="Times New Roman" panose="02020603050405020304" pitchFamily="18" charset="0"/>
+              </a:rPr>
+              <a:t>Datasets: sharedGPT [2]</a:t>
+            </a:r>
+            <a:endParaRPr lang="en-US" sz="1200" dirty="0">
+              <a:solidFill>
+                <a:srgbClr val="383838"/>
+              </a:solidFill>
+              <a:latin typeface="Times New Roman" panose="02020603050405020304" pitchFamily="18" charset="0"/>
+              <a:ea typeface="Noto Sans SC" pitchFamily="34" charset="-122"/>
+              <a:cs typeface="Times New Roman" panose="02020603050405020304" pitchFamily="18" charset="0"/>
+            </a:endParaRPr>
+          </a:p>
+          <a:p>
+            <a:pPr marL="342900" indent="-342900" algn="l">
+              <a:lnSpc>
+                <a:spcPct val="150000"/>
+              </a:lnSpc>
+              <a:buSzPct val="100000"/>
+              <a:buChar char="•"/>
+            </a:pPr>
+            <a:r>
+              <a:rPr lang="en-US" sz="1200" dirty="0">
+                <a:solidFill>
+                  <a:srgbClr val="383838"/>
+                </a:solidFill>
+                <a:latin typeface="Times New Roman" panose="02020603050405020304" pitchFamily="18" charset="0"/>
+                <a:ea typeface="Noto Sans SC" pitchFamily="34" charset="-122"/>
+                <a:cs typeface="Times New Roman" panose="02020603050405020304" pitchFamily="18" charset="0"/>
+              </a:rPr>
+              <a:t>Implementation</a:t>
+            </a:r>
+            <a:endParaRPr lang="en-US" sz="1200" dirty="0">
+              <a:solidFill>
+                <a:srgbClr val="383838"/>
+              </a:solidFill>
+              <a:latin typeface="Times New Roman" panose="02020603050405020304" pitchFamily="18" charset="0"/>
+              <a:ea typeface="Noto Sans SC" pitchFamily="34" charset="-122"/>
+              <a:cs typeface="Times New Roman" panose="02020603050405020304" pitchFamily="18" charset="0"/>
+            </a:endParaRPr>
+          </a:p>
+          <a:p>
+            <a:pPr marL="800100" lvl="1" indent="-342900">
+              <a:lnSpc>
+                <a:spcPct val="150000"/>
+              </a:lnSpc>
+              <a:buSzPct val="100000"/>
+              <a:buChar char="•"/>
+            </a:pPr>
+            <a:r>
+              <a:rPr lang="en-US" altLang="zh-CN" sz="1200" b="0" i="0" dirty="0">
+                <a:solidFill>
+                  <a:srgbClr val="060607"/>
+                </a:solidFill>
+                <a:effectLst/>
+                <a:latin typeface="Times New Roman" panose="02020603050405020304" pitchFamily="18" charset="0"/>
+                <a:cs typeface="Times New Roman" panose="02020603050405020304" pitchFamily="18" charset="0"/>
+              </a:rPr>
+              <a:t>Memory management</a:t>
+            </a:r>
+            <a:endParaRPr lang="en-US" altLang="zh-CN" sz="1200" b="0" i="0" dirty="0">
+              <a:solidFill>
+                <a:srgbClr val="060607"/>
+              </a:solidFill>
+              <a:effectLst/>
+              <a:latin typeface="Times New Roman" panose="02020603050405020304" pitchFamily="18" charset="0"/>
+              <a:cs typeface="Times New Roman" panose="02020603050405020304" pitchFamily="18" charset="0"/>
+            </a:endParaRPr>
+          </a:p>
+          <a:p>
+            <a:pPr marL="800100" lvl="1" indent="-342900">
+              <a:lnSpc>
+                <a:spcPct val="150000"/>
+              </a:lnSpc>
+              <a:buSzPct val="100000"/>
+              <a:buChar char="•"/>
+            </a:pPr>
+            <a:r>
+              <a:rPr lang="en-US" altLang="zh-CN" sz="1200" dirty="0">
+                <a:latin typeface="Times New Roman" panose="02020603050405020304" pitchFamily="18" charset="0"/>
+                <a:cs typeface="Times New Roman" panose="02020603050405020304" pitchFamily="18" charset="0"/>
+              </a:rPr>
+              <a:t>Scheduler</a:t>
+            </a:r>
+            <a:endParaRPr lang="en-US" altLang="zh-CN" sz="1200" dirty="0">
+              <a:latin typeface="Times New Roman" panose="02020603050405020304" pitchFamily="18" charset="0"/>
+              <a:cs typeface="Times New Roman" panose="02020603050405020304" pitchFamily="18" charset="0"/>
+            </a:endParaRPr>
+          </a:p>
+          <a:p>
+            <a:pPr marL="800100" lvl="1" indent="-342900">
+              <a:lnSpc>
+                <a:spcPct val="150000"/>
+              </a:lnSpc>
+              <a:buSzPct val="100000"/>
+              <a:buChar char="•"/>
+            </a:pPr>
+            <a:r>
+              <a:rPr lang="en-US" altLang="zh-CN" sz="1200" dirty="0">
+                <a:latin typeface="Times New Roman" panose="02020603050405020304" pitchFamily="18" charset="0"/>
+                <a:cs typeface="Times New Roman" panose="02020603050405020304" pitchFamily="18" charset="0"/>
+              </a:rPr>
+              <a:t>Compression</a:t>
+            </a:r>
+            <a:endParaRPr lang="en-US" altLang="zh-CN" sz="1200" dirty="0">
+              <a:latin typeface="Times New Roman" panose="02020603050405020304" pitchFamily="18" charset="0"/>
+              <a:cs typeface="Times New Roman" panose="02020603050405020304" pitchFamily="18" charset="0"/>
+            </a:endParaRPr>
+          </a:p>
+        </p:txBody>
+      </p:sp>
+      <p:sp>
+        <p:nvSpPr>
+          <p:cNvPr id="5" name="文本框 4"/>
+          <p:cNvSpPr txBox="1"/>
+          <p:nvPr/>
+        </p:nvSpPr>
+        <p:spPr>
+          <a:xfrm>
+            <a:off x="410210" y="4667250"/>
+            <a:ext cx="8143240" cy="398780"/>
+          </a:xfrm>
+          <a:prstGeom prst="rect">
+            <a:avLst/>
+          </a:prstGeom>
+          <a:noFill/>
+        </p:spPr>
+        <p:txBody>
+          <a:bodyPr wrap="square" rtlCol="0">
+            <a:spAutoFit/>
+          </a:bodyPr>
+          <a:p>
+            <a:r>
+              <a:rPr lang="en-US" altLang="zh-CN" sz="1000">
+                <a:latin typeface="Times New Roman" panose="02020603050405020304" pitchFamily="18" charset="0"/>
+                <a:cs typeface="Times New Roman" panose="02020603050405020304" pitchFamily="18" charset="0"/>
+              </a:rPr>
+              <a:t>[1]:https://github.com/vllm-project/vllm; </a:t>
+            </a:r>
+            <a:endParaRPr lang="en-US" altLang="zh-CN" sz="1000">
+              <a:latin typeface="Times New Roman" panose="02020603050405020304" pitchFamily="18" charset="0"/>
+              <a:cs typeface="Times New Roman" panose="02020603050405020304" pitchFamily="18" charset="0"/>
+            </a:endParaRPr>
+          </a:p>
+          <a:p>
+            <a:r>
+              <a:rPr lang="en-US" altLang="zh-CN" sz="1000">
+                <a:latin typeface="Times New Roman" panose="02020603050405020304" pitchFamily="18" charset="0"/>
+                <a:cs typeface="Times New Roman" panose="02020603050405020304" pitchFamily="18" charset="0"/>
+              </a:rPr>
+              <a:t>[2]:https://sharegpt.com/</a:t>
+            </a:r>
+            <a:endParaRPr lang="en-US" altLang="zh-CN" sz="1000">
+              <a:latin typeface="Times New Roman" panose="02020603050405020304" pitchFamily="18" charset="0"/>
+              <a:cs typeface="Times New Roman" panose="02020603050405020304" pitchFamily="18" charset="0"/>
+            </a:endParaRPr>
+          </a:p>
+        </p:txBody>
+      </p:sp>
+      <p:pic>
+        <p:nvPicPr>
+          <p:cNvPr id="9" name="图片 8"/>
+          <p:cNvPicPr>
+            <a:picLocks noChangeAspect="1"/>
+          </p:cNvPicPr>
+          <p:nvPr/>
+        </p:nvPicPr>
+        <p:blipFill>
+          <a:blip r:embed="rId1"/>
+          <a:stretch>
+            <a:fillRect/>
+          </a:stretch>
+        </p:blipFill>
+        <p:spPr>
+          <a:xfrm>
+            <a:off x="5409565" y="1046480"/>
+            <a:ext cx="2724785" cy="3786505"/>
+          </a:xfrm>
+          <a:prstGeom prst="rect">
+            <a:avLst/>
+          </a:prstGeom>
+        </p:spPr>
+      </p:pic>
+      <p:cxnSp>
+        <p:nvCxnSpPr>
+          <p:cNvPr id="10" name="直接箭头连接符 9"/>
+          <p:cNvCxnSpPr/>
+          <p:nvPr/>
+        </p:nvCxnSpPr>
+        <p:spPr>
+          <a:xfrm>
+            <a:off x="2350135" y="2854325"/>
+            <a:ext cx="2795905" cy="99060"/>
+          </a:xfrm>
+          <a:prstGeom prst="straightConnector1">
+            <a:avLst/>
+          </a:prstGeom>
+          <a:ln w="31750" cap="rnd">
+            <a:solidFill>
+              <a:srgbClr val="FF0000"/>
+            </a:solidFill>
+            <a:round/>
+            <a:tailEnd type="arrow" w="med" len="med"/>
+          </a:ln>
+        </p:spPr>
+        <p:style>
+          <a:lnRef idx="0">
+            <a:srgbClr val="FFFFFF"/>
+          </a:lnRef>
+          <a:fillRef idx="0">
+            <a:srgbClr val="FFFFFF"/>
+          </a:fillRef>
+          <a:effectRef idx="0">
+            <a:srgbClr val="FFFFFF"/>
+          </a:effectRef>
+          <a:fontRef idx="minor">
+            <a:schemeClr val="tx1"/>
+          </a:fontRef>
+        </p:style>
+      </p:cxnSp>
+    </p:spTree>
+  </p:cSld>
+  <p:clrMapOvr>
+    <a:masterClrMapping/>
+  </p:clrMapOvr>
+</p:sld>
+</file>
+
+<file path=ppt/slides/slide23.xml><?xml version="1.0" encoding="utf-8"?>
+<p:sld xmlns:a="http://schemas.openxmlformats.org/drawingml/2006/main" xmlns:r="http://schemas.openxmlformats.org/officeDocument/2006/relationships" xmlns:p="http://schemas.openxmlformats.org/presentationml/2006/main">
+  <p:cSld>
+    <p:spTree>
+      <p:nvGrpSpPr>
+        <p:cNvPr id="1" name=""/>
+        <p:cNvGrpSpPr/>
+        <p:nvPr/>
+      </p:nvGrpSpPr>
+      <p:grpSpPr>
+        <a:xfrm>
+          <a:off x="0" y="0"/>
+          <a:ext cx="0" cy="0"/>
+          <a:chOff x="0" y="0"/>
+          <a:chExt cx="0" cy="0"/>
+        </a:xfrm>
+      </p:grpSpPr>
+      <p:sp>
+        <p:nvSpPr>
+          <p:cNvPr id="2" name="Shape 0"/>
+          <p:cNvSpPr/>
+          <p:nvPr/>
+        </p:nvSpPr>
+        <p:spPr>
+          <a:xfrm>
+            <a:off x="762000" y="781050"/>
+            <a:ext cx="7806690" cy="2679"/>
+          </a:xfrm>
+          <a:prstGeom prst="rect">
+            <a:avLst/>
+          </a:prstGeom>
+          <a:solidFill>
+            <a:srgbClr val="646464"/>
+          </a:solidFill>
+        </p:spPr>
+      </p:sp>
+      <p:sp>
+        <p:nvSpPr>
+          <p:cNvPr id="3" name="Text 1"/>
+          <p:cNvSpPr/>
+          <p:nvPr/>
+        </p:nvSpPr>
+        <p:spPr>
+          <a:xfrm>
+            <a:off x="762000" y="228600"/>
+            <a:ext cx="7806690" cy="552450"/>
+          </a:xfrm>
+          <a:prstGeom prst="rect">
+            <a:avLst/>
+          </a:prstGeom>
+          <a:noFill/>
+        </p:spPr>
+        <p:txBody>
+          <a:bodyPr wrap="square" rtlCol="0" anchor="ctr"/>
+          <a:lstStyle/>
+          <a:p>
+            <a:pPr marL="0" indent="0">
+              <a:buNone/>
+            </a:pPr>
+            <a:r>
+              <a:rPr lang="en-US" sz="2400" dirty="0">
+                <a:latin typeface="Times New Roman" panose="02020603050405020304" pitchFamily="18" charset="0"/>
+                <a:cs typeface="Times New Roman" panose="02020603050405020304" pitchFamily="18" charset="0"/>
+              </a:rPr>
+              <a:t>Implementation</a:t>
+            </a:r>
+            <a:endParaRPr lang="en-US" sz="2400" dirty="0">
+              <a:latin typeface="Times New Roman" panose="02020603050405020304" pitchFamily="18" charset="0"/>
+              <a:cs typeface="Times New Roman" panose="02020603050405020304" pitchFamily="18" charset="0"/>
+            </a:endParaRPr>
+          </a:p>
+        </p:txBody>
+      </p:sp>
+      <p:sp>
+        <p:nvSpPr>
+          <p:cNvPr id="4" name="Text 2"/>
+          <p:cNvSpPr/>
+          <p:nvPr/>
+        </p:nvSpPr>
+        <p:spPr>
+          <a:xfrm>
+            <a:off x="762000" y="961390"/>
+            <a:ext cx="7715250" cy="3452813"/>
+          </a:xfrm>
+          <a:prstGeom prst="rect">
+            <a:avLst/>
+          </a:prstGeom>
+          <a:noFill/>
+        </p:spPr>
+        <p:txBody>
+          <a:bodyPr wrap="square" rtlCol="0" anchor="t"/>
+          <a:lstStyle/>
+          <a:p>
+            <a:pPr marL="342900" indent="-342900" algn="l">
+              <a:lnSpc>
+                <a:spcPct val="150000"/>
+              </a:lnSpc>
+              <a:buSzPct val="100000"/>
+              <a:buChar char="•"/>
+            </a:pPr>
+            <a:r>
+              <a:rPr lang="en-US" sz="1200" dirty="0">
+                <a:solidFill>
+                  <a:srgbClr val="383838"/>
+                </a:solidFill>
+                <a:latin typeface="Times New Roman" panose="02020603050405020304" pitchFamily="18" charset="0"/>
+                <a:ea typeface="Noto Sans SC" pitchFamily="34" charset="-122"/>
+                <a:cs typeface="Times New Roman" panose="02020603050405020304" pitchFamily="18" charset="0"/>
+              </a:rPr>
+              <a:t>Testbed</a:t>
+            </a:r>
+            <a:endParaRPr lang="en-US" sz="1200" dirty="0">
+              <a:solidFill>
+                <a:srgbClr val="383838"/>
+              </a:solidFill>
+              <a:latin typeface="Times New Roman" panose="02020603050405020304" pitchFamily="18" charset="0"/>
+              <a:ea typeface="Noto Sans SC" pitchFamily="34" charset="-122"/>
+              <a:cs typeface="Times New Roman" panose="02020603050405020304" pitchFamily="18" charset="0"/>
+            </a:endParaRPr>
+          </a:p>
+          <a:p>
+            <a:pPr marL="800100" lvl="1" indent="-342900" algn="l">
+              <a:lnSpc>
+                <a:spcPct val="150000"/>
+              </a:lnSpc>
+              <a:buSzPct val="100000"/>
+              <a:buChar char="•"/>
+            </a:pPr>
+            <a:r>
+              <a:rPr lang="en-US" sz="1200" dirty="0">
+                <a:solidFill>
+                  <a:srgbClr val="383838"/>
+                </a:solidFill>
+                <a:latin typeface="Times New Roman" panose="02020603050405020304" pitchFamily="18" charset="0"/>
+                <a:ea typeface="Noto Sans SC" pitchFamily="34" charset="-122"/>
+                <a:cs typeface="Times New Roman" panose="02020603050405020304" pitchFamily="18" charset="0"/>
+              </a:rPr>
+              <a:t>Based on vLLM framework [1]</a:t>
+            </a:r>
+            <a:endParaRPr lang="en-US" sz="1200" dirty="0">
+              <a:solidFill>
+                <a:srgbClr val="383838"/>
+              </a:solidFill>
+              <a:latin typeface="Times New Roman" panose="02020603050405020304" pitchFamily="18" charset="0"/>
+              <a:ea typeface="Noto Sans SC" pitchFamily="34" charset="-122"/>
+              <a:cs typeface="Times New Roman" panose="02020603050405020304" pitchFamily="18" charset="0"/>
+            </a:endParaRPr>
+          </a:p>
+          <a:p>
+            <a:pPr marL="800100" lvl="1" indent="-342900">
+              <a:lnSpc>
+                <a:spcPct val="150000"/>
+              </a:lnSpc>
+              <a:buSzPct val="100000"/>
+              <a:buChar char="•"/>
+            </a:pPr>
+            <a:r>
+              <a:rPr lang="en-US" altLang="zh-CN" sz="1200" b="0" i="0" dirty="0">
+                <a:solidFill>
+                  <a:srgbClr val="060607"/>
+                </a:solidFill>
+                <a:effectLst/>
+                <a:latin typeface="Times New Roman" panose="02020603050405020304" pitchFamily="18" charset="0"/>
+                <a:cs typeface="Times New Roman" panose="02020603050405020304" pitchFamily="18" charset="0"/>
+              </a:rPr>
+              <a:t>Models: OPT-6.7B, OPT-13B, Llama2-7B, Llama2-13B</a:t>
+            </a:r>
+            <a:endParaRPr lang="en-US" altLang="zh-CN" sz="1200" b="0" i="0" dirty="0">
+              <a:solidFill>
+                <a:srgbClr val="060607"/>
+              </a:solidFill>
+              <a:effectLst/>
+              <a:latin typeface="Times New Roman" panose="02020603050405020304" pitchFamily="18" charset="0"/>
+              <a:cs typeface="Times New Roman" panose="02020603050405020304" pitchFamily="18" charset="0"/>
+            </a:endParaRPr>
+          </a:p>
+          <a:p>
+            <a:pPr marL="800100" lvl="1" indent="-342900">
+              <a:lnSpc>
+                <a:spcPct val="150000"/>
+              </a:lnSpc>
+              <a:buSzPct val="100000"/>
+              <a:buChar char="•"/>
+            </a:pPr>
+            <a:r>
+              <a:rPr lang="en-US" sz="1200" dirty="0">
+                <a:solidFill>
+                  <a:srgbClr val="383838"/>
+                </a:solidFill>
+                <a:latin typeface="Times New Roman" panose="02020603050405020304" pitchFamily="18" charset="0"/>
+                <a:ea typeface="Noto Sans SC" pitchFamily="34" charset="-122"/>
+                <a:cs typeface="Times New Roman" panose="02020603050405020304" pitchFamily="18" charset="0"/>
+              </a:rPr>
+              <a:t>Datasets: sharedGPT [2]</a:t>
+            </a:r>
+            <a:endParaRPr lang="en-US" sz="1200" dirty="0">
+              <a:solidFill>
+                <a:srgbClr val="383838"/>
+              </a:solidFill>
+              <a:latin typeface="Times New Roman" panose="02020603050405020304" pitchFamily="18" charset="0"/>
+              <a:ea typeface="Noto Sans SC" pitchFamily="34" charset="-122"/>
+              <a:cs typeface="Times New Roman" panose="02020603050405020304" pitchFamily="18" charset="0"/>
+            </a:endParaRPr>
+          </a:p>
+          <a:p>
+            <a:pPr marL="342900" indent="-342900" algn="l">
+              <a:lnSpc>
+                <a:spcPct val="150000"/>
+              </a:lnSpc>
+              <a:buSzPct val="100000"/>
+              <a:buChar char="•"/>
+            </a:pPr>
+            <a:r>
+              <a:rPr lang="en-US" sz="1200" dirty="0">
+                <a:solidFill>
+                  <a:srgbClr val="383838"/>
+                </a:solidFill>
+                <a:latin typeface="Times New Roman" panose="02020603050405020304" pitchFamily="18" charset="0"/>
+                <a:ea typeface="Noto Sans SC" pitchFamily="34" charset="-122"/>
+                <a:cs typeface="Times New Roman" panose="02020603050405020304" pitchFamily="18" charset="0"/>
+              </a:rPr>
+              <a:t>Implementation</a:t>
+            </a:r>
+            <a:endParaRPr lang="en-US" sz="1200" dirty="0">
+              <a:solidFill>
+                <a:srgbClr val="383838"/>
+              </a:solidFill>
+              <a:latin typeface="Times New Roman" panose="02020603050405020304" pitchFamily="18" charset="0"/>
+              <a:ea typeface="Noto Sans SC" pitchFamily="34" charset="-122"/>
+              <a:cs typeface="Times New Roman" panose="02020603050405020304" pitchFamily="18" charset="0"/>
+            </a:endParaRPr>
+          </a:p>
+          <a:p>
+            <a:pPr marL="800100" lvl="1" indent="-342900">
+              <a:lnSpc>
+                <a:spcPct val="150000"/>
+              </a:lnSpc>
+              <a:buSzPct val="100000"/>
+              <a:buChar char="•"/>
+            </a:pPr>
+            <a:r>
+              <a:rPr lang="en-US" altLang="zh-CN" sz="1200" b="0" i="0" dirty="0">
+                <a:solidFill>
+                  <a:srgbClr val="060607"/>
+                </a:solidFill>
+                <a:effectLst/>
+                <a:latin typeface="Times New Roman" panose="02020603050405020304" pitchFamily="18" charset="0"/>
+                <a:cs typeface="Times New Roman" panose="02020603050405020304" pitchFamily="18" charset="0"/>
+              </a:rPr>
+              <a:t>Memory management</a:t>
+            </a:r>
+            <a:endParaRPr lang="en-US" altLang="zh-CN" sz="1200" b="0" i="0" dirty="0">
+              <a:solidFill>
+                <a:srgbClr val="060607"/>
+              </a:solidFill>
+              <a:effectLst/>
+              <a:latin typeface="Times New Roman" panose="02020603050405020304" pitchFamily="18" charset="0"/>
+              <a:cs typeface="Times New Roman" panose="02020603050405020304" pitchFamily="18" charset="0"/>
+            </a:endParaRPr>
+          </a:p>
+          <a:p>
+            <a:pPr marL="800100" lvl="1" indent="-342900">
+              <a:lnSpc>
+                <a:spcPct val="150000"/>
+              </a:lnSpc>
+              <a:buSzPct val="100000"/>
+              <a:buChar char="•"/>
+            </a:pPr>
+            <a:r>
+              <a:rPr lang="en-US" altLang="zh-CN" sz="1200" dirty="0">
+                <a:latin typeface="Times New Roman" panose="02020603050405020304" pitchFamily="18" charset="0"/>
+                <a:cs typeface="Times New Roman" panose="02020603050405020304" pitchFamily="18" charset="0"/>
+              </a:rPr>
+              <a:t>Scheduler</a:t>
+            </a:r>
+            <a:endParaRPr lang="en-US" altLang="zh-CN" sz="1200" dirty="0">
+              <a:latin typeface="Times New Roman" panose="02020603050405020304" pitchFamily="18" charset="0"/>
+              <a:cs typeface="Times New Roman" panose="02020603050405020304" pitchFamily="18" charset="0"/>
+            </a:endParaRPr>
+          </a:p>
+          <a:p>
+            <a:pPr marL="800100" lvl="1" indent="-342900">
+              <a:lnSpc>
+                <a:spcPct val="150000"/>
+              </a:lnSpc>
+              <a:buSzPct val="100000"/>
+              <a:buChar char="•"/>
+            </a:pPr>
+            <a:r>
+              <a:rPr lang="en-US" altLang="zh-CN" sz="1200" dirty="0">
+                <a:latin typeface="Times New Roman" panose="02020603050405020304" pitchFamily="18" charset="0"/>
+                <a:cs typeface="Times New Roman" panose="02020603050405020304" pitchFamily="18" charset="0"/>
+              </a:rPr>
+              <a:t>Compression</a:t>
+            </a:r>
+            <a:endParaRPr lang="en-US" altLang="zh-CN" sz="1200" dirty="0">
+              <a:latin typeface="Times New Roman" panose="02020603050405020304" pitchFamily="18" charset="0"/>
+              <a:cs typeface="Times New Roman" panose="02020603050405020304" pitchFamily="18" charset="0"/>
+            </a:endParaRPr>
+          </a:p>
+        </p:txBody>
+      </p:sp>
+      <p:sp>
+        <p:nvSpPr>
+          <p:cNvPr id="5" name="文本框 4"/>
+          <p:cNvSpPr txBox="1"/>
+          <p:nvPr/>
+        </p:nvSpPr>
+        <p:spPr>
+          <a:xfrm>
+            <a:off x="410210" y="4667250"/>
+            <a:ext cx="8143240" cy="398780"/>
+          </a:xfrm>
+          <a:prstGeom prst="rect">
+            <a:avLst/>
+          </a:prstGeom>
+          <a:noFill/>
+        </p:spPr>
+        <p:txBody>
+          <a:bodyPr wrap="square" rtlCol="0">
+            <a:spAutoFit/>
+          </a:bodyPr>
+          <a:p>
+            <a:r>
+              <a:rPr lang="en-US" altLang="zh-CN" sz="1000">
+                <a:latin typeface="Times New Roman" panose="02020603050405020304" pitchFamily="18" charset="0"/>
+                <a:cs typeface="Times New Roman" panose="02020603050405020304" pitchFamily="18" charset="0"/>
+              </a:rPr>
+              <a:t>[1]:https://github.com/vllm-project/vllm; </a:t>
+            </a:r>
+            <a:endParaRPr lang="en-US" altLang="zh-CN" sz="1000">
+              <a:latin typeface="Times New Roman" panose="02020603050405020304" pitchFamily="18" charset="0"/>
+              <a:cs typeface="Times New Roman" panose="02020603050405020304" pitchFamily="18" charset="0"/>
+            </a:endParaRPr>
+          </a:p>
+          <a:p>
+            <a:r>
+              <a:rPr lang="en-US" altLang="zh-CN" sz="1000">
+                <a:latin typeface="Times New Roman" panose="02020603050405020304" pitchFamily="18" charset="0"/>
+                <a:cs typeface="Times New Roman" panose="02020603050405020304" pitchFamily="18" charset="0"/>
+              </a:rPr>
+              <a:t>[2]:https://sharegpt.com/</a:t>
+            </a:r>
+            <a:endParaRPr lang="en-US" altLang="zh-CN" sz="1000">
+              <a:latin typeface="Times New Roman" panose="02020603050405020304" pitchFamily="18" charset="0"/>
+              <a:cs typeface="Times New Roman" panose="02020603050405020304" pitchFamily="18" charset="0"/>
+            </a:endParaRPr>
+          </a:p>
+        </p:txBody>
+      </p:sp>
+      <p:pic>
+        <p:nvPicPr>
+          <p:cNvPr id="8" name="图片 7"/>
+          <p:cNvPicPr>
+            <a:picLocks noChangeAspect="1"/>
+          </p:cNvPicPr>
+          <p:nvPr/>
+        </p:nvPicPr>
+        <p:blipFill>
+          <a:blip r:embed="rId1"/>
+          <a:stretch>
+            <a:fillRect/>
+          </a:stretch>
+        </p:blipFill>
+        <p:spPr>
+          <a:xfrm>
+            <a:off x="5200015" y="1615440"/>
+            <a:ext cx="3734435" cy="3088640"/>
+          </a:xfrm>
+          <a:prstGeom prst="rect">
+            <a:avLst/>
+          </a:prstGeom>
+        </p:spPr>
+      </p:pic>
+      <p:cxnSp>
+        <p:nvCxnSpPr>
+          <p:cNvPr id="10" name="直接箭头连接符 9"/>
+          <p:cNvCxnSpPr/>
+          <p:nvPr/>
+        </p:nvCxnSpPr>
+        <p:spPr>
+          <a:xfrm flipV="1">
+            <a:off x="2567305" y="2953385"/>
+            <a:ext cx="2488565" cy="158750"/>
+          </a:xfrm>
+          <a:prstGeom prst="straightConnector1">
+            <a:avLst/>
+          </a:prstGeom>
+          <a:ln w="31750" cap="rnd">
+            <a:solidFill>
+              <a:srgbClr val="FF0000"/>
+            </a:solidFill>
+            <a:round/>
+            <a:tailEnd type="arrow" w="med" len="med"/>
+          </a:ln>
+        </p:spPr>
+        <p:style>
+          <a:lnRef idx="0">
+            <a:srgbClr val="FFFFFF"/>
+          </a:lnRef>
+          <a:fillRef idx="0">
+            <a:srgbClr val="FFFFFF"/>
+          </a:fillRef>
+          <a:effectRef idx="0">
+            <a:srgbClr val="FFFFFF"/>
+          </a:effectRef>
+          <a:fontRef idx="minor">
+            <a:schemeClr val="tx1"/>
+          </a:fontRef>
+        </p:style>
+      </p:cxnSp>
+    </p:spTree>
+  </p:cSld>
+  <p:clrMapOvr>
+    <a:masterClrMapping/>
+  </p:clrMapOvr>
+</p:sld>
+</file>
+
+<file path=ppt/slides/slide24.xml><?xml version="1.0" encoding="utf-8"?>
+<p:sld xmlns:a="http://schemas.openxmlformats.org/drawingml/2006/main" xmlns:r="http://schemas.openxmlformats.org/officeDocument/2006/relationships" xmlns:p="http://schemas.openxmlformats.org/presentationml/2006/main">
+  <p:cSld>
+    <p:spTree>
+      <p:nvGrpSpPr>
+        <p:cNvPr id="1" name=""/>
+        <p:cNvGrpSpPr/>
+        <p:nvPr/>
+      </p:nvGrpSpPr>
+      <p:grpSpPr>
+        <a:xfrm>
+          <a:off x="0" y="0"/>
+          <a:ext cx="0" cy="0"/>
+          <a:chOff x="0" y="0"/>
+          <a:chExt cx="0" cy="0"/>
+        </a:xfrm>
+      </p:grpSpPr>
+      <p:sp>
+        <p:nvSpPr>
+          <p:cNvPr id="2" name="Text 0"/>
+          <p:cNvSpPr/>
+          <p:nvPr/>
+        </p:nvSpPr>
+        <p:spPr>
+          <a:xfrm>
+            <a:off x="965179" y="1181416"/>
+            <a:ext cx="1452563" cy="1243013"/>
+          </a:xfrm>
+          <a:prstGeom prst="rect">
+            <a:avLst/>
+          </a:prstGeom>
+          <a:noFill/>
+        </p:spPr>
+        <p:txBody>
+          <a:bodyPr wrap="square" rtlCol="0" anchor="t"/>
+          <a:lstStyle/>
+          <a:p>
+            <a:pPr marL="0" indent="0">
+              <a:buNone/>
+            </a:pPr>
+            <a:r>
+              <a:rPr lang="en-US" sz="6000" b="1" dirty="0">
+                <a:solidFill>
+                  <a:srgbClr val="646464"/>
+                </a:solidFill>
+                <a:latin typeface="Times New Roman" panose="02020603050405020304" pitchFamily="18" charset="0"/>
+                <a:ea typeface="Noto Sans SC" pitchFamily="34" charset="-122"/>
+                <a:cs typeface="Times New Roman" panose="02020603050405020304" pitchFamily="18" charset="0"/>
+              </a:rPr>
+              <a:t>05</a:t>
+            </a:r>
+            <a:endParaRPr lang="en-US" sz="6000" dirty="0">
+              <a:latin typeface="Times New Roman" panose="02020603050405020304" pitchFamily="18" charset="0"/>
+              <a:cs typeface="Times New Roman" panose="02020603050405020304" pitchFamily="18" charset="0"/>
+            </a:endParaRPr>
+          </a:p>
+        </p:txBody>
+      </p:sp>
+      <p:sp>
+        <p:nvSpPr>
+          <p:cNvPr id="3" name="Text 1"/>
+          <p:cNvSpPr/>
+          <p:nvPr/>
+        </p:nvSpPr>
+        <p:spPr>
+          <a:xfrm>
+            <a:off x="965179" y="2493027"/>
+            <a:ext cx="7016140" cy="1676400"/>
+          </a:xfrm>
+          <a:prstGeom prst="rect">
+            <a:avLst/>
+          </a:prstGeom>
+          <a:noFill/>
+        </p:spPr>
+        <p:txBody>
+          <a:bodyPr wrap="square" rtlCol="0" anchor="t"/>
+          <a:lstStyle/>
+          <a:p>
+            <a:pPr marL="0" indent="0">
+              <a:buNone/>
+            </a:pPr>
+            <a:r>
+              <a:rPr lang="en-US" altLang="zh-CN" sz="3200" b="1" dirty="0">
+                <a:latin typeface="Times New Roman" panose="02020603050405020304" pitchFamily="18" charset="0"/>
+                <a:cs typeface="Times New Roman" panose="02020603050405020304" pitchFamily="18" charset="0"/>
+              </a:rPr>
+              <a:t>Our</a:t>
+            </a:r>
+            <a:r>
+              <a:rPr lang="zh-CN" altLang="en-US" sz="3200" b="1" dirty="0">
+                <a:latin typeface="Times New Roman" panose="02020603050405020304" pitchFamily="18" charset="0"/>
+                <a:cs typeface="Times New Roman" panose="02020603050405020304" pitchFamily="18" charset="0"/>
+              </a:rPr>
+              <a:t> </a:t>
+            </a:r>
+            <a:r>
+              <a:rPr lang="en-US" altLang="zh-CN" sz="3200" b="1" dirty="0">
+                <a:latin typeface="Times New Roman" panose="02020603050405020304" pitchFamily="18" charset="0"/>
+                <a:cs typeface="Times New Roman" panose="02020603050405020304" pitchFamily="18" charset="0"/>
+              </a:rPr>
+              <a:t>Experiment</a:t>
+            </a:r>
+            <a:r>
+              <a:rPr lang="zh-CN" altLang="en-US" sz="3200" b="1" dirty="0">
+                <a:latin typeface="Times New Roman" panose="02020603050405020304" pitchFamily="18" charset="0"/>
+                <a:cs typeface="Times New Roman" panose="02020603050405020304" pitchFamily="18" charset="0"/>
+              </a:rPr>
+              <a:t> </a:t>
+            </a:r>
+            <a:r>
+              <a:rPr lang="en-US" altLang="zh-CN" sz="3200" b="1" dirty="0">
+                <a:latin typeface="Times New Roman" panose="02020603050405020304" pitchFamily="18" charset="0"/>
+                <a:cs typeface="Times New Roman" panose="02020603050405020304" pitchFamily="18" charset="0"/>
+              </a:rPr>
+              <a:t>and</a:t>
+            </a:r>
+            <a:r>
+              <a:rPr lang="zh-CN" altLang="en-US" sz="3200" b="1" dirty="0">
+                <a:latin typeface="Times New Roman" panose="02020603050405020304" pitchFamily="18" charset="0"/>
+                <a:cs typeface="Times New Roman" panose="02020603050405020304" pitchFamily="18" charset="0"/>
+              </a:rPr>
+              <a:t> </a:t>
+            </a:r>
+            <a:r>
+              <a:rPr lang="en-US" altLang="zh-CN" sz="3200" b="1" dirty="0">
+                <a:latin typeface="Times New Roman" panose="02020603050405020304" pitchFamily="18" charset="0"/>
+                <a:cs typeface="Times New Roman" panose="02020603050405020304" pitchFamily="18" charset="0"/>
+              </a:rPr>
+              <a:t>Conclusions</a:t>
+            </a:r>
+            <a:endParaRPr lang="en-US" sz="3200" b="1" dirty="0">
+              <a:latin typeface="Times New Roman" panose="02020603050405020304" pitchFamily="18" charset="0"/>
+              <a:cs typeface="Times New Roman" panose="02020603050405020304" pitchFamily="18" charset="0"/>
+            </a:endParaRPr>
+          </a:p>
+        </p:txBody>
+      </p:sp>
+    </p:spTree>
+  </p:cSld>
+  <p:clrMapOvr>
+    <a:masterClrMapping/>
+  </p:clrMapOvr>
+</p:sld>
+</file>
+
+<file path=ppt/slides/slide25.xml><?xml version="1.0" encoding="utf-8"?>
+<p:sld xmlns:a="http://schemas.openxmlformats.org/drawingml/2006/main" xmlns:r="http://schemas.openxmlformats.org/officeDocument/2006/relationships" xmlns:p="http://schemas.openxmlformats.org/presentationml/2006/main">
+  <p:cSld>
+    <p:spTree>
+      <p:nvGrpSpPr>
+        <p:cNvPr id="1" name=""/>
+        <p:cNvGrpSpPr/>
+        <p:nvPr/>
+      </p:nvGrpSpPr>
+      <p:grpSpPr>
+        <a:xfrm>
+          <a:off x="0" y="0"/>
+          <a:ext cx="0" cy="0"/>
+          <a:chOff x="0" y="0"/>
+          <a:chExt cx="0" cy="0"/>
+        </a:xfrm>
+      </p:grpSpPr>
+      <p:sp>
+        <p:nvSpPr>
+          <p:cNvPr id="2" name="Shape 0"/>
+          <p:cNvSpPr/>
+          <p:nvPr/>
+        </p:nvSpPr>
+        <p:spPr>
+          <a:xfrm>
+            <a:off x="762000" y="781050"/>
+            <a:ext cx="7806690" cy="2679"/>
+          </a:xfrm>
+          <a:prstGeom prst="rect">
+            <a:avLst/>
+          </a:prstGeom>
+          <a:solidFill>
+            <a:srgbClr val="646464"/>
+          </a:solidFill>
+        </p:spPr>
+      </p:sp>
+      <p:sp>
+        <p:nvSpPr>
+          <p:cNvPr id="3" name="Text 1"/>
+          <p:cNvSpPr/>
+          <p:nvPr/>
+        </p:nvSpPr>
+        <p:spPr>
+          <a:xfrm>
+            <a:off x="762000" y="228600"/>
+            <a:ext cx="7806690" cy="552450"/>
+          </a:xfrm>
+          <a:prstGeom prst="rect">
+            <a:avLst/>
+          </a:prstGeom>
+          <a:noFill/>
+        </p:spPr>
+        <p:txBody>
+          <a:bodyPr wrap="square" rtlCol="0" anchor="ctr"/>
+          <a:lstStyle/>
+          <a:p>
+            <a:pPr marL="0" indent="0">
+              <a:buNone/>
+            </a:pPr>
+            <a:r>
+              <a:rPr lang="en-US" sz="2400" dirty="0">
                 <a:solidFill>
                   <a:srgbClr val="383838"/>
                 </a:solidFill>
@@ -20217,7 +23335,7 @@
         </p:blipFill>
         <p:spPr>
           <a:xfrm>
-            <a:off x="6378315" y="2998605"/>
+            <a:off x="6378950" y="3044325"/>
             <a:ext cx="2657237" cy="1771491"/>
           </a:xfrm>
           <a:prstGeom prst="rect">
@@ -20289,7 +23407,7 @@
         </p:blipFill>
         <p:spPr>
           <a:xfrm>
-            <a:off x="3542340" y="2923594"/>
+            <a:off x="3542975" y="3044244"/>
             <a:ext cx="2835977" cy="1890651"/>
           </a:xfrm>
           <a:prstGeom prst="rect">
@@ -20305,7 +23423,1075 @@
 </p:sld>
 </file>
 
-<file path=ppt/slides/slide22.xml><?xml version="1.0" encoding="utf-8"?>
+<file path=ppt/slides/slide26.xml><?xml version="1.0" encoding="utf-8"?>
+<p:sld xmlns:a="http://schemas.openxmlformats.org/drawingml/2006/main" xmlns:r="http://schemas.openxmlformats.org/officeDocument/2006/relationships" xmlns:p="http://schemas.openxmlformats.org/presentationml/2006/main">
+  <p:cSld>
+    <p:spTree>
+      <p:nvGrpSpPr>
+        <p:cNvPr id="1" name=""/>
+        <p:cNvGrpSpPr/>
+        <p:nvPr/>
+      </p:nvGrpSpPr>
+      <p:grpSpPr>
+        <a:xfrm>
+          <a:off x="0" y="0"/>
+          <a:ext cx="0" cy="0"/>
+          <a:chOff x="0" y="0"/>
+          <a:chExt cx="0" cy="0"/>
+        </a:xfrm>
+      </p:grpSpPr>
+      <p:sp>
+        <p:nvSpPr>
+          <p:cNvPr id="2" name="Shape 0"/>
+          <p:cNvSpPr/>
+          <p:nvPr/>
+        </p:nvSpPr>
+        <p:spPr>
+          <a:xfrm>
+            <a:off x="762000" y="781050"/>
+            <a:ext cx="7806690" cy="2679"/>
+          </a:xfrm>
+          <a:prstGeom prst="rect">
+            <a:avLst/>
+          </a:prstGeom>
+          <a:solidFill>
+            <a:srgbClr val="646464"/>
+          </a:solidFill>
+        </p:spPr>
+      </p:sp>
+      <p:sp>
+        <p:nvSpPr>
+          <p:cNvPr id="3" name="Text 1"/>
+          <p:cNvSpPr/>
+          <p:nvPr/>
+        </p:nvSpPr>
+        <p:spPr>
+          <a:xfrm>
+            <a:off x="762000" y="228600"/>
+            <a:ext cx="7806690" cy="552450"/>
+          </a:xfrm>
+          <a:prstGeom prst="rect">
+            <a:avLst/>
+          </a:prstGeom>
+          <a:noFill/>
+        </p:spPr>
+        <p:txBody>
+          <a:bodyPr wrap="square" rtlCol="0" anchor="ctr"/>
+          <a:lstStyle/>
+          <a:p>
+            <a:pPr marL="0" indent="0">
+              <a:buNone/>
+            </a:pPr>
+            <a:r>
+              <a:rPr lang="en-US" sz="2400" dirty="0">
+                <a:solidFill>
+                  <a:srgbClr val="383838"/>
+                </a:solidFill>
+                <a:latin typeface="Times New Roman" panose="02020603050405020304" pitchFamily="18" charset="0"/>
+                <a:ea typeface="Noto Sans SC" pitchFamily="34" charset="-122"/>
+                <a:cs typeface="Times New Roman" panose="02020603050405020304" pitchFamily="18" charset="0"/>
+              </a:rPr>
+              <a:t>Experiment and Conclusion</a:t>
+            </a:r>
+            <a:endParaRPr lang="en-US" sz="2400" dirty="0">
+              <a:latin typeface="Times New Roman" panose="02020603050405020304" pitchFamily="18" charset="0"/>
+              <a:cs typeface="Times New Roman" panose="02020603050405020304" pitchFamily="18" charset="0"/>
+            </a:endParaRPr>
+          </a:p>
+        </p:txBody>
+      </p:sp>
+      <p:sp>
+        <p:nvSpPr>
+          <p:cNvPr id="5" name="内容占位符 2"/>
+          <p:cNvSpPr txBox="1"/>
+          <p:nvPr/>
+        </p:nvSpPr>
+        <p:spPr>
+          <a:xfrm>
+            <a:off x="469265" y="1007110"/>
+            <a:ext cx="8101965" cy="440690"/>
+          </a:xfrm>
+          <a:prstGeom prst="rect">
+            <a:avLst/>
+          </a:prstGeom>
+        </p:spPr>
+        <p:txBody>
+          <a:bodyPr>
+            <a:normAutofit/>
+          </a:bodyPr>
+          <a:lstStyle>
+            <a:lvl1pPr marL="342900" indent="-342900" algn="l" defTabSz="914400" rtl="0" eaLnBrk="1" latinLnBrk="0" hangingPunct="1">
+              <a:spcBef>
+                <a:spcPct val="20000"/>
+              </a:spcBef>
+              <a:buFont typeface="Arial" panose="020B0604020202020204" pitchFamily="34" charset="0"/>
+              <a:buChar char="•"/>
+              <a:defRPr sz="3200" kern="1200">
+                <a:solidFill>
+                  <a:schemeClr val="tx1"/>
+                </a:solidFill>
+                <a:latin typeface="+mn-lt"/>
+                <a:ea typeface="+mn-ea"/>
+                <a:cs typeface="+mn-cs"/>
+              </a:defRPr>
+            </a:lvl1pPr>
+            <a:lvl2pPr marL="742950" indent="-285750" algn="l" defTabSz="914400" rtl="0" eaLnBrk="1" latinLnBrk="0" hangingPunct="1">
+              <a:spcBef>
+                <a:spcPct val="20000"/>
+              </a:spcBef>
+              <a:buFont typeface="Arial" panose="020B0604020202020204" pitchFamily="34" charset="0"/>
+              <a:buChar char="–"/>
+              <a:defRPr sz="2800" kern="1200">
+                <a:solidFill>
+                  <a:schemeClr val="tx1"/>
+                </a:solidFill>
+                <a:latin typeface="+mn-lt"/>
+                <a:ea typeface="+mn-ea"/>
+                <a:cs typeface="+mn-cs"/>
+              </a:defRPr>
+            </a:lvl2pPr>
+            <a:lvl3pPr marL="1143000" indent="-228600" algn="l" defTabSz="914400" rtl="0" eaLnBrk="1" latinLnBrk="0" hangingPunct="1">
+              <a:spcBef>
+                <a:spcPct val="20000"/>
+              </a:spcBef>
+              <a:buFont typeface="Arial" panose="020B0604020202020204" pitchFamily="34" charset="0"/>
+              <a:buChar char="•"/>
+              <a:defRPr sz="2400" kern="1200">
+                <a:solidFill>
+                  <a:schemeClr val="tx1"/>
+                </a:solidFill>
+                <a:latin typeface="+mn-lt"/>
+                <a:ea typeface="+mn-ea"/>
+                <a:cs typeface="+mn-cs"/>
+              </a:defRPr>
+            </a:lvl3pPr>
+            <a:lvl4pPr marL="1600200" indent="-228600" algn="l" defTabSz="914400" rtl="0" eaLnBrk="1" latinLnBrk="0" hangingPunct="1">
+              <a:spcBef>
+                <a:spcPct val="20000"/>
+              </a:spcBef>
+              <a:buFont typeface="Arial" panose="020B0604020202020204" pitchFamily="34" charset="0"/>
+              <a:buChar char="–"/>
+              <a:defRPr sz="2000" kern="1200">
+                <a:solidFill>
+                  <a:schemeClr val="tx1"/>
+                </a:solidFill>
+                <a:latin typeface="+mn-lt"/>
+                <a:ea typeface="+mn-ea"/>
+                <a:cs typeface="+mn-cs"/>
+              </a:defRPr>
+            </a:lvl4pPr>
+            <a:lvl5pPr marL="2057400" indent="-228600" algn="l" defTabSz="914400" rtl="0" eaLnBrk="1" latinLnBrk="0" hangingPunct="1">
+              <a:spcBef>
+                <a:spcPct val="20000"/>
+              </a:spcBef>
+              <a:buFont typeface="Arial" panose="020B0604020202020204" pitchFamily="34" charset="0"/>
+              <a:buChar char="»"/>
+              <a:defRPr sz="2000" kern="1200">
+                <a:solidFill>
+                  <a:schemeClr val="tx1"/>
+                </a:solidFill>
+                <a:latin typeface="+mn-lt"/>
+                <a:ea typeface="+mn-ea"/>
+                <a:cs typeface="+mn-cs"/>
+              </a:defRPr>
+            </a:lvl5pPr>
+            <a:lvl6pPr marL="2514600" indent="-228600" algn="l" defTabSz="914400" rtl="0" eaLnBrk="1" latinLnBrk="0" hangingPunct="1">
+              <a:spcBef>
+                <a:spcPct val="20000"/>
+              </a:spcBef>
+              <a:buFont typeface="Arial" panose="020B0604020202020204" pitchFamily="34" charset="0"/>
+              <a:buChar char="•"/>
+              <a:defRPr sz="2000" kern="1200">
+                <a:solidFill>
+                  <a:schemeClr val="tx1"/>
+                </a:solidFill>
+                <a:latin typeface="+mn-lt"/>
+                <a:ea typeface="+mn-ea"/>
+                <a:cs typeface="+mn-cs"/>
+              </a:defRPr>
+            </a:lvl6pPr>
+            <a:lvl7pPr marL="2971800" indent="-228600" algn="l" defTabSz="914400" rtl="0" eaLnBrk="1" latinLnBrk="0" hangingPunct="1">
+              <a:spcBef>
+                <a:spcPct val="20000"/>
+              </a:spcBef>
+              <a:buFont typeface="Arial" panose="020B0604020202020204" pitchFamily="34" charset="0"/>
+              <a:buChar char="•"/>
+              <a:defRPr sz="2000" kern="1200">
+                <a:solidFill>
+                  <a:schemeClr val="tx1"/>
+                </a:solidFill>
+                <a:latin typeface="+mn-lt"/>
+                <a:ea typeface="+mn-ea"/>
+                <a:cs typeface="+mn-cs"/>
+              </a:defRPr>
+            </a:lvl7pPr>
+            <a:lvl8pPr marL="3429000" indent="-228600" algn="l" defTabSz="914400" rtl="0" eaLnBrk="1" latinLnBrk="0" hangingPunct="1">
+              <a:spcBef>
+                <a:spcPct val="20000"/>
+              </a:spcBef>
+              <a:buFont typeface="Arial" panose="020B0604020202020204" pitchFamily="34" charset="0"/>
+              <a:buChar char="•"/>
+              <a:defRPr sz="2000" kern="1200">
+                <a:solidFill>
+                  <a:schemeClr val="tx1"/>
+                </a:solidFill>
+                <a:latin typeface="+mn-lt"/>
+                <a:ea typeface="+mn-ea"/>
+                <a:cs typeface="+mn-cs"/>
+              </a:defRPr>
+            </a:lvl8pPr>
+            <a:lvl9pPr marL="3886200" indent="-228600" algn="l" defTabSz="914400" rtl="0" eaLnBrk="1" latinLnBrk="0" hangingPunct="1">
+              <a:spcBef>
+                <a:spcPct val="20000"/>
+              </a:spcBef>
+              <a:buFont typeface="Arial" panose="020B0604020202020204" pitchFamily="34" charset="0"/>
+              <a:buChar char="•"/>
+              <a:defRPr sz="2000" kern="1200">
+                <a:solidFill>
+                  <a:schemeClr val="tx1"/>
+                </a:solidFill>
+                <a:latin typeface="+mn-lt"/>
+                <a:ea typeface="+mn-ea"/>
+                <a:cs typeface="+mn-cs"/>
+              </a:defRPr>
+            </a:lvl9pPr>
+          </a:lstStyle>
+          <a:p>
+            <a:r>
+              <a:rPr lang="en-US" altLang="zh-CN" sz="1400" dirty="0">
+                <a:latin typeface="Times New Roman" panose="02020603050405020304" pitchFamily="18" charset="0"/>
+                <a:cs typeface="Times New Roman" panose="02020603050405020304" pitchFamily="18" charset="0"/>
+              </a:rPr>
+              <a:t>Latency Reduction vs prompt length</a:t>
+            </a:r>
+            <a:endParaRPr lang="en-US" altLang="zh-CN" sz="1400" dirty="0">
+              <a:latin typeface="Times New Roman" panose="02020603050405020304" pitchFamily="18" charset="0"/>
+              <a:cs typeface="Times New Roman" panose="02020603050405020304" pitchFamily="18" charset="0"/>
+            </a:endParaRPr>
+          </a:p>
+        </p:txBody>
+      </p:sp>
+      <p:pic>
+        <p:nvPicPr>
+          <p:cNvPr id="15" name="图片 14"/>
+          <p:cNvPicPr/>
+          <p:nvPr/>
+        </p:nvPicPr>
+        <p:blipFill>
+          <a:blip r:embed="rId1"/>
+          <a:stretch>
+            <a:fillRect/>
+          </a:stretch>
+        </p:blipFill>
+        <p:spPr>
+          <a:xfrm>
+            <a:off x="469265" y="2171065"/>
+            <a:ext cx="3604260" cy="1890395"/>
+          </a:xfrm>
+          <a:prstGeom prst="rect">
+            <a:avLst/>
+          </a:prstGeom>
+        </p:spPr>
+      </p:pic>
+      <p:pic>
+        <p:nvPicPr>
+          <p:cNvPr id="16" name="图片 15"/>
+          <p:cNvPicPr/>
+          <p:nvPr/>
+        </p:nvPicPr>
+        <p:blipFill>
+          <a:blip r:embed="rId2"/>
+          <a:stretch>
+            <a:fillRect/>
+          </a:stretch>
+        </p:blipFill>
+        <p:spPr>
+          <a:xfrm>
+            <a:off x="4285615" y="3138805"/>
+            <a:ext cx="2190750" cy="1638300"/>
+          </a:xfrm>
+          <a:prstGeom prst="rect">
+            <a:avLst/>
+          </a:prstGeom>
+        </p:spPr>
+      </p:pic>
+      <p:pic>
+        <p:nvPicPr>
+          <p:cNvPr id="17" name="图片 16"/>
+          <p:cNvPicPr/>
+          <p:nvPr/>
+        </p:nvPicPr>
+        <p:blipFill>
+          <a:blip r:embed="rId3"/>
+          <a:stretch>
+            <a:fillRect/>
+          </a:stretch>
+        </p:blipFill>
+        <p:spPr>
+          <a:xfrm>
+            <a:off x="6476365" y="3138805"/>
+            <a:ext cx="2190750" cy="1638300"/>
+          </a:xfrm>
+          <a:prstGeom prst="rect">
+            <a:avLst/>
+          </a:prstGeom>
+        </p:spPr>
+      </p:pic>
+      <p:pic>
+        <p:nvPicPr>
+          <p:cNvPr id="18" name="图片 17"/>
+          <p:cNvPicPr/>
+          <p:nvPr/>
+        </p:nvPicPr>
+        <p:blipFill>
+          <a:blip r:embed="rId4"/>
+          <a:stretch>
+            <a:fillRect/>
+          </a:stretch>
+        </p:blipFill>
+        <p:spPr>
+          <a:xfrm>
+            <a:off x="4285615" y="1447800"/>
+            <a:ext cx="2190750" cy="1638300"/>
+          </a:xfrm>
+          <a:prstGeom prst="rect">
+            <a:avLst/>
+          </a:prstGeom>
+        </p:spPr>
+      </p:pic>
+      <p:pic>
+        <p:nvPicPr>
+          <p:cNvPr id="19" name="图片 18"/>
+          <p:cNvPicPr/>
+          <p:nvPr/>
+        </p:nvPicPr>
+        <p:blipFill>
+          <a:blip r:embed="rId5"/>
+          <a:stretch>
+            <a:fillRect/>
+          </a:stretch>
+        </p:blipFill>
+        <p:spPr>
+          <a:xfrm>
+            <a:off x="6476365" y="1447800"/>
+            <a:ext cx="2190750" cy="1638300"/>
+          </a:xfrm>
+          <a:prstGeom prst="rect">
+            <a:avLst/>
+          </a:prstGeom>
+        </p:spPr>
+      </p:pic>
+    </p:spTree>
+  </p:cSld>
+  <p:clrMapOvr>
+    <a:masterClrMapping/>
+  </p:clrMapOvr>
+</p:sld>
+</file>
+
+<file path=ppt/slides/slide27.xml><?xml version="1.0" encoding="utf-8"?>
+<p:sld xmlns:a="http://schemas.openxmlformats.org/drawingml/2006/main" xmlns:r="http://schemas.openxmlformats.org/officeDocument/2006/relationships" xmlns:p="http://schemas.openxmlformats.org/presentationml/2006/main">
+  <p:cSld>
+    <p:spTree>
+      <p:nvGrpSpPr>
+        <p:cNvPr id="1" name=""/>
+        <p:cNvGrpSpPr/>
+        <p:nvPr/>
+      </p:nvGrpSpPr>
+      <p:grpSpPr>
+        <a:xfrm>
+          <a:off x="0" y="0"/>
+          <a:ext cx="0" cy="0"/>
+          <a:chOff x="0" y="0"/>
+          <a:chExt cx="0" cy="0"/>
+        </a:xfrm>
+      </p:grpSpPr>
+      <p:sp>
+        <p:nvSpPr>
+          <p:cNvPr id="2" name="Shape 0"/>
+          <p:cNvSpPr/>
+          <p:nvPr/>
+        </p:nvSpPr>
+        <p:spPr>
+          <a:xfrm>
+            <a:off x="762000" y="781050"/>
+            <a:ext cx="7806690" cy="2679"/>
+          </a:xfrm>
+          <a:prstGeom prst="rect">
+            <a:avLst/>
+          </a:prstGeom>
+          <a:solidFill>
+            <a:srgbClr val="646464"/>
+          </a:solidFill>
+        </p:spPr>
+      </p:sp>
+      <p:sp>
+        <p:nvSpPr>
+          <p:cNvPr id="3" name="Text 1"/>
+          <p:cNvSpPr/>
+          <p:nvPr/>
+        </p:nvSpPr>
+        <p:spPr>
+          <a:xfrm>
+            <a:off x="762000" y="228600"/>
+            <a:ext cx="7806690" cy="552450"/>
+          </a:xfrm>
+          <a:prstGeom prst="rect">
+            <a:avLst/>
+          </a:prstGeom>
+          <a:noFill/>
+        </p:spPr>
+        <p:txBody>
+          <a:bodyPr wrap="square" rtlCol="0" anchor="ctr"/>
+          <a:lstStyle/>
+          <a:p>
+            <a:pPr marL="0" indent="0">
+              <a:buNone/>
+            </a:pPr>
+            <a:r>
+              <a:rPr lang="en-US" sz="2400" dirty="0">
+                <a:solidFill>
+                  <a:srgbClr val="383838"/>
+                </a:solidFill>
+                <a:latin typeface="Times New Roman" panose="02020603050405020304" pitchFamily="18" charset="0"/>
+                <a:ea typeface="Noto Sans SC" pitchFamily="34" charset="-122"/>
+                <a:cs typeface="Times New Roman" panose="02020603050405020304" pitchFamily="18" charset="0"/>
+              </a:rPr>
+              <a:t>Experiment and Conclusion</a:t>
+            </a:r>
+            <a:endParaRPr lang="en-US" sz="2400" dirty="0">
+              <a:latin typeface="Times New Roman" panose="02020603050405020304" pitchFamily="18" charset="0"/>
+              <a:cs typeface="Times New Roman" panose="02020603050405020304" pitchFamily="18" charset="0"/>
+            </a:endParaRPr>
+          </a:p>
+        </p:txBody>
+      </p:sp>
+      <p:sp>
+        <p:nvSpPr>
+          <p:cNvPr id="5" name="内容占位符 2"/>
+          <p:cNvSpPr txBox="1"/>
+          <p:nvPr/>
+        </p:nvSpPr>
+        <p:spPr>
+          <a:xfrm>
+            <a:off x="469265" y="1007110"/>
+            <a:ext cx="8101965" cy="440690"/>
+          </a:xfrm>
+          <a:prstGeom prst="rect">
+            <a:avLst/>
+          </a:prstGeom>
+        </p:spPr>
+        <p:txBody>
+          <a:bodyPr>
+            <a:normAutofit/>
+          </a:bodyPr>
+          <a:lstStyle>
+            <a:lvl1pPr marL="342900" indent="-342900" algn="l" defTabSz="914400" rtl="0" eaLnBrk="1" latinLnBrk="0" hangingPunct="1">
+              <a:spcBef>
+                <a:spcPct val="20000"/>
+              </a:spcBef>
+              <a:buFont typeface="Arial" panose="020B0604020202020204" pitchFamily="34" charset="0"/>
+              <a:buChar char="•"/>
+              <a:defRPr sz="3200" kern="1200">
+                <a:solidFill>
+                  <a:schemeClr val="tx1"/>
+                </a:solidFill>
+                <a:latin typeface="+mn-lt"/>
+                <a:ea typeface="+mn-ea"/>
+                <a:cs typeface="+mn-cs"/>
+              </a:defRPr>
+            </a:lvl1pPr>
+            <a:lvl2pPr marL="742950" indent="-285750" algn="l" defTabSz="914400" rtl="0" eaLnBrk="1" latinLnBrk="0" hangingPunct="1">
+              <a:spcBef>
+                <a:spcPct val="20000"/>
+              </a:spcBef>
+              <a:buFont typeface="Arial" panose="020B0604020202020204" pitchFamily="34" charset="0"/>
+              <a:buChar char="–"/>
+              <a:defRPr sz="2800" kern="1200">
+                <a:solidFill>
+                  <a:schemeClr val="tx1"/>
+                </a:solidFill>
+                <a:latin typeface="+mn-lt"/>
+                <a:ea typeface="+mn-ea"/>
+                <a:cs typeface="+mn-cs"/>
+              </a:defRPr>
+            </a:lvl2pPr>
+            <a:lvl3pPr marL="1143000" indent="-228600" algn="l" defTabSz="914400" rtl="0" eaLnBrk="1" latinLnBrk="0" hangingPunct="1">
+              <a:spcBef>
+                <a:spcPct val="20000"/>
+              </a:spcBef>
+              <a:buFont typeface="Arial" panose="020B0604020202020204" pitchFamily="34" charset="0"/>
+              <a:buChar char="•"/>
+              <a:defRPr sz="2400" kern="1200">
+                <a:solidFill>
+                  <a:schemeClr val="tx1"/>
+                </a:solidFill>
+                <a:latin typeface="+mn-lt"/>
+                <a:ea typeface="+mn-ea"/>
+                <a:cs typeface="+mn-cs"/>
+              </a:defRPr>
+            </a:lvl3pPr>
+            <a:lvl4pPr marL="1600200" indent="-228600" algn="l" defTabSz="914400" rtl="0" eaLnBrk="1" latinLnBrk="0" hangingPunct="1">
+              <a:spcBef>
+                <a:spcPct val="20000"/>
+              </a:spcBef>
+              <a:buFont typeface="Arial" panose="020B0604020202020204" pitchFamily="34" charset="0"/>
+              <a:buChar char="–"/>
+              <a:defRPr sz="2000" kern="1200">
+                <a:solidFill>
+                  <a:schemeClr val="tx1"/>
+                </a:solidFill>
+                <a:latin typeface="+mn-lt"/>
+                <a:ea typeface="+mn-ea"/>
+                <a:cs typeface="+mn-cs"/>
+              </a:defRPr>
+            </a:lvl4pPr>
+            <a:lvl5pPr marL="2057400" indent="-228600" algn="l" defTabSz="914400" rtl="0" eaLnBrk="1" latinLnBrk="0" hangingPunct="1">
+              <a:spcBef>
+                <a:spcPct val="20000"/>
+              </a:spcBef>
+              <a:buFont typeface="Arial" panose="020B0604020202020204" pitchFamily="34" charset="0"/>
+              <a:buChar char="»"/>
+              <a:defRPr sz="2000" kern="1200">
+                <a:solidFill>
+                  <a:schemeClr val="tx1"/>
+                </a:solidFill>
+                <a:latin typeface="+mn-lt"/>
+                <a:ea typeface="+mn-ea"/>
+                <a:cs typeface="+mn-cs"/>
+              </a:defRPr>
+            </a:lvl5pPr>
+            <a:lvl6pPr marL="2514600" indent="-228600" algn="l" defTabSz="914400" rtl="0" eaLnBrk="1" latinLnBrk="0" hangingPunct="1">
+              <a:spcBef>
+                <a:spcPct val="20000"/>
+              </a:spcBef>
+              <a:buFont typeface="Arial" panose="020B0604020202020204" pitchFamily="34" charset="0"/>
+              <a:buChar char="•"/>
+              <a:defRPr sz="2000" kern="1200">
+                <a:solidFill>
+                  <a:schemeClr val="tx1"/>
+                </a:solidFill>
+                <a:latin typeface="+mn-lt"/>
+                <a:ea typeface="+mn-ea"/>
+                <a:cs typeface="+mn-cs"/>
+              </a:defRPr>
+            </a:lvl6pPr>
+            <a:lvl7pPr marL="2971800" indent="-228600" algn="l" defTabSz="914400" rtl="0" eaLnBrk="1" latinLnBrk="0" hangingPunct="1">
+              <a:spcBef>
+                <a:spcPct val="20000"/>
+              </a:spcBef>
+              <a:buFont typeface="Arial" panose="020B0604020202020204" pitchFamily="34" charset="0"/>
+              <a:buChar char="•"/>
+              <a:defRPr sz="2000" kern="1200">
+                <a:solidFill>
+                  <a:schemeClr val="tx1"/>
+                </a:solidFill>
+                <a:latin typeface="+mn-lt"/>
+                <a:ea typeface="+mn-ea"/>
+                <a:cs typeface="+mn-cs"/>
+              </a:defRPr>
+            </a:lvl7pPr>
+            <a:lvl8pPr marL="3429000" indent="-228600" algn="l" defTabSz="914400" rtl="0" eaLnBrk="1" latinLnBrk="0" hangingPunct="1">
+              <a:spcBef>
+                <a:spcPct val="20000"/>
+              </a:spcBef>
+              <a:buFont typeface="Arial" panose="020B0604020202020204" pitchFamily="34" charset="0"/>
+              <a:buChar char="•"/>
+              <a:defRPr sz="2000" kern="1200">
+                <a:solidFill>
+                  <a:schemeClr val="tx1"/>
+                </a:solidFill>
+                <a:latin typeface="+mn-lt"/>
+                <a:ea typeface="+mn-ea"/>
+                <a:cs typeface="+mn-cs"/>
+              </a:defRPr>
+            </a:lvl8pPr>
+            <a:lvl9pPr marL="3886200" indent="-228600" algn="l" defTabSz="914400" rtl="0" eaLnBrk="1" latinLnBrk="0" hangingPunct="1">
+              <a:spcBef>
+                <a:spcPct val="20000"/>
+              </a:spcBef>
+              <a:buFont typeface="Arial" panose="020B0604020202020204" pitchFamily="34" charset="0"/>
+              <a:buChar char="•"/>
+              <a:defRPr sz="2000" kern="1200">
+                <a:solidFill>
+                  <a:schemeClr val="tx1"/>
+                </a:solidFill>
+                <a:latin typeface="+mn-lt"/>
+                <a:ea typeface="+mn-ea"/>
+                <a:cs typeface="+mn-cs"/>
+              </a:defRPr>
+            </a:lvl9pPr>
+          </a:lstStyle>
+          <a:p>
+            <a:r>
+              <a:rPr lang="en-US" altLang="zh-CN" sz="1800" dirty="0">
+                <a:latin typeface="Times New Roman" panose="02020603050405020304" pitchFamily="18" charset="0"/>
+                <a:cs typeface="Times New Roman" panose="02020603050405020304" pitchFamily="18" charset="0"/>
+              </a:rPr>
+              <a:t>Prefill Latency/Throughput		Overall Latency/Throughput</a:t>
+            </a:r>
+            <a:endParaRPr lang="en-US" altLang="zh-CN" sz="1400" dirty="0">
+              <a:latin typeface="Times New Roman" panose="02020603050405020304" pitchFamily="18" charset="0"/>
+              <a:cs typeface="Times New Roman" panose="02020603050405020304" pitchFamily="18" charset="0"/>
+            </a:endParaRPr>
+          </a:p>
+        </p:txBody>
+      </p:sp>
+      <p:pic>
+        <p:nvPicPr>
+          <p:cNvPr id="4" name="图片 3"/>
+          <p:cNvPicPr/>
+          <p:nvPr/>
+        </p:nvPicPr>
+        <p:blipFill>
+          <a:blip r:embed="rId1"/>
+          <a:stretch>
+            <a:fillRect/>
+          </a:stretch>
+        </p:blipFill>
+        <p:spPr>
+          <a:xfrm>
+            <a:off x="4852670" y="1673860"/>
+            <a:ext cx="3943350" cy="1314450"/>
+          </a:xfrm>
+          <a:prstGeom prst="rect">
+            <a:avLst/>
+          </a:prstGeom>
+        </p:spPr>
+      </p:pic>
+      <p:pic>
+        <p:nvPicPr>
+          <p:cNvPr id="10" name="图片 9"/>
+          <p:cNvPicPr/>
+          <p:nvPr/>
+        </p:nvPicPr>
+        <p:blipFill>
+          <a:blip r:embed="rId2"/>
+          <a:stretch>
+            <a:fillRect/>
+          </a:stretch>
+        </p:blipFill>
+        <p:spPr>
+          <a:xfrm>
+            <a:off x="4852670" y="3267710"/>
+            <a:ext cx="3943350" cy="1314450"/>
+          </a:xfrm>
+          <a:prstGeom prst="rect">
+            <a:avLst/>
+          </a:prstGeom>
+        </p:spPr>
+      </p:pic>
+      <p:pic>
+        <p:nvPicPr>
+          <p:cNvPr id="11" name="图片 10"/>
+          <p:cNvPicPr/>
+          <p:nvPr/>
+        </p:nvPicPr>
+        <p:blipFill>
+          <a:blip r:embed="rId3"/>
+          <a:stretch>
+            <a:fillRect/>
+          </a:stretch>
+        </p:blipFill>
+        <p:spPr>
+          <a:xfrm>
+            <a:off x="347980" y="1673860"/>
+            <a:ext cx="3943350" cy="1314450"/>
+          </a:xfrm>
+          <a:prstGeom prst="rect">
+            <a:avLst/>
+          </a:prstGeom>
+        </p:spPr>
+      </p:pic>
+      <p:pic>
+        <p:nvPicPr>
+          <p:cNvPr id="14" name="图片 13"/>
+          <p:cNvPicPr/>
+          <p:nvPr/>
+        </p:nvPicPr>
+        <p:blipFill>
+          <a:blip r:embed="rId4"/>
+          <a:stretch>
+            <a:fillRect/>
+          </a:stretch>
+        </p:blipFill>
+        <p:spPr>
+          <a:xfrm>
+            <a:off x="347980" y="3267710"/>
+            <a:ext cx="3943350" cy="1314450"/>
+          </a:xfrm>
+          <a:prstGeom prst="rect">
+            <a:avLst/>
+          </a:prstGeom>
+        </p:spPr>
+      </p:pic>
+    </p:spTree>
+  </p:cSld>
+  <p:clrMapOvr>
+    <a:masterClrMapping/>
+  </p:clrMapOvr>
+</p:sld>
+</file>
+
+<file path=ppt/slides/slide28.xml><?xml version="1.0" encoding="utf-8"?>
+<p:sld xmlns:a="http://schemas.openxmlformats.org/drawingml/2006/main" xmlns:r="http://schemas.openxmlformats.org/officeDocument/2006/relationships" xmlns:p="http://schemas.openxmlformats.org/presentationml/2006/main">
+  <p:cSld>
+    <p:spTree>
+      <p:nvGrpSpPr>
+        <p:cNvPr id="1" name=""/>
+        <p:cNvGrpSpPr/>
+        <p:nvPr/>
+      </p:nvGrpSpPr>
+      <p:grpSpPr>
+        <a:xfrm>
+          <a:off x="0" y="0"/>
+          <a:ext cx="0" cy="0"/>
+          <a:chOff x="0" y="0"/>
+          <a:chExt cx="0" cy="0"/>
+        </a:xfrm>
+      </p:grpSpPr>
+      <p:sp>
+        <p:nvSpPr>
+          <p:cNvPr id="2" name="Shape 0"/>
+          <p:cNvSpPr/>
+          <p:nvPr/>
+        </p:nvSpPr>
+        <p:spPr>
+          <a:xfrm>
+            <a:off x="762000" y="781050"/>
+            <a:ext cx="7806690" cy="2679"/>
+          </a:xfrm>
+          <a:prstGeom prst="rect">
+            <a:avLst/>
+          </a:prstGeom>
+          <a:solidFill>
+            <a:srgbClr val="646464"/>
+          </a:solidFill>
+        </p:spPr>
+      </p:sp>
+      <p:sp>
+        <p:nvSpPr>
+          <p:cNvPr id="3" name="Text 1"/>
+          <p:cNvSpPr/>
+          <p:nvPr/>
+        </p:nvSpPr>
+        <p:spPr>
+          <a:xfrm>
+            <a:off x="762000" y="228600"/>
+            <a:ext cx="7806690" cy="552450"/>
+          </a:xfrm>
+          <a:prstGeom prst="rect">
+            <a:avLst/>
+          </a:prstGeom>
+          <a:noFill/>
+        </p:spPr>
+        <p:txBody>
+          <a:bodyPr wrap="square" rtlCol="0" anchor="ctr"/>
+          <a:lstStyle/>
+          <a:p>
+            <a:pPr marL="0" indent="0">
+              <a:buNone/>
+            </a:pPr>
+            <a:r>
+              <a:rPr lang="en-US" sz="2400" dirty="0">
+                <a:solidFill>
+                  <a:srgbClr val="383838"/>
+                </a:solidFill>
+                <a:latin typeface="Times New Roman" panose="02020603050405020304" pitchFamily="18" charset="0"/>
+                <a:ea typeface="Noto Sans SC" pitchFamily="34" charset="-122"/>
+                <a:cs typeface="Times New Roman" panose="02020603050405020304" pitchFamily="18" charset="0"/>
+              </a:rPr>
+              <a:t>Experiment and Conclusion</a:t>
+            </a:r>
+            <a:endParaRPr lang="en-US" sz="2400" dirty="0">
+              <a:latin typeface="Times New Roman" panose="02020603050405020304" pitchFamily="18" charset="0"/>
+              <a:cs typeface="Times New Roman" panose="02020603050405020304" pitchFamily="18" charset="0"/>
+            </a:endParaRPr>
+          </a:p>
+        </p:txBody>
+      </p:sp>
+      <p:sp>
+        <p:nvSpPr>
+          <p:cNvPr id="5" name="内容占位符 2"/>
+          <p:cNvSpPr txBox="1"/>
+          <p:nvPr/>
+        </p:nvSpPr>
+        <p:spPr>
+          <a:xfrm>
+            <a:off x="469265" y="1007110"/>
+            <a:ext cx="8101965" cy="440690"/>
+          </a:xfrm>
+          <a:prstGeom prst="rect">
+            <a:avLst/>
+          </a:prstGeom>
+        </p:spPr>
+        <p:txBody>
+          <a:bodyPr>
+            <a:normAutofit/>
+          </a:bodyPr>
+          <a:lstStyle>
+            <a:lvl1pPr marL="342900" indent="-342900" algn="l" defTabSz="914400" rtl="0" eaLnBrk="1" latinLnBrk="0" hangingPunct="1">
+              <a:spcBef>
+                <a:spcPct val="20000"/>
+              </a:spcBef>
+              <a:buFont typeface="Arial" panose="020B0604020202020204" pitchFamily="34" charset="0"/>
+              <a:buChar char="•"/>
+              <a:defRPr sz="3200" kern="1200">
+                <a:solidFill>
+                  <a:schemeClr val="tx1"/>
+                </a:solidFill>
+                <a:latin typeface="+mn-lt"/>
+                <a:ea typeface="+mn-ea"/>
+                <a:cs typeface="+mn-cs"/>
+              </a:defRPr>
+            </a:lvl1pPr>
+            <a:lvl2pPr marL="742950" indent="-285750" algn="l" defTabSz="914400" rtl="0" eaLnBrk="1" latinLnBrk="0" hangingPunct="1">
+              <a:spcBef>
+                <a:spcPct val="20000"/>
+              </a:spcBef>
+              <a:buFont typeface="Arial" panose="020B0604020202020204" pitchFamily="34" charset="0"/>
+              <a:buChar char="–"/>
+              <a:defRPr sz="2800" kern="1200">
+                <a:solidFill>
+                  <a:schemeClr val="tx1"/>
+                </a:solidFill>
+                <a:latin typeface="+mn-lt"/>
+                <a:ea typeface="+mn-ea"/>
+                <a:cs typeface="+mn-cs"/>
+              </a:defRPr>
+            </a:lvl2pPr>
+            <a:lvl3pPr marL="1143000" indent="-228600" algn="l" defTabSz="914400" rtl="0" eaLnBrk="1" latinLnBrk="0" hangingPunct="1">
+              <a:spcBef>
+                <a:spcPct val="20000"/>
+              </a:spcBef>
+              <a:buFont typeface="Arial" panose="020B0604020202020204" pitchFamily="34" charset="0"/>
+              <a:buChar char="•"/>
+              <a:defRPr sz="2400" kern="1200">
+                <a:solidFill>
+                  <a:schemeClr val="tx1"/>
+                </a:solidFill>
+                <a:latin typeface="+mn-lt"/>
+                <a:ea typeface="+mn-ea"/>
+                <a:cs typeface="+mn-cs"/>
+              </a:defRPr>
+            </a:lvl3pPr>
+            <a:lvl4pPr marL="1600200" indent="-228600" algn="l" defTabSz="914400" rtl="0" eaLnBrk="1" latinLnBrk="0" hangingPunct="1">
+              <a:spcBef>
+                <a:spcPct val="20000"/>
+              </a:spcBef>
+              <a:buFont typeface="Arial" panose="020B0604020202020204" pitchFamily="34" charset="0"/>
+              <a:buChar char="–"/>
+              <a:defRPr sz="2000" kern="1200">
+                <a:solidFill>
+                  <a:schemeClr val="tx1"/>
+                </a:solidFill>
+                <a:latin typeface="+mn-lt"/>
+                <a:ea typeface="+mn-ea"/>
+                <a:cs typeface="+mn-cs"/>
+              </a:defRPr>
+            </a:lvl4pPr>
+            <a:lvl5pPr marL="2057400" indent="-228600" algn="l" defTabSz="914400" rtl="0" eaLnBrk="1" latinLnBrk="0" hangingPunct="1">
+              <a:spcBef>
+                <a:spcPct val="20000"/>
+              </a:spcBef>
+              <a:buFont typeface="Arial" panose="020B0604020202020204" pitchFamily="34" charset="0"/>
+              <a:buChar char="»"/>
+              <a:defRPr sz="2000" kern="1200">
+                <a:solidFill>
+                  <a:schemeClr val="tx1"/>
+                </a:solidFill>
+                <a:latin typeface="+mn-lt"/>
+                <a:ea typeface="+mn-ea"/>
+                <a:cs typeface="+mn-cs"/>
+              </a:defRPr>
+            </a:lvl5pPr>
+            <a:lvl6pPr marL="2514600" indent="-228600" algn="l" defTabSz="914400" rtl="0" eaLnBrk="1" latinLnBrk="0" hangingPunct="1">
+              <a:spcBef>
+                <a:spcPct val="20000"/>
+              </a:spcBef>
+              <a:buFont typeface="Arial" panose="020B0604020202020204" pitchFamily="34" charset="0"/>
+              <a:buChar char="•"/>
+              <a:defRPr sz="2000" kern="1200">
+                <a:solidFill>
+                  <a:schemeClr val="tx1"/>
+                </a:solidFill>
+                <a:latin typeface="+mn-lt"/>
+                <a:ea typeface="+mn-ea"/>
+                <a:cs typeface="+mn-cs"/>
+              </a:defRPr>
+            </a:lvl6pPr>
+            <a:lvl7pPr marL="2971800" indent="-228600" algn="l" defTabSz="914400" rtl="0" eaLnBrk="1" latinLnBrk="0" hangingPunct="1">
+              <a:spcBef>
+                <a:spcPct val="20000"/>
+              </a:spcBef>
+              <a:buFont typeface="Arial" panose="020B0604020202020204" pitchFamily="34" charset="0"/>
+              <a:buChar char="•"/>
+              <a:defRPr sz="2000" kern="1200">
+                <a:solidFill>
+                  <a:schemeClr val="tx1"/>
+                </a:solidFill>
+                <a:latin typeface="+mn-lt"/>
+                <a:ea typeface="+mn-ea"/>
+                <a:cs typeface="+mn-cs"/>
+              </a:defRPr>
+            </a:lvl7pPr>
+            <a:lvl8pPr marL="3429000" indent="-228600" algn="l" defTabSz="914400" rtl="0" eaLnBrk="1" latinLnBrk="0" hangingPunct="1">
+              <a:spcBef>
+                <a:spcPct val="20000"/>
+              </a:spcBef>
+              <a:buFont typeface="Arial" panose="020B0604020202020204" pitchFamily="34" charset="0"/>
+              <a:buChar char="•"/>
+              <a:defRPr sz="2000" kern="1200">
+                <a:solidFill>
+                  <a:schemeClr val="tx1"/>
+                </a:solidFill>
+                <a:latin typeface="+mn-lt"/>
+                <a:ea typeface="+mn-ea"/>
+                <a:cs typeface="+mn-cs"/>
+              </a:defRPr>
+            </a:lvl8pPr>
+            <a:lvl9pPr marL="3886200" indent="-228600" algn="l" defTabSz="914400" rtl="0" eaLnBrk="1" latinLnBrk="0" hangingPunct="1">
+              <a:spcBef>
+                <a:spcPct val="20000"/>
+              </a:spcBef>
+              <a:buFont typeface="Arial" panose="020B0604020202020204" pitchFamily="34" charset="0"/>
+              <a:buChar char="•"/>
+              <a:defRPr sz="2000" kern="1200">
+                <a:solidFill>
+                  <a:schemeClr val="tx1"/>
+                </a:solidFill>
+                <a:latin typeface="+mn-lt"/>
+                <a:ea typeface="+mn-ea"/>
+                <a:cs typeface="+mn-cs"/>
+              </a:defRPr>
+            </a:lvl9pPr>
+          </a:lstStyle>
+          <a:p>
+            <a:r>
+              <a:rPr lang="en-US" altLang="zh-CN" sz="1400" dirty="0">
+                <a:latin typeface="Times New Roman" panose="02020603050405020304" pitchFamily="18" charset="0"/>
+                <a:cs typeface="Times New Roman" panose="02020603050405020304" pitchFamily="18" charset="0"/>
+              </a:rPr>
+              <a:t>Cache Hit Compare (our MCaM vs FCFS)</a:t>
+            </a:r>
+            <a:endParaRPr lang="en-US" altLang="zh-CN" sz="1400" dirty="0">
+              <a:latin typeface="Times New Roman" panose="02020603050405020304" pitchFamily="18" charset="0"/>
+              <a:cs typeface="Times New Roman" panose="02020603050405020304" pitchFamily="18" charset="0"/>
+            </a:endParaRPr>
+          </a:p>
+        </p:txBody>
+      </p:sp>
+      <p:pic>
+        <p:nvPicPr>
+          <p:cNvPr id="6" name="图片 5"/>
+          <p:cNvPicPr/>
+          <p:nvPr/>
+        </p:nvPicPr>
+        <p:blipFill>
+          <a:blip r:embed="rId1"/>
+          <a:stretch>
+            <a:fillRect/>
+          </a:stretch>
+        </p:blipFill>
+        <p:spPr>
+          <a:xfrm>
+            <a:off x="469265" y="1930400"/>
+            <a:ext cx="3712210" cy="1594485"/>
+          </a:xfrm>
+          <a:prstGeom prst="rect">
+            <a:avLst/>
+          </a:prstGeom>
+        </p:spPr>
+      </p:pic>
+      <p:sp>
+        <p:nvSpPr>
+          <p:cNvPr id="7" name="文本框 6"/>
+          <p:cNvSpPr txBox="1"/>
+          <p:nvPr/>
+        </p:nvSpPr>
+        <p:spPr>
+          <a:xfrm>
+            <a:off x="1963420" y="3755390"/>
+            <a:ext cx="778510" cy="275590"/>
+          </a:xfrm>
+          <a:prstGeom prst="rect">
+            <a:avLst/>
+          </a:prstGeom>
+          <a:noFill/>
+        </p:spPr>
+        <p:txBody>
+          <a:bodyPr wrap="square" rtlCol="0">
+            <a:spAutoFit/>
+          </a:bodyPr>
+          <a:p>
+            <a:r>
+              <a:rPr lang="en-US" altLang="zh-CN" sz="1200"/>
+              <a:t>(a) GPU</a:t>
+            </a:r>
+            <a:endParaRPr lang="en-US" altLang="zh-CN" sz="1200"/>
+          </a:p>
+        </p:txBody>
+      </p:sp>
+      <p:pic>
+        <p:nvPicPr>
+          <p:cNvPr id="8" name="图片 7"/>
+          <p:cNvPicPr/>
+          <p:nvPr/>
+        </p:nvPicPr>
+        <p:blipFill>
+          <a:blip r:embed="rId2"/>
+          <a:stretch>
+            <a:fillRect/>
+          </a:stretch>
+        </p:blipFill>
+        <p:spPr>
+          <a:xfrm>
+            <a:off x="4844415" y="1930400"/>
+            <a:ext cx="3723640" cy="1613535"/>
+          </a:xfrm>
+          <a:prstGeom prst="rect">
+            <a:avLst/>
+          </a:prstGeom>
+        </p:spPr>
+      </p:pic>
+      <p:sp>
+        <p:nvSpPr>
+          <p:cNvPr id="9" name="文本框 8"/>
+          <p:cNvSpPr txBox="1"/>
+          <p:nvPr/>
+        </p:nvSpPr>
+        <p:spPr>
+          <a:xfrm>
+            <a:off x="6316980" y="3695065"/>
+            <a:ext cx="1089660" cy="275590"/>
+          </a:xfrm>
+          <a:prstGeom prst="rect">
+            <a:avLst/>
+          </a:prstGeom>
+          <a:noFill/>
+        </p:spPr>
+        <p:txBody>
+          <a:bodyPr wrap="square" rtlCol="0">
+            <a:spAutoFit/>
+          </a:bodyPr>
+          <a:p>
+            <a:r>
+              <a:rPr lang="en-US" altLang="zh-CN" sz="1200"/>
+              <a:t>(a) Overall</a:t>
+            </a:r>
+            <a:endParaRPr lang="en-US" altLang="zh-CN" sz="1200"/>
+          </a:p>
+        </p:txBody>
+      </p:sp>
+    </p:spTree>
+  </p:cSld>
+  <p:clrMapOvr>
+    <a:masterClrMapping/>
+  </p:clrMapOvr>
+</p:sld>
+</file>
+
+<file path=ppt/slides/slide29.xml><?xml version="1.0" encoding="utf-8"?>
 <p:sld xmlns:a="http://schemas.openxmlformats.org/drawingml/2006/main" xmlns:r="http://schemas.openxmlformats.org/officeDocument/2006/relationships" xmlns:p="http://schemas.openxmlformats.org/presentationml/2006/main">
   <p:cSld>
     <p:spTree>

</xml_diff>